<commit_message>
updated thesis map picture
</commit_message>
<xml_diff>
--- a/03_Figures/06_Introduction/ThesisMap.pptx
+++ b/03_Figures/06_Introduction/ThesisMap.pptx
@@ -107,6 +107,11 @@
       </a:defRPr>
     </a:lvl9pPr>
   </p:defaultTextStyle>
+  <p:extLst>
+    <p:ext uri="{EFAFB233-063F-42B5-8137-9DF3F51BA10A}">
+      <p15:sldGuideLst xmlns:p15="http://schemas.microsoft.com/office/powerpoint/2012/main"/>
+    </p:ext>
+  </p:extLst>
 </p:presentation>
 </file>
 
@@ -192,7 +197,7 @@
           <a:p>
             <a:fld id="{6D649B26-A475-EE47-90EF-A6F457C5E45C}" type="datetimeFigureOut">
               <a:rPr lang="en-GB" smtClean="0"/>
-              <a:t>25/07/2016</a:t>
+              <a:t>10/12/2016</a:t>
             </a:fld>
             <a:endParaRPr lang="en-GB"/>
           </a:p>
@@ -675,7 +680,7 @@
           <a:p>
             <a:fld id="{C46EF7F6-8777-C24D-B115-3C749887A399}" type="datetimeFigureOut">
               <a:rPr lang="en-GB" smtClean="0"/>
-              <a:t>25/07/2016</a:t>
+              <a:t>10/12/2016</a:t>
             </a:fld>
             <a:endParaRPr lang="en-GB"/>
           </a:p>
@@ -845,7 +850,7 @@
           <a:p>
             <a:fld id="{C46EF7F6-8777-C24D-B115-3C749887A399}" type="datetimeFigureOut">
               <a:rPr lang="en-GB" smtClean="0"/>
-              <a:t>25/07/2016</a:t>
+              <a:t>10/12/2016</a:t>
             </a:fld>
             <a:endParaRPr lang="en-GB"/>
           </a:p>
@@ -1025,7 +1030,7 @@
           <a:p>
             <a:fld id="{C46EF7F6-8777-C24D-B115-3C749887A399}" type="datetimeFigureOut">
               <a:rPr lang="en-GB" smtClean="0"/>
-              <a:t>25/07/2016</a:t>
+              <a:t>10/12/2016</a:t>
             </a:fld>
             <a:endParaRPr lang="en-GB"/>
           </a:p>
@@ -1195,7 +1200,7 @@
           <a:p>
             <a:fld id="{C46EF7F6-8777-C24D-B115-3C749887A399}" type="datetimeFigureOut">
               <a:rPr lang="en-GB" smtClean="0"/>
-              <a:t>25/07/2016</a:t>
+              <a:t>10/12/2016</a:t>
             </a:fld>
             <a:endParaRPr lang="en-GB"/>
           </a:p>
@@ -1441,7 +1446,7 @@
           <a:p>
             <a:fld id="{C46EF7F6-8777-C24D-B115-3C749887A399}" type="datetimeFigureOut">
               <a:rPr lang="en-GB" smtClean="0"/>
-              <a:t>25/07/2016</a:t>
+              <a:t>10/12/2016</a:t>
             </a:fld>
             <a:endParaRPr lang="en-GB"/>
           </a:p>
@@ -1673,7 +1678,7 @@
           <a:p>
             <a:fld id="{C46EF7F6-8777-C24D-B115-3C749887A399}" type="datetimeFigureOut">
               <a:rPr lang="en-GB" smtClean="0"/>
-              <a:t>25/07/2016</a:t>
+              <a:t>10/12/2016</a:t>
             </a:fld>
             <a:endParaRPr lang="en-GB"/>
           </a:p>
@@ -2040,7 +2045,7 @@
           <a:p>
             <a:fld id="{C46EF7F6-8777-C24D-B115-3C749887A399}" type="datetimeFigureOut">
               <a:rPr lang="en-GB" smtClean="0"/>
-              <a:t>25/07/2016</a:t>
+              <a:t>10/12/2016</a:t>
             </a:fld>
             <a:endParaRPr lang="en-GB"/>
           </a:p>
@@ -2158,7 +2163,7 @@
           <a:p>
             <a:fld id="{C46EF7F6-8777-C24D-B115-3C749887A399}" type="datetimeFigureOut">
               <a:rPr lang="en-GB" smtClean="0"/>
-              <a:t>25/07/2016</a:t>
+              <a:t>10/12/2016</a:t>
             </a:fld>
             <a:endParaRPr lang="en-GB"/>
           </a:p>
@@ -2253,7 +2258,7 @@
           <a:p>
             <a:fld id="{C46EF7F6-8777-C24D-B115-3C749887A399}" type="datetimeFigureOut">
               <a:rPr lang="en-GB" smtClean="0"/>
-              <a:t>25/07/2016</a:t>
+              <a:t>10/12/2016</a:t>
             </a:fld>
             <a:endParaRPr lang="en-GB"/>
           </a:p>
@@ -2530,7 +2535,7 @@
           <a:p>
             <a:fld id="{C46EF7F6-8777-C24D-B115-3C749887A399}" type="datetimeFigureOut">
               <a:rPr lang="en-GB" smtClean="0"/>
-              <a:t>25/07/2016</a:t>
+              <a:t>10/12/2016</a:t>
             </a:fld>
             <a:endParaRPr lang="en-GB"/>
           </a:p>
@@ -2783,7 +2788,7 @@
           <a:p>
             <a:fld id="{C46EF7F6-8777-C24D-B115-3C749887A399}" type="datetimeFigureOut">
               <a:rPr lang="en-GB" smtClean="0"/>
-              <a:t>25/07/2016</a:t>
+              <a:t>10/12/2016</a:t>
             </a:fld>
             <a:endParaRPr lang="en-GB"/>
           </a:p>
@@ -2996,7 +3001,7 @@
           <a:p>
             <a:fld id="{C46EF7F6-8777-C24D-B115-3C749887A399}" type="datetimeFigureOut">
               <a:rPr lang="en-GB" smtClean="0"/>
-              <a:t>25/07/2016</a:t>
+              <a:t>10/12/2016</a:t>
             </a:fld>
             <a:endParaRPr lang="en-GB"/>
           </a:p>
@@ -3602,7 +3607,7 @@
             <a:pPr algn="ctr"/>
             <a:r>
               <a:rPr lang="en-GB" sz="1000" dirty="0" smtClean="0"/>
-              <a:t>Chapter 4</a:t>
+              <a:t>Design Suggestion</a:t>
             </a:r>
             <a:endParaRPr lang="en-GB" sz="1000" dirty="0"/>
           </a:p>
@@ -4403,7 +4408,7 @@
             <a:pPr algn="ctr"/>
             <a:r>
               <a:rPr lang="en-GB" sz="1000" dirty="0" smtClean="0"/>
-              <a:t>Enhancing Interaction Patterns</a:t>
+              <a:t>Data Visualisation</a:t>
             </a:r>
             <a:endParaRPr lang="en-GB" sz="1000" dirty="0"/>
           </a:p>
@@ -5325,6 +5330,363 @@
           </a:p>
         </p:txBody>
       </p:sp>
+      <p:sp>
+        <p:nvSpPr>
+          <p:cNvPr id="45" name="Rounded Rectangle 44"/>
+          <p:cNvSpPr/>
+          <p:nvPr/>
+        </p:nvSpPr>
+        <p:spPr>
+          <a:xfrm>
+            <a:off x="307141" y="4548153"/>
+            <a:ext cx="1169894" cy="497541"/>
+          </a:xfrm>
+          <a:prstGeom prst="roundRect">
+            <a:avLst/>
+          </a:prstGeom>
+        </p:spPr>
+        <p:style>
+          <a:lnRef idx="1">
+            <a:schemeClr val="accent3"/>
+          </a:lnRef>
+          <a:fillRef idx="2">
+            <a:schemeClr val="accent3"/>
+          </a:fillRef>
+          <a:effectRef idx="1">
+            <a:schemeClr val="accent3"/>
+          </a:effectRef>
+          <a:fontRef idx="minor">
+            <a:schemeClr val="dk1"/>
+          </a:fontRef>
+        </p:style>
+        <p:txBody>
+          <a:bodyPr rtlCol="0" anchor="ctr"/>
+          <a:lstStyle/>
+          <a:p>
+            <a:pPr algn="ctr"/>
+            <a:r>
+              <a:rPr lang="en-GB" sz="1000" dirty="0" smtClean="0"/>
+              <a:t>Prototype Implementation</a:t>
+            </a:r>
+            <a:endParaRPr lang="en-GB" sz="1000" dirty="0"/>
+          </a:p>
+        </p:txBody>
+      </p:sp>
+      <p:sp>
+        <p:nvSpPr>
+          <p:cNvPr id="46" name="Rounded Rectangle 45"/>
+          <p:cNvSpPr/>
+          <p:nvPr/>
+        </p:nvSpPr>
+        <p:spPr>
+          <a:xfrm>
+            <a:off x="1684149" y="4497509"/>
+            <a:ext cx="4405990" cy="548185"/>
+          </a:xfrm>
+          <a:prstGeom prst="roundRect">
+            <a:avLst/>
+          </a:prstGeom>
+          <a:ln>
+            <a:prstDash val="dash"/>
+          </a:ln>
+        </p:spPr>
+        <p:style>
+          <a:lnRef idx="1">
+            <a:schemeClr val="accent3"/>
+          </a:lnRef>
+          <a:fillRef idx="2">
+            <a:schemeClr val="accent3"/>
+          </a:fillRef>
+          <a:effectRef idx="1">
+            <a:schemeClr val="accent3"/>
+          </a:effectRef>
+          <a:fontRef idx="minor">
+            <a:schemeClr val="dk1"/>
+          </a:fontRef>
+        </p:style>
+        <p:txBody>
+          <a:bodyPr rtlCol="0" anchor="ctr"/>
+          <a:lstStyle/>
+          <a:p>
+            <a:pPr algn="ctr"/>
+            <a:endParaRPr lang="en-GB" sz="1000" dirty="0"/>
+          </a:p>
+        </p:txBody>
+      </p:sp>
+      <p:sp>
+        <p:nvSpPr>
+          <p:cNvPr id="48" name="Rounded Rectangle 47"/>
+          <p:cNvSpPr/>
+          <p:nvPr/>
+        </p:nvSpPr>
+        <p:spPr>
+          <a:xfrm>
+            <a:off x="307141" y="5268520"/>
+            <a:ext cx="1169894" cy="497541"/>
+          </a:xfrm>
+          <a:prstGeom prst="roundRect">
+            <a:avLst/>
+          </a:prstGeom>
+        </p:spPr>
+        <p:style>
+          <a:lnRef idx="1">
+            <a:schemeClr val="accent3"/>
+          </a:lnRef>
+          <a:fillRef idx="2">
+            <a:schemeClr val="accent3"/>
+          </a:fillRef>
+          <a:effectRef idx="1">
+            <a:schemeClr val="accent3"/>
+          </a:effectRef>
+          <a:fontRef idx="minor">
+            <a:schemeClr val="dk1"/>
+          </a:fontRef>
+        </p:style>
+        <p:txBody>
+          <a:bodyPr rtlCol="0" anchor="ctr"/>
+          <a:lstStyle/>
+          <a:p>
+            <a:pPr algn="ctr"/>
+            <a:r>
+              <a:rPr lang="en-GB" sz="1000" smtClean="0"/>
+              <a:t>Evaluation</a:t>
+            </a:r>
+            <a:endParaRPr lang="en-GB" sz="1000" dirty="0"/>
+          </a:p>
+        </p:txBody>
+      </p:sp>
+      <p:sp>
+        <p:nvSpPr>
+          <p:cNvPr id="49" name="Rounded Rectangle 48"/>
+          <p:cNvSpPr/>
+          <p:nvPr/>
+        </p:nvSpPr>
+        <p:spPr>
+          <a:xfrm>
+            <a:off x="1684149" y="5217876"/>
+            <a:ext cx="4405990" cy="548185"/>
+          </a:xfrm>
+          <a:prstGeom prst="roundRect">
+            <a:avLst/>
+          </a:prstGeom>
+          <a:ln>
+            <a:prstDash val="dash"/>
+          </a:ln>
+        </p:spPr>
+        <p:style>
+          <a:lnRef idx="1">
+            <a:schemeClr val="accent3"/>
+          </a:lnRef>
+          <a:fillRef idx="2">
+            <a:schemeClr val="accent3"/>
+          </a:fillRef>
+          <a:effectRef idx="1">
+            <a:schemeClr val="accent3"/>
+          </a:effectRef>
+          <a:fontRef idx="minor">
+            <a:schemeClr val="dk1"/>
+          </a:fontRef>
+        </p:style>
+        <p:txBody>
+          <a:bodyPr rtlCol="0" anchor="ctr"/>
+          <a:lstStyle/>
+          <a:p>
+            <a:pPr algn="ctr"/>
+            <a:endParaRPr lang="en-GB" sz="1000" dirty="0"/>
+          </a:p>
+        </p:txBody>
+      </p:sp>
+      <p:sp>
+        <p:nvSpPr>
+          <p:cNvPr id="50" name="Rounded Rectangle 49"/>
+          <p:cNvSpPr/>
+          <p:nvPr/>
+        </p:nvSpPr>
+        <p:spPr>
+          <a:xfrm>
+            <a:off x="307140" y="5988887"/>
+            <a:ext cx="1169894" cy="497541"/>
+          </a:xfrm>
+          <a:prstGeom prst="roundRect">
+            <a:avLst/>
+          </a:prstGeom>
+        </p:spPr>
+        <p:style>
+          <a:lnRef idx="1">
+            <a:schemeClr val="accent3"/>
+          </a:lnRef>
+          <a:fillRef idx="2">
+            <a:schemeClr val="accent3"/>
+          </a:fillRef>
+          <a:effectRef idx="1">
+            <a:schemeClr val="accent3"/>
+          </a:effectRef>
+          <a:fontRef idx="minor">
+            <a:schemeClr val="dk1"/>
+          </a:fontRef>
+        </p:style>
+        <p:txBody>
+          <a:bodyPr rtlCol="0" anchor="ctr"/>
+          <a:lstStyle/>
+          <a:p>
+            <a:pPr algn="ctr"/>
+            <a:r>
+              <a:rPr lang="en-GB" sz="1000" dirty="0" smtClean="0"/>
+              <a:t>Conclusion</a:t>
+            </a:r>
+            <a:endParaRPr lang="en-GB" sz="1000" dirty="0"/>
+          </a:p>
+        </p:txBody>
+      </p:sp>
+      <p:sp>
+        <p:nvSpPr>
+          <p:cNvPr id="51" name="Rounded Rectangle 50"/>
+          <p:cNvSpPr/>
+          <p:nvPr/>
+        </p:nvSpPr>
+        <p:spPr>
+          <a:xfrm>
+            <a:off x="1684148" y="5938243"/>
+            <a:ext cx="4405990" cy="548185"/>
+          </a:xfrm>
+          <a:prstGeom prst="roundRect">
+            <a:avLst/>
+          </a:prstGeom>
+          <a:ln>
+            <a:prstDash val="dash"/>
+          </a:ln>
+        </p:spPr>
+        <p:style>
+          <a:lnRef idx="1">
+            <a:schemeClr val="accent3"/>
+          </a:lnRef>
+          <a:fillRef idx="2">
+            <a:schemeClr val="accent3"/>
+          </a:fillRef>
+          <a:effectRef idx="1">
+            <a:schemeClr val="accent3"/>
+          </a:effectRef>
+          <a:fontRef idx="minor">
+            <a:schemeClr val="dk1"/>
+          </a:fontRef>
+        </p:style>
+        <p:txBody>
+          <a:bodyPr rtlCol="0" anchor="ctr"/>
+          <a:lstStyle/>
+          <a:p>
+            <a:pPr algn="ctr"/>
+            <a:endParaRPr lang="en-GB" sz="1000" dirty="0"/>
+          </a:p>
+        </p:txBody>
+      </p:sp>
+      <p:cxnSp>
+        <p:nvCxnSpPr>
+          <p:cNvPr id="63" name="Straight Arrow Connector 62"/>
+          <p:cNvCxnSpPr>
+            <a:stCxn id="7" idx="2"/>
+            <a:endCxn id="45" idx="0"/>
+          </p:cNvCxnSpPr>
+          <p:nvPr/>
+        </p:nvCxnSpPr>
+        <p:spPr>
+          <a:xfrm>
+            <a:off x="892088" y="4372680"/>
+            <a:ext cx="0" cy="175473"/>
+          </a:xfrm>
+          <a:prstGeom prst="straightConnector1">
+            <a:avLst/>
+          </a:prstGeom>
+          <a:ln>
+            <a:tailEnd type="triangle"/>
+          </a:ln>
+        </p:spPr>
+        <p:style>
+          <a:lnRef idx="1">
+            <a:schemeClr val="dk1"/>
+          </a:lnRef>
+          <a:fillRef idx="0">
+            <a:schemeClr val="dk1"/>
+          </a:fillRef>
+          <a:effectRef idx="0">
+            <a:schemeClr val="dk1"/>
+          </a:effectRef>
+          <a:fontRef idx="minor">
+            <a:schemeClr val="tx1"/>
+          </a:fontRef>
+        </p:style>
+      </p:cxnSp>
+      <p:cxnSp>
+        <p:nvCxnSpPr>
+          <p:cNvPr id="64" name="Straight Arrow Connector 63"/>
+          <p:cNvCxnSpPr>
+            <a:stCxn id="45" idx="2"/>
+            <a:endCxn id="48" idx="0"/>
+          </p:cNvCxnSpPr>
+          <p:nvPr/>
+        </p:nvCxnSpPr>
+        <p:spPr>
+          <a:xfrm>
+            <a:off x="892088" y="5045694"/>
+            <a:ext cx="0" cy="222826"/>
+          </a:xfrm>
+          <a:prstGeom prst="straightConnector1">
+            <a:avLst/>
+          </a:prstGeom>
+          <a:ln>
+            <a:tailEnd type="triangle"/>
+          </a:ln>
+        </p:spPr>
+        <p:style>
+          <a:lnRef idx="1">
+            <a:schemeClr val="dk1"/>
+          </a:lnRef>
+          <a:fillRef idx="0">
+            <a:schemeClr val="dk1"/>
+          </a:fillRef>
+          <a:effectRef idx="0">
+            <a:schemeClr val="dk1"/>
+          </a:effectRef>
+          <a:fontRef idx="minor">
+            <a:schemeClr val="tx1"/>
+          </a:fontRef>
+        </p:style>
+      </p:cxnSp>
+      <p:cxnSp>
+        <p:nvCxnSpPr>
+          <p:cNvPr id="66" name="Straight Arrow Connector 65"/>
+          <p:cNvCxnSpPr>
+            <a:stCxn id="48" idx="2"/>
+            <a:endCxn id="50" idx="0"/>
+          </p:cNvCxnSpPr>
+          <p:nvPr/>
+        </p:nvCxnSpPr>
+        <p:spPr>
+          <a:xfrm flipH="1">
+            <a:off x="892087" y="5766061"/>
+            <a:ext cx="1" cy="222826"/>
+          </a:xfrm>
+          <a:prstGeom prst="straightConnector1">
+            <a:avLst/>
+          </a:prstGeom>
+          <a:ln>
+            <a:tailEnd type="triangle"/>
+          </a:ln>
+        </p:spPr>
+        <p:style>
+          <a:lnRef idx="1">
+            <a:schemeClr val="dk1"/>
+          </a:lnRef>
+          <a:fillRef idx="0">
+            <a:schemeClr val="dk1"/>
+          </a:fillRef>
+          <a:effectRef idx="0">
+            <a:schemeClr val="dk1"/>
+          </a:effectRef>
+          <a:fontRef idx="minor">
+            <a:schemeClr val="tx1"/>
+          </a:fontRef>
+        </p:style>
+      </p:cxnSp>
     </p:spTree>
     <p:extLst>
       <p:ext uri="{BB962C8B-B14F-4D97-AF65-F5344CB8AC3E}">
@@ -5335,6 +5697,13 @@
   <p:clrMapOvr>
     <a:masterClrMapping/>
   </p:clrMapOvr>
+  <p:timing>
+    <p:tnLst>
+      <p:par>
+        <p:cTn id="1" dur="indefinite" restart="never" nodeType="tmRoot"/>
+      </p:par>
+    </p:tnLst>
+  </p:timing>
 </p:sld>
 </file>
 

</xml_diff>

<commit_message>
merge work from January 10 (#31)
* updated library

* txs auto checkin

* txs auto checkin

* txs auto checkin

* txs auto checkin

* txs auto checkin

* txs auto checkin

* txs auto checkin

* txs auto checkin

* txs auto checkin

* txs auto checkin

* updated thesis map

* txs auto checkin

* txs auto checkin

* txs auto checkin

* txs auto checkin

* txs auto checkin

* txs auto checkin

* txs auto checkin

* txs auto checkin

* txs auto checkin
</commit_message>
<xml_diff>
--- a/03_Figures/06_Introduction/ThesisMap.pptx
+++ b/03_Figures/06_Introduction/ThesisMap.pptx
@@ -109,7 +109,18 @@
   </p:defaultTextStyle>
   <p:extLst>
     <p:ext uri="{EFAFB233-063F-42B5-8137-9DF3F51BA10A}">
-      <p15:sldGuideLst xmlns:p15="http://schemas.microsoft.com/office/powerpoint/2012/main"/>
+      <p15:sldGuideLst xmlns:p15="http://schemas.microsoft.com/office/powerpoint/2012/main">
+        <p15:guide id="1" orient="horz" pos="2160" userDrawn="1">
+          <p15:clr>
+            <a:srgbClr val="A4A3A4"/>
+          </p15:clr>
+        </p15:guide>
+        <p15:guide id="2" pos="3840" userDrawn="1">
+          <p15:clr>
+            <a:srgbClr val="A4A3A4"/>
+          </p15:clr>
+        </p15:guide>
+      </p15:sldGuideLst>
     </p:ext>
   </p:extLst>
 </p:presentation>
@@ -197,7 +208,7 @@
           <a:p>
             <a:fld id="{6D649B26-A475-EE47-90EF-A6F457C5E45C}" type="datetimeFigureOut">
               <a:rPr lang="en-GB" smtClean="0"/>
-              <a:t>10/12/2016</a:t>
+              <a:t>10/01/2017</a:t>
             </a:fld>
             <a:endParaRPr lang="en-GB"/>
           </a:p>
@@ -581,6 +592,9 @@
             <a:off x="1524000" y="1122363"/>
             <a:ext cx="9144000" cy="2387600"/>
           </a:xfrm>
+          <a:prstGeom prst="rect">
+            <a:avLst/>
+          </a:prstGeom>
         </p:spPr>
         <p:txBody>
           <a:bodyPr anchor="b"/>
@@ -613,6 +627,9 @@
             <a:off x="1524000" y="3602038"/>
             <a:ext cx="9144000" cy="1655762"/>
           </a:xfrm>
+          <a:prstGeom prst="rect">
+            <a:avLst/>
+          </a:prstGeom>
         </p:spPr>
         <p:txBody>
           <a:bodyPr/>
@@ -673,14 +690,22 @@
             <p:ph type="dt" sz="half" idx="10"/>
           </p:nvPr>
         </p:nvSpPr>
-        <p:spPr/>
+        <p:spPr>
+          <a:xfrm>
+            <a:off x="838200" y="6356350"/>
+            <a:ext cx="2743200" cy="365125"/>
+          </a:xfrm>
+          <a:prstGeom prst="rect">
+            <a:avLst/>
+          </a:prstGeom>
+        </p:spPr>
         <p:txBody>
           <a:bodyPr/>
           <a:lstStyle/>
           <a:p>
             <a:fld id="{C46EF7F6-8777-C24D-B115-3C749887A399}" type="datetimeFigureOut">
               <a:rPr lang="en-GB" smtClean="0"/>
-              <a:t>10/12/2016</a:t>
+              <a:t>10/01/2017</a:t>
             </a:fld>
             <a:endParaRPr lang="en-GB"/>
           </a:p>
@@ -696,7 +721,15 @@
             <p:ph type="ftr" sz="quarter" idx="11"/>
           </p:nvPr>
         </p:nvSpPr>
-        <p:spPr/>
+        <p:spPr>
+          <a:xfrm>
+            <a:off x="4038600" y="6356350"/>
+            <a:ext cx="4114800" cy="365125"/>
+          </a:xfrm>
+          <a:prstGeom prst="rect">
+            <a:avLst/>
+          </a:prstGeom>
+        </p:spPr>
         <p:txBody>
           <a:bodyPr/>
           <a:lstStyle/>
@@ -715,7 +748,15 @@
             <p:ph type="sldNum" sz="quarter" idx="12"/>
           </p:nvPr>
         </p:nvSpPr>
-        <p:spPr/>
+        <p:spPr>
+          <a:xfrm>
+            <a:off x="8610600" y="6356350"/>
+            <a:ext cx="2743200" cy="365125"/>
+          </a:xfrm>
+          <a:prstGeom prst="rect">
+            <a:avLst/>
+          </a:prstGeom>
+        </p:spPr>
         <p:txBody>
           <a:bodyPr/>
           <a:lstStyle/>
@@ -738,6 +779,13 @@
   <p:clrMapOvr>
     <a:masterClrMapping/>
   </p:clrMapOvr>
+  <p:timing>
+    <p:tnLst>
+      <p:par>
+        <p:cTn id="1" dur="indefinite" restart="never" nodeType="tmRoot"/>
+      </p:par>
+    </p:tnLst>
+  </p:timing>
 </p:sldLayout>
 </file>
 
@@ -768,7 +816,15 @@
             <p:ph type="title"/>
           </p:nvPr>
         </p:nvSpPr>
-        <p:spPr/>
+        <p:spPr>
+          <a:xfrm>
+            <a:off x="838200" y="365125"/>
+            <a:ext cx="10515600" cy="1325563"/>
+          </a:xfrm>
+          <a:prstGeom prst="rect">
+            <a:avLst/>
+          </a:prstGeom>
+        </p:spPr>
         <p:txBody>
           <a:bodyPr/>
           <a:lstStyle/>
@@ -791,7 +847,15 @@
             <p:ph type="body" orient="vert" idx="1"/>
           </p:nvPr>
         </p:nvSpPr>
-        <p:spPr/>
+        <p:spPr>
+          <a:xfrm>
+            <a:off x="838200" y="1825625"/>
+            <a:ext cx="10515600" cy="4351338"/>
+          </a:xfrm>
+          <a:prstGeom prst="rect">
+            <a:avLst/>
+          </a:prstGeom>
+        </p:spPr>
         <p:txBody>
           <a:bodyPr vert="eaVert"/>
           <a:lstStyle/>
@@ -843,14 +907,22 @@
             <p:ph type="dt" sz="half" idx="10"/>
           </p:nvPr>
         </p:nvSpPr>
-        <p:spPr/>
+        <p:spPr>
+          <a:xfrm>
+            <a:off x="838200" y="6356350"/>
+            <a:ext cx="2743200" cy="365125"/>
+          </a:xfrm>
+          <a:prstGeom prst="rect">
+            <a:avLst/>
+          </a:prstGeom>
+        </p:spPr>
         <p:txBody>
           <a:bodyPr/>
           <a:lstStyle/>
           <a:p>
             <a:fld id="{C46EF7F6-8777-C24D-B115-3C749887A399}" type="datetimeFigureOut">
               <a:rPr lang="en-GB" smtClean="0"/>
-              <a:t>10/12/2016</a:t>
+              <a:t>10/01/2017</a:t>
             </a:fld>
             <a:endParaRPr lang="en-GB"/>
           </a:p>
@@ -866,7 +938,15 @@
             <p:ph type="ftr" sz="quarter" idx="11"/>
           </p:nvPr>
         </p:nvSpPr>
-        <p:spPr/>
+        <p:spPr>
+          <a:xfrm>
+            <a:off x="4038600" y="6356350"/>
+            <a:ext cx="4114800" cy="365125"/>
+          </a:xfrm>
+          <a:prstGeom prst="rect">
+            <a:avLst/>
+          </a:prstGeom>
+        </p:spPr>
         <p:txBody>
           <a:bodyPr/>
           <a:lstStyle/>
@@ -885,7 +965,15 @@
             <p:ph type="sldNum" sz="quarter" idx="12"/>
           </p:nvPr>
         </p:nvSpPr>
-        <p:spPr/>
+        <p:spPr>
+          <a:xfrm>
+            <a:off x="8610600" y="6356350"/>
+            <a:ext cx="2743200" cy="365125"/>
+          </a:xfrm>
+          <a:prstGeom prst="rect">
+            <a:avLst/>
+          </a:prstGeom>
+        </p:spPr>
         <p:txBody>
           <a:bodyPr/>
           <a:lstStyle/>
@@ -943,6 +1031,9 @@
             <a:off x="8724900" y="365125"/>
             <a:ext cx="2628900" cy="5811838"/>
           </a:xfrm>
+          <a:prstGeom prst="rect">
+            <a:avLst/>
+          </a:prstGeom>
         </p:spPr>
         <p:txBody>
           <a:bodyPr vert="eaVert"/>
@@ -971,6 +1062,9 @@
             <a:off x="838200" y="365125"/>
             <a:ext cx="7734300" cy="5811838"/>
           </a:xfrm>
+          <a:prstGeom prst="rect">
+            <a:avLst/>
+          </a:prstGeom>
         </p:spPr>
         <p:txBody>
           <a:bodyPr vert="eaVert"/>
@@ -1023,14 +1117,22 @@
             <p:ph type="dt" sz="half" idx="10"/>
           </p:nvPr>
         </p:nvSpPr>
-        <p:spPr/>
+        <p:spPr>
+          <a:xfrm>
+            <a:off x="838200" y="6356350"/>
+            <a:ext cx="2743200" cy="365125"/>
+          </a:xfrm>
+          <a:prstGeom prst="rect">
+            <a:avLst/>
+          </a:prstGeom>
+        </p:spPr>
         <p:txBody>
           <a:bodyPr/>
           <a:lstStyle/>
           <a:p>
             <a:fld id="{C46EF7F6-8777-C24D-B115-3C749887A399}" type="datetimeFigureOut">
               <a:rPr lang="en-GB" smtClean="0"/>
-              <a:t>10/12/2016</a:t>
+              <a:t>10/01/2017</a:t>
             </a:fld>
             <a:endParaRPr lang="en-GB"/>
           </a:p>
@@ -1046,7 +1148,15 @@
             <p:ph type="ftr" sz="quarter" idx="11"/>
           </p:nvPr>
         </p:nvSpPr>
-        <p:spPr/>
+        <p:spPr>
+          <a:xfrm>
+            <a:off x="4038600" y="6356350"/>
+            <a:ext cx="4114800" cy="365125"/>
+          </a:xfrm>
+          <a:prstGeom prst="rect">
+            <a:avLst/>
+          </a:prstGeom>
+        </p:spPr>
         <p:txBody>
           <a:bodyPr/>
           <a:lstStyle/>
@@ -1065,7 +1175,15 @@
             <p:ph type="sldNum" sz="quarter" idx="12"/>
           </p:nvPr>
         </p:nvSpPr>
-        <p:spPr/>
+        <p:spPr>
+          <a:xfrm>
+            <a:off x="8610600" y="6356350"/>
+            <a:ext cx="2743200" cy="365125"/>
+          </a:xfrm>
+          <a:prstGeom prst="rect">
+            <a:avLst/>
+          </a:prstGeom>
+        </p:spPr>
         <p:txBody>
           <a:bodyPr/>
           <a:lstStyle/>
@@ -1118,7 +1236,15 @@
             <p:ph type="title"/>
           </p:nvPr>
         </p:nvSpPr>
-        <p:spPr/>
+        <p:spPr>
+          <a:xfrm>
+            <a:off x="838200" y="365125"/>
+            <a:ext cx="10515600" cy="1325563"/>
+          </a:xfrm>
+          <a:prstGeom prst="rect">
+            <a:avLst/>
+          </a:prstGeom>
+        </p:spPr>
         <p:txBody>
           <a:bodyPr/>
           <a:lstStyle/>
@@ -1141,7 +1267,15 @@
             <p:ph idx="1"/>
           </p:nvPr>
         </p:nvSpPr>
-        <p:spPr/>
+        <p:spPr>
+          <a:xfrm>
+            <a:off x="838200" y="1825625"/>
+            <a:ext cx="10515600" cy="4351338"/>
+          </a:xfrm>
+          <a:prstGeom prst="rect">
+            <a:avLst/>
+          </a:prstGeom>
+        </p:spPr>
         <p:txBody>
           <a:bodyPr/>
           <a:lstStyle/>
@@ -1193,14 +1327,22 @@
             <p:ph type="dt" sz="half" idx="10"/>
           </p:nvPr>
         </p:nvSpPr>
-        <p:spPr/>
+        <p:spPr>
+          <a:xfrm>
+            <a:off x="838200" y="6356350"/>
+            <a:ext cx="2743200" cy="365125"/>
+          </a:xfrm>
+          <a:prstGeom prst="rect">
+            <a:avLst/>
+          </a:prstGeom>
+        </p:spPr>
         <p:txBody>
           <a:bodyPr/>
           <a:lstStyle/>
           <a:p>
             <a:fld id="{C46EF7F6-8777-C24D-B115-3C749887A399}" type="datetimeFigureOut">
               <a:rPr lang="en-GB" smtClean="0"/>
-              <a:t>10/12/2016</a:t>
+              <a:t>10/01/2017</a:t>
             </a:fld>
             <a:endParaRPr lang="en-GB"/>
           </a:p>
@@ -1216,7 +1358,15 @@
             <p:ph type="ftr" sz="quarter" idx="11"/>
           </p:nvPr>
         </p:nvSpPr>
-        <p:spPr/>
+        <p:spPr>
+          <a:xfrm>
+            <a:off x="4038600" y="6356350"/>
+            <a:ext cx="4114800" cy="365125"/>
+          </a:xfrm>
+          <a:prstGeom prst="rect">
+            <a:avLst/>
+          </a:prstGeom>
+        </p:spPr>
         <p:txBody>
           <a:bodyPr/>
           <a:lstStyle/>
@@ -1235,7 +1385,15 @@
             <p:ph type="sldNum" sz="quarter" idx="12"/>
           </p:nvPr>
         </p:nvSpPr>
-        <p:spPr/>
+        <p:spPr>
+          <a:xfrm>
+            <a:off x="8610600" y="6356350"/>
+            <a:ext cx="2743200" cy="365125"/>
+          </a:xfrm>
+          <a:prstGeom prst="rect">
+            <a:avLst/>
+          </a:prstGeom>
+        </p:spPr>
         <p:txBody>
           <a:bodyPr/>
           <a:lstStyle/>
@@ -1258,6 +1416,13 @@
   <p:clrMapOvr>
     <a:masterClrMapping/>
   </p:clrMapOvr>
+  <p:timing>
+    <p:tnLst>
+      <p:par>
+        <p:cTn id="1" dur="indefinite" restart="never" nodeType="tmRoot"/>
+      </p:par>
+    </p:tnLst>
+  </p:timing>
 </p:sldLayout>
 </file>
 
@@ -1293,6 +1458,9 @@
             <a:off x="831850" y="1709738"/>
             <a:ext cx="10515600" cy="2852737"/>
           </a:xfrm>
+          <a:prstGeom prst="rect">
+            <a:avLst/>
+          </a:prstGeom>
         </p:spPr>
         <p:txBody>
           <a:bodyPr anchor="b"/>
@@ -1325,6 +1493,9 @@
             <a:off x="831850" y="4589463"/>
             <a:ext cx="10515600" cy="1500187"/>
           </a:xfrm>
+          <a:prstGeom prst="rect">
+            <a:avLst/>
+          </a:prstGeom>
         </p:spPr>
         <p:txBody>
           <a:bodyPr/>
@@ -1439,14 +1610,22 @@
             <p:ph type="dt" sz="half" idx="10"/>
           </p:nvPr>
         </p:nvSpPr>
-        <p:spPr/>
+        <p:spPr>
+          <a:xfrm>
+            <a:off x="838200" y="6356350"/>
+            <a:ext cx="2743200" cy="365125"/>
+          </a:xfrm>
+          <a:prstGeom prst="rect">
+            <a:avLst/>
+          </a:prstGeom>
+        </p:spPr>
         <p:txBody>
           <a:bodyPr/>
           <a:lstStyle/>
           <a:p>
             <a:fld id="{C46EF7F6-8777-C24D-B115-3C749887A399}" type="datetimeFigureOut">
               <a:rPr lang="en-GB" smtClean="0"/>
-              <a:t>10/12/2016</a:t>
+              <a:t>10/01/2017</a:t>
             </a:fld>
             <a:endParaRPr lang="en-GB"/>
           </a:p>
@@ -1462,7 +1641,15 @@
             <p:ph type="ftr" sz="quarter" idx="11"/>
           </p:nvPr>
         </p:nvSpPr>
-        <p:spPr/>
+        <p:spPr>
+          <a:xfrm>
+            <a:off x="4038600" y="6356350"/>
+            <a:ext cx="4114800" cy="365125"/>
+          </a:xfrm>
+          <a:prstGeom prst="rect">
+            <a:avLst/>
+          </a:prstGeom>
+        </p:spPr>
         <p:txBody>
           <a:bodyPr/>
           <a:lstStyle/>
@@ -1481,7 +1668,15 @@
             <p:ph type="sldNum" sz="quarter" idx="12"/>
           </p:nvPr>
         </p:nvSpPr>
-        <p:spPr/>
+        <p:spPr>
+          <a:xfrm>
+            <a:off x="8610600" y="6356350"/>
+            <a:ext cx="2743200" cy="365125"/>
+          </a:xfrm>
+          <a:prstGeom prst="rect">
+            <a:avLst/>
+          </a:prstGeom>
+        </p:spPr>
         <p:txBody>
           <a:bodyPr/>
           <a:lstStyle/>
@@ -1504,6 +1699,13 @@
   <p:clrMapOvr>
     <a:masterClrMapping/>
   </p:clrMapOvr>
+  <p:timing>
+    <p:tnLst>
+      <p:par>
+        <p:cTn id="1" dur="indefinite" restart="never" nodeType="tmRoot"/>
+      </p:par>
+    </p:tnLst>
+  </p:timing>
 </p:sldLayout>
 </file>
 
@@ -1534,7 +1736,15 @@
             <p:ph type="title"/>
           </p:nvPr>
         </p:nvSpPr>
-        <p:spPr/>
+        <p:spPr>
+          <a:xfrm>
+            <a:off x="838200" y="365125"/>
+            <a:ext cx="10515600" cy="1325563"/>
+          </a:xfrm>
+          <a:prstGeom prst="rect">
+            <a:avLst/>
+          </a:prstGeom>
+        </p:spPr>
         <p:txBody>
           <a:bodyPr/>
           <a:lstStyle/>
@@ -1562,6 +1772,9 @@
             <a:off x="838200" y="1825625"/>
             <a:ext cx="5181600" cy="4351338"/>
           </a:xfrm>
+          <a:prstGeom prst="rect">
+            <a:avLst/>
+          </a:prstGeom>
         </p:spPr>
         <p:txBody>
           <a:bodyPr/>
@@ -1619,6 +1832,9 @@
             <a:off x="6172200" y="1825625"/>
             <a:ext cx="5181600" cy="4351338"/>
           </a:xfrm>
+          <a:prstGeom prst="rect">
+            <a:avLst/>
+          </a:prstGeom>
         </p:spPr>
         <p:txBody>
           <a:bodyPr/>
@@ -1671,14 +1887,22 @@
             <p:ph type="dt" sz="half" idx="10"/>
           </p:nvPr>
         </p:nvSpPr>
-        <p:spPr/>
+        <p:spPr>
+          <a:xfrm>
+            <a:off x="838200" y="6356350"/>
+            <a:ext cx="2743200" cy="365125"/>
+          </a:xfrm>
+          <a:prstGeom prst="rect">
+            <a:avLst/>
+          </a:prstGeom>
+        </p:spPr>
         <p:txBody>
           <a:bodyPr/>
           <a:lstStyle/>
           <a:p>
             <a:fld id="{C46EF7F6-8777-C24D-B115-3C749887A399}" type="datetimeFigureOut">
               <a:rPr lang="en-GB" smtClean="0"/>
-              <a:t>10/12/2016</a:t>
+              <a:t>10/01/2017</a:t>
             </a:fld>
             <a:endParaRPr lang="en-GB"/>
           </a:p>
@@ -1694,7 +1918,15 @@
             <p:ph type="ftr" sz="quarter" idx="11"/>
           </p:nvPr>
         </p:nvSpPr>
-        <p:spPr/>
+        <p:spPr>
+          <a:xfrm>
+            <a:off x="4038600" y="6356350"/>
+            <a:ext cx="4114800" cy="365125"/>
+          </a:xfrm>
+          <a:prstGeom prst="rect">
+            <a:avLst/>
+          </a:prstGeom>
+        </p:spPr>
         <p:txBody>
           <a:bodyPr/>
           <a:lstStyle/>
@@ -1713,7 +1945,15 @@
             <p:ph type="sldNum" sz="quarter" idx="12"/>
           </p:nvPr>
         </p:nvSpPr>
-        <p:spPr/>
+        <p:spPr>
+          <a:xfrm>
+            <a:off x="8610600" y="6356350"/>
+            <a:ext cx="2743200" cy="365125"/>
+          </a:xfrm>
+          <a:prstGeom prst="rect">
+            <a:avLst/>
+          </a:prstGeom>
+        </p:spPr>
         <p:txBody>
           <a:bodyPr/>
           <a:lstStyle/>
@@ -1736,6 +1976,13 @@
   <p:clrMapOvr>
     <a:masterClrMapping/>
   </p:clrMapOvr>
+  <p:timing>
+    <p:tnLst>
+      <p:par>
+        <p:cTn id="1" dur="indefinite" restart="never" nodeType="tmRoot"/>
+      </p:par>
+    </p:tnLst>
+  </p:timing>
 </p:sldLayout>
 </file>
 
@@ -1771,6 +2018,9 @@
             <a:off x="839788" y="365125"/>
             <a:ext cx="10515600" cy="1325563"/>
           </a:xfrm>
+          <a:prstGeom prst="rect">
+            <a:avLst/>
+          </a:prstGeom>
         </p:spPr>
         <p:txBody>
           <a:bodyPr/>
@@ -1799,6 +2049,9 @@
             <a:off x="839788" y="1681163"/>
             <a:ext cx="5157787" cy="823912"/>
           </a:xfrm>
+          <a:prstGeom prst="rect">
+            <a:avLst/>
+          </a:prstGeom>
         </p:spPr>
         <p:txBody>
           <a:bodyPr anchor="b"/>
@@ -1864,6 +2117,9 @@
             <a:off x="839788" y="2505075"/>
             <a:ext cx="5157787" cy="3684588"/>
           </a:xfrm>
+          <a:prstGeom prst="rect">
+            <a:avLst/>
+          </a:prstGeom>
         </p:spPr>
         <p:txBody>
           <a:bodyPr/>
@@ -1921,6 +2177,9 @@
             <a:off x="6172200" y="1681163"/>
             <a:ext cx="5183188" cy="823912"/>
           </a:xfrm>
+          <a:prstGeom prst="rect">
+            <a:avLst/>
+          </a:prstGeom>
         </p:spPr>
         <p:txBody>
           <a:bodyPr anchor="b"/>
@@ -1986,6 +2245,9 @@
             <a:off x="6172200" y="2505075"/>
             <a:ext cx="5183188" cy="3684588"/>
           </a:xfrm>
+          <a:prstGeom prst="rect">
+            <a:avLst/>
+          </a:prstGeom>
         </p:spPr>
         <p:txBody>
           <a:bodyPr/>
@@ -2038,14 +2300,22 @@
             <p:ph type="dt" sz="half" idx="10"/>
           </p:nvPr>
         </p:nvSpPr>
-        <p:spPr/>
+        <p:spPr>
+          <a:xfrm>
+            <a:off x="838200" y="6356350"/>
+            <a:ext cx="2743200" cy="365125"/>
+          </a:xfrm>
+          <a:prstGeom prst="rect">
+            <a:avLst/>
+          </a:prstGeom>
+        </p:spPr>
         <p:txBody>
           <a:bodyPr/>
           <a:lstStyle/>
           <a:p>
             <a:fld id="{C46EF7F6-8777-C24D-B115-3C749887A399}" type="datetimeFigureOut">
               <a:rPr lang="en-GB" smtClean="0"/>
-              <a:t>10/12/2016</a:t>
+              <a:t>10/01/2017</a:t>
             </a:fld>
             <a:endParaRPr lang="en-GB"/>
           </a:p>
@@ -2061,7 +2331,15 @@
             <p:ph type="ftr" sz="quarter" idx="11"/>
           </p:nvPr>
         </p:nvSpPr>
-        <p:spPr/>
+        <p:spPr>
+          <a:xfrm>
+            <a:off x="4038600" y="6356350"/>
+            <a:ext cx="4114800" cy="365125"/>
+          </a:xfrm>
+          <a:prstGeom prst="rect">
+            <a:avLst/>
+          </a:prstGeom>
+        </p:spPr>
         <p:txBody>
           <a:bodyPr/>
           <a:lstStyle/>
@@ -2080,7 +2358,15 @@
             <p:ph type="sldNum" sz="quarter" idx="12"/>
           </p:nvPr>
         </p:nvSpPr>
-        <p:spPr/>
+        <p:spPr>
+          <a:xfrm>
+            <a:off x="8610600" y="6356350"/>
+            <a:ext cx="2743200" cy="365125"/>
+          </a:xfrm>
+          <a:prstGeom prst="rect">
+            <a:avLst/>
+          </a:prstGeom>
+        </p:spPr>
         <p:txBody>
           <a:bodyPr/>
           <a:lstStyle/>
@@ -2103,6 +2389,13 @@
   <p:clrMapOvr>
     <a:masterClrMapping/>
   </p:clrMapOvr>
+  <p:timing>
+    <p:tnLst>
+      <p:par>
+        <p:cTn id="1" dur="indefinite" restart="never" nodeType="tmRoot"/>
+      </p:par>
+    </p:tnLst>
+  </p:timing>
 </p:sldLayout>
 </file>
 
@@ -2133,7 +2426,15 @@
             <p:ph type="title"/>
           </p:nvPr>
         </p:nvSpPr>
-        <p:spPr/>
+        <p:spPr>
+          <a:xfrm>
+            <a:off x="838200" y="365125"/>
+            <a:ext cx="10515600" cy="1325563"/>
+          </a:xfrm>
+          <a:prstGeom prst="rect">
+            <a:avLst/>
+          </a:prstGeom>
+        </p:spPr>
         <p:txBody>
           <a:bodyPr/>
           <a:lstStyle/>
@@ -2156,14 +2457,22 @@
             <p:ph type="dt" sz="half" idx="10"/>
           </p:nvPr>
         </p:nvSpPr>
-        <p:spPr/>
+        <p:spPr>
+          <a:xfrm>
+            <a:off x="838200" y="6356350"/>
+            <a:ext cx="2743200" cy="365125"/>
+          </a:xfrm>
+          <a:prstGeom prst="rect">
+            <a:avLst/>
+          </a:prstGeom>
+        </p:spPr>
         <p:txBody>
           <a:bodyPr/>
           <a:lstStyle/>
           <a:p>
             <a:fld id="{C46EF7F6-8777-C24D-B115-3C749887A399}" type="datetimeFigureOut">
               <a:rPr lang="en-GB" smtClean="0"/>
-              <a:t>10/12/2016</a:t>
+              <a:t>10/01/2017</a:t>
             </a:fld>
             <a:endParaRPr lang="en-GB"/>
           </a:p>
@@ -2179,7 +2488,15 @@
             <p:ph type="ftr" sz="quarter" idx="11"/>
           </p:nvPr>
         </p:nvSpPr>
-        <p:spPr/>
+        <p:spPr>
+          <a:xfrm>
+            <a:off x="4038600" y="6356350"/>
+            <a:ext cx="4114800" cy="365125"/>
+          </a:xfrm>
+          <a:prstGeom prst="rect">
+            <a:avLst/>
+          </a:prstGeom>
+        </p:spPr>
         <p:txBody>
           <a:bodyPr/>
           <a:lstStyle/>
@@ -2198,7 +2515,15 @@
             <p:ph type="sldNum" sz="quarter" idx="12"/>
           </p:nvPr>
         </p:nvSpPr>
-        <p:spPr/>
+        <p:spPr>
+          <a:xfrm>
+            <a:off x="8610600" y="6356350"/>
+            <a:ext cx="2743200" cy="365125"/>
+          </a:xfrm>
+          <a:prstGeom prst="rect">
+            <a:avLst/>
+          </a:prstGeom>
+        </p:spPr>
         <p:txBody>
           <a:bodyPr/>
           <a:lstStyle/>
@@ -2221,6 +2546,13 @@
   <p:clrMapOvr>
     <a:masterClrMapping/>
   </p:clrMapOvr>
+  <p:timing>
+    <p:tnLst>
+      <p:par>
+        <p:cTn id="1" dur="indefinite" restart="never" nodeType="tmRoot"/>
+      </p:par>
+    </p:tnLst>
+  </p:timing>
 </p:sldLayout>
 </file>
 
@@ -2251,14 +2583,22 @@
             <p:ph type="dt" sz="half" idx="10"/>
           </p:nvPr>
         </p:nvSpPr>
-        <p:spPr/>
+        <p:spPr>
+          <a:xfrm>
+            <a:off x="838200" y="6356350"/>
+            <a:ext cx="2743200" cy="365125"/>
+          </a:xfrm>
+          <a:prstGeom prst="rect">
+            <a:avLst/>
+          </a:prstGeom>
+        </p:spPr>
         <p:txBody>
           <a:bodyPr/>
           <a:lstStyle/>
           <a:p>
             <a:fld id="{C46EF7F6-8777-C24D-B115-3C749887A399}" type="datetimeFigureOut">
               <a:rPr lang="en-GB" smtClean="0"/>
-              <a:t>10/12/2016</a:t>
+              <a:t>10/01/2017</a:t>
             </a:fld>
             <a:endParaRPr lang="en-GB"/>
           </a:p>
@@ -2274,7 +2614,15 @@
             <p:ph type="ftr" sz="quarter" idx="11"/>
           </p:nvPr>
         </p:nvSpPr>
-        <p:spPr/>
+        <p:spPr>
+          <a:xfrm>
+            <a:off x="4038600" y="6356350"/>
+            <a:ext cx="4114800" cy="365125"/>
+          </a:xfrm>
+          <a:prstGeom prst="rect">
+            <a:avLst/>
+          </a:prstGeom>
+        </p:spPr>
         <p:txBody>
           <a:bodyPr/>
           <a:lstStyle/>
@@ -2293,7 +2641,15 @@
             <p:ph type="sldNum" sz="quarter" idx="12"/>
           </p:nvPr>
         </p:nvSpPr>
-        <p:spPr/>
+        <p:spPr>
+          <a:xfrm>
+            <a:off x="8610600" y="6356350"/>
+            <a:ext cx="2743200" cy="365125"/>
+          </a:xfrm>
+          <a:prstGeom prst="rect">
+            <a:avLst/>
+          </a:prstGeom>
+        </p:spPr>
         <p:txBody>
           <a:bodyPr/>
           <a:lstStyle/>
@@ -2316,6 +2672,13 @@
   <p:clrMapOvr>
     <a:masterClrMapping/>
   </p:clrMapOvr>
+  <p:timing>
+    <p:tnLst>
+      <p:par>
+        <p:cTn id="1" dur="indefinite" restart="never" nodeType="tmRoot"/>
+      </p:par>
+    </p:tnLst>
+  </p:timing>
 </p:sldLayout>
 </file>
 
@@ -2351,6 +2714,9 @@
             <a:off x="839788" y="457200"/>
             <a:ext cx="3932237" cy="1600200"/>
           </a:xfrm>
+          <a:prstGeom prst="rect">
+            <a:avLst/>
+          </a:prstGeom>
         </p:spPr>
         <p:txBody>
           <a:bodyPr anchor="b"/>
@@ -2383,6 +2749,9 @@
             <a:off x="5183188" y="987425"/>
             <a:ext cx="6172200" cy="4873625"/>
           </a:xfrm>
+          <a:prstGeom prst="rect">
+            <a:avLst/>
+          </a:prstGeom>
         </p:spPr>
         <p:txBody>
           <a:bodyPr/>
@@ -2468,6 +2837,9 @@
             <a:off x="839788" y="2057400"/>
             <a:ext cx="3932237" cy="3811588"/>
           </a:xfrm>
+          <a:prstGeom prst="rect">
+            <a:avLst/>
+          </a:prstGeom>
         </p:spPr>
         <p:txBody>
           <a:bodyPr/>
@@ -2528,14 +2900,22 @@
             <p:ph type="dt" sz="half" idx="10"/>
           </p:nvPr>
         </p:nvSpPr>
-        <p:spPr/>
+        <p:spPr>
+          <a:xfrm>
+            <a:off x="838200" y="6356350"/>
+            <a:ext cx="2743200" cy="365125"/>
+          </a:xfrm>
+          <a:prstGeom prst="rect">
+            <a:avLst/>
+          </a:prstGeom>
+        </p:spPr>
         <p:txBody>
           <a:bodyPr/>
           <a:lstStyle/>
           <a:p>
             <a:fld id="{C46EF7F6-8777-C24D-B115-3C749887A399}" type="datetimeFigureOut">
               <a:rPr lang="en-GB" smtClean="0"/>
-              <a:t>10/12/2016</a:t>
+              <a:t>10/01/2017</a:t>
             </a:fld>
             <a:endParaRPr lang="en-GB"/>
           </a:p>
@@ -2551,7 +2931,15 @@
             <p:ph type="ftr" sz="quarter" idx="11"/>
           </p:nvPr>
         </p:nvSpPr>
-        <p:spPr/>
+        <p:spPr>
+          <a:xfrm>
+            <a:off x="4038600" y="6356350"/>
+            <a:ext cx="4114800" cy="365125"/>
+          </a:xfrm>
+          <a:prstGeom prst="rect">
+            <a:avLst/>
+          </a:prstGeom>
+        </p:spPr>
         <p:txBody>
           <a:bodyPr/>
           <a:lstStyle/>
@@ -2570,7 +2958,15 @@
             <p:ph type="sldNum" sz="quarter" idx="12"/>
           </p:nvPr>
         </p:nvSpPr>
-        <p:spPr/>
+        <p:spPr>
+          <a:xfrm>
+            <a:off x="8610600" y="6356350"/>
+            <a:ext cx="2743200" cy="365125"/>
+          </a:xfrm>
+          <a:prstGeom prst="rect">
+            <a:avLst/>
+          </a:prstGeom>
+        </p:spPr>
         <p:txBody>
           <a:bodyPr/>
           <a:lstStyle/>
@@ -2593,6 +2989,13 @@
   <p:clrMapOvr>
     <a:masterClrMapping/>
   </p:clrMapOvr>
+  <p:timing>
+    <p:tnLst>
+      <p:par>
+        <p:cTn id="1" dur="indefinite" restart="never" nodeType="tmRoot"/>
+      </p:par>
+    </p:tnLst>
+  </p:timing>
 </p:sldLayout>
 </file>
 
@@ -2628,6 +3031,9 @@
             <a:off x="839788" y="457200"/>
             <a:ext cx="3932237" cy="1600200"/>
           </a:xfrm>
+          <a:prstGeom prst="rect">
+            <a:avLst/>
+          </a:prstGeom>
         </p:spPr>
         <p:txBody>
           <a:bodyPr anchor="b"/>
@@ -2660,6 +3066,9 @@
             <a:off x="5183188" y="987425"/>
             <a:ext cx="6172200" cy="4873625"/>
           </a:xfrm>
+          <a:prstGeom prst="rect">
+            <a:avLst/>
+          </a:prstGeom>
         </p:spPr>
         <p:txBody>
           <a:bodyPr/>
@@ -2721,6 +3130,9 @@
             <a:off x="839788" y="2057400"/>
             <a:ext cx="3932237" cy="3811588"/>
           </a:xfrm>
+          <a:prstGeom prst="rect">
+            <a:avLst/>
+          </a:prstGeom>
         </p:spPr>
         <p:txBody>
           <a:bodyPr/>
@@ -2781,14 +3193,22 @@
             <p:ph type="dt" sz="half" idx="10"/>
           </p:nvPr>
         </p:nvSpPr>
-        <p:spPr/>
+        <p:spPr>
+          <a:xfrm>
+            <a:off x="838200" y="6356350"/>
+            <a:ext cx="2743200" cy="365125"/>
+          </a:xfrm>
+          <a:prstGeom prst="rect">
+            <a:avLst/>
+          </a:prstGeom>
+        </p:spPr>
         <p:txBody>
           <a:bodyPr/>
           <a:lstStyle/>
           <a:p>
             <a:fld id="{C46EF7F6-8777-C24D-B115-3C749887A399}" type="datetimeFigureOut">
               <a:rPr lang="en-GB" smtClean="0"/>
-              <a:t>10/12/2016</a:t>
+              <a:t>10/01/2017</a:t>
             </a:fld>
             <a:endParaRPr lang="en-GB"/>
           </a:p>
@@ -2804,7 +3224,15 @@
             <p:ph type="ftr" sz="quarter" idx="11"/>
           </p:nvPr>
         </p:nvSpPr>
-        <p:spPr/>
+        <p:spPr>
+          <a:xfrm>
+            <a:off x="4038600" y="6356350"/>
+            <a:ext cx="4114800" cy="365125"/>
+          </a:xfrm>
+          <a:prstGeom prst="rect">
+            <a:avLst/>
+          </a:prstGeom>
+        </p:spPr>
         <p:txBody>
           <a:bodyPr/>
           <a:lstStyle/>
@@ -2823,7 +3251,15 @@
             <p:ph type="sldNum" sz="quarter" idx="12"/>
           </p:nvPr>
         </p:nvSpPr>
-        <p:spPr/>
+        <p:spPr>
+          <a:xfrm>
+            <a:off x="8610600" y="6356350"/>
+            <a:ext cx="2743200" cy="365125"/>
+          </a:xfrm>
+          <a:prstGeom prst="rect">
+            <a:avLst/>
+          </a:prstGeom>
+        </p:spPr>
         <p:txBody>
           <a:bodyPr/>
           <a:lstStyle/>
@@ -2873,215 +3309,49 @@
       </p:grpSpPr>
       <p:sp>
         <p:nvSpPr>
-          <p:cNvPr id="2" name="Title Placeholder 1"/>
-          <p:cNvSpPr>
-            <a:spLocks noGrp="1"/>
-          </p:cNvSpPr>
-          <p:nvPr>
-            <p:ph type="title"/>
-          </p:nvPr>
-        </p:nvSpPr>
-        <p:spPr>
-          <a:xfrm>
-            <a:off x="838200" y="365125"/>
-            <a:ext cx="10515600" cy="1325563"/>
+          <p:cNvPr id="7" name="Rectangle 6"/>
+          <p:cNvSpPr/>
+          <p:nvPr userDrawn="1"/>
+        </p:nvSpPr>
+        <p:spPr>
+          <a:xfrm>
+            <a:off x="0" y="-1"/>
+            <a:ext cx="12192000" cy="8592457"/>
           </a:xfrm>
           <a:prstGeom prst="rect">
             <a:avLst/>
           </a:prstGeom>
-        </p:spPr>
-        <p:txBody>
-          <a:bodyPr vert="horz" lIns="91440" tIns="45720" rIns="91440" bIns="45720" rtlCol="0" anchor="ctr">
-            <a:normAutofit/>
-          </a:bodyPr>
-          <a:lstStyle/>
-          <a:p>
-            <a:r>
-              <a:rPr lang="en-US" smtClean="0"/>
-              <a:t>Click to edit Master title style</a:t>
-            </a:r>
-            <a:endParaRPr lang="en-GB"/>
-          </a:p>
-        </p:txBody>
-      </p:sp>
-      <p:sp>
-        <p:nvSpPr>
-          <p:cNvPr id="3" name="Text Placeholder 2"/>
-          <p:cNvSpPr>
-            <a:spLocks noGrp="1"/>
-          </p:cNvSpPr>
-          <p:nvPr>
-            <p:ph type="body" idx="1"/>
-          </p:nvPr>
-        </p:nvSpPr>
-        <p:spPr>
-          <a:xfrm>
-            <a:off x="838200" y="1825625"/>
-            <a:ext cx="10515600" cy="4351338"/>
-          </a:xfrm>
-          <a:prstGeom prst="rect">
-            <a:avLst/>
-          </a:prstGeom>
-        </p:spPr>
-        <p:txBody>
-          <a:bodyPr vert="horz" lIns="91440" tIns="45720" rIns="91440" bIns="45720" rtlCol="0">
-            <a:normAutofit/>
-          </a:bodyPr>
-          <a:lstStyle/>
-          <a:p>
-            <a:pPr lvl="0"/>
-            <a:r>
-              <a:rPr lang="en-US" smtClean="0"/>
-              <a:t>Click to edit Master text styles</a:t>
-            </a:r>
-          </a:p>
-          <a:p>
-            <a:pPr lvl="1"/>
-            <a:r>
-              <a:rPr lang="en-US" smtClean="0"/>
-              <a:t>Second level</a:t>
-            </a:r>
-          </a:p>
-          <a:p>
-            <a:pPr lvl="2"/>
-            <a:r>
-              <a:rPr lang="en-US" smtClean="0"/>
-              <a:t>Third level</a:t>
-            </a:r>
-          </a:p>
-          <a:p>
-            <a:pPr lvl="3"/>
-            <a:r>
-              <a:rPr lang="en-US" smtClean="0"/>
-              <a:t>Fourth level</a:t>
-            </a:r>
-          </a:p>
-          <a:p>
-            <a:pPr lvl="4"/>
-            <a:r>
-              <a:rPr lang="en-US" smtClean="0"/>
-              <a:t>Fifth level</a:t>
-            </a:r>
-            <a:endParaRPr lang="en-GB"/>
-          </a:p>
-        </p:txBody>
-      </p:sp>
-      <p:sp>
-        <p:nvSpPr>
-          <p:cNvPr id="4" name="Date Placeholder 3"/>
-          <p:cNvSpPr>
-            <a:spLocks noGrp="1"/>
-          </p:cNvSpPr>
-          <p:nvPr>
-            <p:ph type="dt" sz="half" idx="2"/>
-          </p:nvPr>
-        </p:nvSpPr>
-        <p:spPr>
-          <a:xfrm>
-            <a:off x="838200" y="6356350"/>
-            <a:ext cx="2743200" cy="365125"/>
-          </a:xfrm>
-          <a:prstGeom prst="rect">
-            <a:avLst/>
-          </a:prstGeom>
-        </p:spPr>
-        <p:txBody>
-          <a:bodyPr vert="horz" lIns="91440" tIns="45720" rIns="91440" bIns="45720" rtlCol="0" anchor="ctr"/>
-          <a:lstStyle>
-            <a:lvl1pPr algn="l">
-              <a:defRPr sz="1200">
-                <a:solidFill>
-                  <a:schemeClr val="tx1">
-                    <a:tint val="75000"/>
-                  </a:schemeClr>
-                </a:solidFill>
-              </a:defRPr>
-            </a:lvl1pPr>
-          </a:lstStyle>
-          <a:p>
-            <a:fld id="{C46EF7F6-8777-C24D-B115-3C749887A399}" type="datetimeFigureOut">
-              <a:rPr lang="en-GB" smtClean="0"/>
-              <a:t>10/12/2016</a:t>
-            </a:fld>
-            <a:endParaRPr lang="en-GB"/>
-          </a:p>
-        </p:txBody>
-      </p:sp>
-      <p:sp>
-        <p:nvSpPr>
-          <p:cNvPr id="5" name="Footer Placeholder 4"/>
-          <p:cNvSpPr>
-            <a:spLocks noGrp="1"/>
-          </p:cNvSpPr>
-          <p:nvPr>
-            <p:ph type="ftr" sz="quarter" idx="3"/>
-          </p:nvPr>
-        </p:nvSpPr>
-        <p:spPr>
-          <a:xfrm>
-            <a:off x="4038600" y="6356350"/>
-            <a:ext cx="4114800" cy="365125"/>
-          </a:xfrm>
-          <a:prstGeom prst="rect">
-            <a:avLst/>
-          </a:prstGeom>
-        </p:spPr>
-        <p:txBody>
-          <a:bodyPr vert="horz" lIns="91440" tIns="45720" rIns="91440" bIns="45720" rtlCol="0" anchor="ctr"/>
-          <a:lstStyle>
-            <a:lvl1pPr algn="ctr">
-              <a:defRPr sz="1200">
-                <a:solidFill>
-                  <a:schemeClr val="tx1">
-                    <a:tint val="75000"/>
-                  </a:schemeClr>
-                </a:solidFill>
-              </a:defRPr>
-            </a:lvl1pPr>
-          </a:lstStyle>
-          <a:p>
-            <a:endParaRPr lang="en-GB"/>
-          </a:p>
-        </p:txBody>
-      </p:sp>
-      <p:sp>
-        <p:nvSpPr>
-          <p:cNvPr id="6" name="Slide Number Placeholder 5"/>
-          <p:cNvSpPr>
-            <a:spLocks noGrp="1"/>
-          </p:cNvSpPr>
-          <p:nvPr>
-            <p:ph type="sldNum" sz="quarter" idx="4"/>
-          </p:nvPr>
-        </p:nvSpPr>
-        <p:spPr>
-          <a:xfrm>
-            <a:off x="8610600" y="6356350"/>
-            <a:ext cx="2743200" cy="365125"/>
-          </a:xfrm>
-          <a:prstGeom prst="rect">
-            <a:avLst/>
-          </a:prstGeom>
-        </p:spPr>
-        <p:txBody>
-          <a:bodyPr vert="horz" lIns="91440" tIns="45720" rIns="91440" bIns="45720" rtlCol="0" anchor="ctr"/>
-          <a:lstStyle>
-            <a:lvl1pPr algn="r">
-              <a:defRPr sz="1200">
-                <a:solidFill>
-                  <a:schemeClr val="tx1">
-                    <a:tint val="75000"/>
-                  </a:schemeClr>
-                </a:solidFill>
-              </a:defRPr>
-            </a:lvl1pPr>
-          </a:lstStyle>
-          <a:p>
-            <a:fld id="{8F202480-EE33-054F-869F-D938168B20DC}" type="slidenum">
-              <a:rPr lang="en-GB" smtClean="0"/>
-              <a:t>‹#›</a:t>
-            </a:fld>
-            <a:endParaRPr lang="en-GB"/>
+          <a:solidFill>
+            <a:schemeClr val="bg1"/>
+          </a:solidFill>
+          <a:ln>
+            <a:solidFill>
+              <a:schemeClr val="tx1"/>
+            </a:solidFill>
+          </a:ln>
+        </p:spPr>
+        <p:style>
+          <a:lnRef idx="2">
+            <a:schemeClr val="accent1">
+              <a:shade val="50000"/>
+            </a:schemeClr>
+          </a:lnRef>
+          <a:fillRef idx="1">
+            <a:schemeClr val="accent1"/>
+          </a:fillRef>
+          <a:effectRef idx="0">
+            <a:schemeClr val="accent1"/>
+          </a:effectRef>
+          <a:fontRef idx="minor">
+            <a:schemeClr val="lt1"/>
+          </a:fontRef>
+        </p:style>
+        <p:txBody>
+          <a:bodyPr rtlCol="0" anchor="ctr"/>
+          <a:lstStyle/>
+          <a:p>
+            <a:pPr algn="ctr"/>
+            <a:endParaRPr lang="de-CH"/>
           </a:p>
         </p:txBody>
       </p:sp>
@@ -3106,6 +3376,13 @@
     <p:sldLayoutId id="2147483658" r:id="rId10"/>
     <p:sldLayoutId id="2147483659" r:id="rId11"/>
   </p:sldLayoutIdLst>
+  <p:timing>
+    <p:tnLst>
+      <p:par>
+        <p:cTn id="1" dur="indefinite" restart="never" nodeType="tmRoot"/>
+      </p:par>
+    </p:tnLst>
+  </p:timing>
   <p:txStyles>
     <p:titleStyle>
       <a:lvl1pPr algn="l" defTabSz="914400" rtl="0" eaLnBrk="1" latinLnBrk="0" hangingPunct="1">
@@ -3414,7 +3691,7 @@
         </p:nvSpPr>
         <p:spPr>
           <a:xfrm>
-            <a:off x="307141" y="516590"/>
+            <a:off x="295845" y="356304"/>
             <a:ext cx="1169894" cy="497541"/>
           </a:xfrm>
           <a:prstGeom prst="roundRect">
@@ -3469,7 +3746,7 @@
         </p:nvSpPr>
         <p:spPr>
           <a:xfrm>
-            <a:off x="307141" y="1534029"/>
+            <a:off x="295845" y="1373743"/>
             <a:ext cx="1169894" cy="497541"/>
           </a:xfrm>
           <a:prstGeom prst="roundRect">
@@ -3524,7 +3801,7 @@
         </p:nvSpPr>
         <p:spPr>
           <a:xfrm>
-            <a:off x="309283" y="2704584"/>
+            <a:off x="295845" y="2544298"/>
             <a:ext cx="1169894" cy="497541"/>
           </a:xfrm>
           <a:prstGeom prst="roundRect">
@@ -3579,22 +3856,25 @@
         </p:nvSpPr>
         <p:spPr>
           <a:xfrm>
-            <a:off x="307141" y="3875139"/>
+            <a:off x="295845" y="3865275"/>
             <a:ext cx="1169894" cy="497541"/>
           </a:xfrm>
           <a:prstGeom prst="roundRect">
             <a:avLst/>
           </a:prstGeom>
+          <a:solidFill>
+            <a:srgbClr val="FFEEE5"/>
+          </a:solidFill>
         </p:spPr>
         <p:style>
           <a:lnRef idx="1">
-            <a:schemeClr val="accent3"/>
+            <a:schemeClr val="accent2"/>
           </a:lnRef>
           <a:fillRef idx="2">
-            <a:schemeClr val="accent3"/>
+            <a:schemeClr val="accent2"/>
           </a:fillRef>
           <a:effectRef idx="1">
-            <a:schemeClr val="accent3"/>
+            <a:schemeClr val="accent2"/>
           </a:effectRef>
           <a:fontRef idx="minor">
             <a:schemeClr val="dk1"/>
@@ -3621,8 +3901,8 @@
         </p:nvSpPr>
         <p:spPr>
           <a:xfrm>
-            <a:off x="1705535" y="235323"/>
-            <a:ext cx="4384603" cy="1060077"/>
+            <a:off x="1694239" y="75037"/>
+            <a:ext cx="4973261" cy="1060077"/>
           </a:xfrm>
           <a:prstGeom prst="roundRect">
             <a:avLst/>
@@ -3673,7 +3953,7 @@
         </p:nvSpPr>
         <p:spPr>
           <a:xfrm>
-            <a:off x="1808630" y="361948"/>
+            <a:off x="1797334" y="201662"/>
             <a:ext cx="1241611" cy="244289"/>
           </a:xfrm>
           <a:prstGeom prst="roundRect">
@@ -3720,7 +4000,7 @@
         </p:nvSpPr>
         <p:spPr>
           <a:xfrm>
-            <a:off x="3195917" y="361946"/>
+            <a:off x="3555991" y="201660"/>
             <a:ext cx="1241611" cy="244289"/>
           </a:xfrm>
           <a:prstGeom prst="roundRect">
@@ -3767,7 +4047,7 @@
         </p:nvSpPr>
         <p:spPr>
           <a:xfrm>
-            <a:off x="4583205" y="361946"/>
+            <a:off x="5314648" y="201660"/>
             <a:ext cx="1241611" cy="244289"/>
           </a:xfrm>
           <a:prstGeom prst="roundRect">
@@ -3817,8 +4097,8 @@
         </p:nvCxnSpPr>
         <p:spPr>
           <a:xfrm flipV="1">
-            <a:off x="3050241" y="484091"/>
-            <a:ext cx="145676" cy="2"/>
+            <a:off x="3038945" y="323805"/>
+            <a:ext cx="517046" cy="2"/>
           </a:xfrm>
           <a:prstGeom prst="straightConnector1">
             <a:avLst/>
@@ -3853,8 +4133,8 @@
         </p:nvCxnSpPr>
         <p:spPr>
           <a:xfrm>
-            <a:off x="4437528" y="484091"/>
-            <a:ext cx="145677" cy="0"/>
+            <a:off x="4797602" y="323805"/>
+            <a:ext cx="517046" cy="0"/>
           </a:xfrm>
           <a:prstGeom prst="straightConnector1">
             <a:avLst/>
@@ -3886,7 +4166,7 @@
         </p:nvSpPr>
         <p:spPr>
           <a:xfrm>
-            <a:off x="4583205" y="832504"/>
+            <a:off x="1797330" y="693315"/>
             <a:ext cx="1241611" cy="244289"/>
           </a:xfrm>
           <a:prstGeom prst="roundRect">
@@ -3943,12 +4223,14 @@
           <p:nvPr/>
         </p:nvCxnSpPr>
         <p:spPr>
-          <a:xfrm>
-            <a:off x="5204011" y="606235"/>
-            <a:ext cx="0" cy="226269"/>
-          </a:xfrm>
-          <a:prstGeom prst="straightConnector1">
-            <a:avLst/>
+          <a:xfrm rot="5400000">
+            <a:off x="4053112" y="-1189027"/>
+            <a:ext cx="247366" cy="3517318"/>
+          </a:xfrm>
+          <a:prstGeom prst="bentConnector3">
+            <a:avLst>
+              <a:gd name="adj1" fmla="val 34598"/>
+            </a:avLst>
           </a:prstGeom>
           <a:ln>
             <a:tailEnd type="triangle"/>
@@ -3977,8 +4259,104 @@
         </p:nvSpPr>
         <p:spPr>
           <a:xfrm>
-            <a:off x="1808630" y="732858"/>
-            <a:ext cx="2628898" cy="445311"/>
+            <a:off x="3196740" y="592802"/>
+            <a:ext cx="3359519" cy="445311"/>
+          </a:xfrm>
+          <a:prstGeom prst="roundRect">
+            <a:avLst/>
+          </a:prstGeom>
+          <a:gradFill flip="none" rotWithShape="1">
+            <a:gsLst>
+              <a:gs pos="53000">
+                <a:srgbClr val="FFF5D5"/>
+              </a:gs>
+              <a:gs pos="0">
+                <a:srgbClr val="FFEEE5"/>
+              </a:gs>
+              <a:gs pos="100000">
+                <a:srgbClr val="FFF5D5"/>
+              </a:gs>
+            </a:gsLst>
+            <a:lin ang="10800000" scaled="1"/>
+            <a:tileRect/>
+          </a:gradFill>
+          <a:ln>
+            <a:solidFill>
+              <a:schemeClr val="accent2">
+                <a:lumMod val="50000"/>
+              </a:schemeClr>
+            </a:solidFill>
+          </a:ln>
+        </p:spPr>
+        <p:style>
+          <a:lnRef idx="1">
+            <a:schemeClr val="accent4"/>
+          </a:lnRef>
+          <a:fillRef idx="2">
+            <a:schemeClr val="accent4"/>
+          </a:fillRef>
+          <a:effectRef idx="1">
+            <a:schemeClr val="accent4"/>
+          </a:effectRef>
+          <a:fontRef idx="minor">
+            <a:schemeClr val="dk1"/>
+          </a:fontRef>
+        </p:style>
+        <p:txBody>
+          <a:bodyPr rtlCol="0" anchor="ctr"/>
+          <a:lstStyle/>
+          <a:p>
+            <a:pPr algn="ctr"/>
+            <a:endParaRPr lang="en-GB" sz="1000" dirty="0"/>
+          </a:p>
+        </p:txBody>
+      </p:sp>
+      <p:cxnSp>
+        <p:nvCxnSpPr>
+          <p:cNvPr id="27" name="Straight Arrow Connector 26"/>
+          <p:cNvCxnSpPr>
+            <a:stCxn id="21" idx="3"/>
+            <a:endCxn id="26" idx="1"/>
+          </p:cNvCxnSpPr>
+          <p:nvPr/>
+        </p:nvCxnSpPr>
+        <p:spPr>
+          <a:xfrm flipV="1">
+            <a:off x="3038941" y="815458"/>
+            <a:ext cx="157799" cy="2"/>
+          </a:xfrm>
+          <a:prstGeom prst="straightConnector1">
+            <a:avLst/>
+          </a:prstGeom>
+          <a:ln>
+            <a:tailEnd type="triangle"/>
+          </a:ln>
+        </p:spPr>
+        <p:style>
+          <a:lnRef idx="1">
+            <a:schemeClr val="dk1"/>
+          </a:lnRef>
+          <a:fillRef idx="0">
+            <a:schemeClr val="dk1"/>
+          </a:fillRef>
+          <a:effectRef idx="0">
+            <a:schemeClr val="dk1"/>
+          </a:effectRef>
+          <a:fontRef idx="minor">
+            <a:schemeClr val="tx1"/>
+          </a:fontRef>
+        </p:style>
+      </p:cxnSp>
+      <p:sp>
+        <p:nvSpPr>
+          <p:cNvPr id="30" name="Rounded Rectangle 29"/>
+          <p:cNvSpPr/>
+          <p:nvPr/>
+        </p:nvSpPr>
+        <p:spPr>
+          <a:xfrm>
+            <a:off x="3402466" y="702621"/>
+            <a:ext cx="569345" cy="244289"/>
           </a:xfrm>
           <a:prstGeom prst="roundRect">
             <a:avLst/>
@@ -4016,55 +4394,23 @@
           <a:lstStyle/>
           <a:p>
             <a:pPr algn="ctr"/>
+            <a:r>
+              <a:rPr lang="en-GB" sz="1000" smtClean="0"/>
+              <a:t>SRQ1</a:t>
+            </a:r>
             <a:endParaRPr lang="en-GB" sz="1000" dirty="0"/>
           </a:p>
         </p:txBody>
       </p:sp>
-      <p:cxnSp>
-        <p:nvCxnSpPr>
-          <p:cNvPr id="27" name="Straight Arrow Connector 26"/>
-          <p:cNvCxnSpPr>
-            <a:stCxn id="21" idx="1"/>
-            <a:endCxn id="26" idx="3"/>
-          </p:cNvCxnSpPr>
-          <p:nvPr/>
-        </p:nvCxnSpPr>
-        <p:spPr>
-          <a:xfrm flipH="1">
-            <a:off x="4437528" y="954649"/>
-            <a:ext cx="145677" cy="865"/>
-          </a:xfrm>
-          <a:prstGeom prst="straightConnector1">
-            <a:avLst/>
-          </a:prstGeom>
-          <a:ln>
-            <a:tailEnd type="triangle"/>
-          </a:ln>
-        </p:spPr>
-        <p:style>
-          <a:lnRef idx="1">
-            <a:schemeClr val="dk1"/>
-          </a:lnRef>
-          <a:fillRef idx="0">
-            <a:schemeClr val="dk1"/>
-          </a:fillRef>
-          <a:effectRef idx="0">
-            <a:schemeClr val="dk1"/>
-          </a:effectRef>
-          <a:fontRef idx="minor">
-            <a:schemeClr val="tx1"/>
-          </a:fontRef>
-        </p:style>
-      </p:cxnSp>
-      <p:sp>
-        <p:nvSpPr>
-          <p:cNvPr id="30" name="Rounded Rectangle 29"/>
+      <p:sp>
+        <p:nvSpPr>
+          <p:cNvPr id="34" name="Rounded Rectangle 33"/>
           <p:cNvSpPr/>
           <p:nvPr/>
         </p:nvSpPr>
         <p:spPr>
           <a:xfrm>
-            <a:off x="2014355" y="842677"/>
+            <a:off x="5006942" y="695644"/>
             <a:ext cx="569345" cy="244289"/>
           </a:xfrm>
           <a:prstGeom prst="roundRect">
@@ -4104,8 +4450,8 @@
           <a:p>
             <a:pPr algn="ctr"/>
             <a:r>
-              <a:rPr lang="en-GB" sz="1000" smtClean="0"/>
-              <a:t>SRQ1</a:t>
+              <a:rPr lang="en-GB" sz="1000" dirty="0" smtClean="0"/>
+              <a:t>SRQ3</a:t>
             </a:r>
             <a:endParaRPr lang="en-GB" sz="1000" dirty="0"/>
           </a:p>
@@ -4113,13 +4459,13 @@
       </p:sp>
       <p:sp>
         <p:nvSpPr>
-          <p:cNvPr id="34" name="Rounded Rectangle 33"/>
+          <p:cNvPr id="35" name="Rounded Rectangle 34"/>
           <p:cNvSpPr/>
           <p:nvPr/>
         </p:nvSpPr>
         <p:spPr>
           <a:xfrm>
-            <a:off x="3616009" y="835700"/>
+            <a:off x="4204704" y="706753"/>
             <a:ext cx="569345" cy="244289"/>
           </a:xfrm>
           <a:prstGeom prst="roundRect">
@@ -4159,61 +4505,6 @@
           <a:p>
             <a:pPr algn="ctr"/>
             <a:r>
-              <a:rPr lang="en-GB" sz="1000" dirty="0" smtClean="0"/>
-              <a:t>SRQ3</a:t>
-            </a:r>
-            <a:endParaRPr lang="en-GB" sz="1000" dirty="0"/>
-          </a:p>
-        </p:txBody>
-      </p:sp>
-      <p:sp>
-        <p:nvSpPr>
-          <p:cNvPr id="35" name="Rounded Rectangle 34"/>
-          <p:cNvSpPr/>
-          <p:nvPr/>
-        </p:nvSpPr>
-        <p:spPr>
-          <a:xfrm>
-            <a:off x="2807173" y="846809"/>
-            <a:ext cx="569345" cy="244289"/>
-          </a:xfrm>
-          <a:prstGeom prst="roundRect">
-            <a:avLst/>
-          </a:prstGeom>
-          <a:solidFill>
-            <a:schemeClr val="accent4">
-              <a:lumMod val="20000"/>
-              <a:lumOff val="80000"/>
-            </a:schemeClr>
-          </a:solidFill>
-          <a:ln>
-            <a:solidFill>
-              <a:schemeClr val="accent2">
-                <a:lumMod val="50000"/>
-              </a:schemeClr>
-            </a:solidFill>
-          </a:ln>
-        </p:spPr>
-        <p:style>
-          <a:lnRef idx="1">
-            <a:schemeClr val="accent4"/>
-          </a:lnRef>
-          <a:fillRef idx="2">
-            <a:schemeClr val="accent4"/>
-          </a:fillRef>
-          <a:effectRef idx="1">
-            <a:schemeClr val="accent4"/>
-          </a:effectRef>
-          <a:fontRef idx="minor">
-            <a:schemeClr val="dk1"/>
-          </a:fontRef>
-        </p:style>
-        <p:txBody>
-          <a:bodyPr rtlCol="0" anchor="ctr"/>
-          <a:lstStyle/>
-          <a:p>
-            <a:pPr algn="ctr"/>
-            <a:r>
               <a:rPr lang="en-GB" sz="1000" smtClean="0"/>
               <a:t>SRQ2</a:t>
             </a:r>
@@ -4229,8 +4520,8 @@
         </p:nvSpPr>
         <p:spPr>
           <a:xfrm>
-            <a:off x="1705535" y="1393396"/>
-            <a:ext cx="4384603" cy="778808"/>
+            <a:off x="1694239" y="1233110"/>
+            <a:ext cx="4973261" cy="778808"/>
           </a:xfrm>
           <a:prstGeom prst="roundRect">
             <a:avLst/>
@@ -4281,7 +4572,7 @@
         </p:nvSpPr>
         <p:spPr>
           <a:xfrm>
-            <a:off x="1808629" y="1544165"/>
+            <a:off x="1797333" y="1383879"/>
             <a:ext cx="1241611" cy="501411"/>
           </a:xfrm>
           <a:prstGeom prst="roundRect">
@@ -4328,7 +4619,7 @@
         </p:nvSpPr>
         <p:spPr>
           <a:xfrm>
-            <a:off x="3195916" y="1549080"/>
+            <a:off x="3555990" y="1377933"/>
             <a:ext cx="1241611" cy="501411"/>
           </a:xfrm>
           <a:prstGeom prst="roundRect">
@@ -4375,7 +4666,7 @@
         </p:nvSpPr>
         <p:spPr>
           <a:xfrm>
-            <a:off x="4583203" y="1549080"/>
+            <a:off x="5314647" y="1391579"/>
             <a:ext cx="1241611" cy="505887"/>
           </a:xfrm>
           <a:prstGeom prst="roundRect">
@@ -4424,12 +4715,14 @@
           <p:nvPr/>
         </p:nvCxnSpPr>
         <p:spPr>
-          <a:xfrm>
-            <a:off x="2299028" y="1086966"/>
-            <a:ext cx="130407" cy="457199"/>
-          </a:xfrm>
-          <a:prstGeom prst="straightConnector1">
-            <a:avLst/>
+          <a:xfrm rot="5400000">
+            <a:off x="2834155" y="530894"/>
+            <a:ext cx="436969" cy="1269000"/>
+          </a:xfrm>
+          <a:prstGeom prst="bentConnector3">
+            <a:avLst>
+              <a:gd name="adj1" fmla="val 53270"/>
+            </a:avLst>
           </a:prstGeom>
           <a:ln>
             <a:tailEnd type="triangle"/>
@@ -4460,12 +4753,14 @@
           <p:nvPr/>
         </p:nvCxnSpPr>
         <p:spPr>
-          <a:xfrm>
-            <a:off x="3900682" y="1079989"/>
-            <a:ext cx="1303327" cy="469091"/>
-          </a:xfrm>
-          <a:prstGeom prst="straightConnector1">
-            <a:avLst/>
+          <a:xfrm rot="16200000" flipH="1">
+            <a:off x="5387711" y="843837"/>
+            <a:ext cx="451646" cy="643838"/>
+          </a:xfrm>
+          <a:prstGeom prst="bentConnector3">
+            <a:avLst>
+              <a:gd name="adj1" fmla="val 54218"/>
+            </a:avLst>
           </a:prstGeom>
           <a:ln>
             <a:tailEnd type="triangle"/>
@@ -4496,12 +4791,14 @@
           <p:nvPr/>
         </p:nvCxnSpPr>
         <p:spPr>
-          <a:xfrm>
-            <a:off x="3091846" y="1091098"/>
-            <a:ext cx="724876" cy="457982"/>
-          </a:xfrm>
-          <a:prstGeom prst="straightConnector1">
-            <a:avLst/>
+          <a:xfrm rot="5400000">
+            <a:off x="4119642" y="1008197"/>
+            <a:ext cx="426891" cy="312581"/>
+          </a:xfrm>
+          <a:prstGeom prst="bentConnector3">
+            <a:avLst>
+              <a:gd name="adj1" fmla="val 54463"/>
+            </a:avLst>
           </a:prstGeom>
           <a:ln>
             <a:tailEnd type="triangle"/>
@@ -4530,8 +4827,8 @@
         </p:nvSpPr>
         <p:spPr>
           <a:xfrm>
-            <a:off x="1705535" y="2270200"/>
-            <a:ext cx="4384603" cy="1379124"/>
+            <a:off x="1694239" y="2109914"/>
+            <a:ext cx="4973261" cy="1379124"/>
           </a:xfrm>
           <a:prstGeom prst="roundRect">
             <a:avLst/>
@@ -4582,7 +4879,7 @@
         </p:nvSpPr>
         <p:spPr>
           <a:xfrm>
-            <a:off x="1808628" y="2417730"/>
+            <a:off x="1797332" y="2257444"/>
             <a:ext cx="1241611" cy="244289"/>
           </a:xfrm>
           <a:prstGeom prst="roundRect">
@@ -4629,7 +4926,7 @@
         </p:nvSpPr>
         <p:spPr>
           <a:xfrm>
-            <a:off x="3210453" y="2417730"/>
+            <a:off x="3412271" y="2257444"/>
             <a:ext cx="1241611" cy="244289"/>
           </a:xfrm>
           <a:prstGeom prst="roundRect">
@@ -4676,7 +4973,7 @@
         </p:nvSpPr>
         <p:spPr>
           <a:xfrm>
-            <a:off x="4583203" y="2417730"/>
+            <a:off x="5027210" y="2271764"/>
             <a:ext cx="1241611" cy="244289"/>
           </a:xfrm>
           <a:prstGeom prst="roundRect">
@@ -4723,8 +5020,8 @@
         </p:nvSpPr>
         <p:spPr>
           <a:xfrm>
-            <a:off x="1808628" y="2762430"/>
-            <a:ext cx="4016186" cy="783801"/>
+            <a:off x="1797332" y="2602144"/>
+            <a:ext cx="4476468" cy="783801"/>
           </a:xfrm>
           <a:prstGeom prst="roundRect">
             <a:avLst/>
@@ -4774,7 +5071,7 @@
         </p:nvSpPr>
         <p:spPr>
           <a:xfrm>
-            <a:off x="3354093" y="2876614"/>
+            <a:off x="3567852" y="2704540"/>
             <a:ext cx="911126" cy="244289"/>
           </a:xfrm>
           <a:prstGeom prst="roundRect">
@@ -4821,7 +5118,7 @@
         </p:nvSpPr>
         <p:spPr>
           <a:xfrm>
-            <a:off x="1908668" y="2859266"/>
+            <a:off x="1897372" y="2704540"/>
             <a:ext cx="911126" cy="244289"/>
           </a:xfrm>
           <a:prstGeom prst="roundRect">
@@ -4868,7 +5165,7 @@
         </p:nvSpPr>
         <p:spPr>
           <a:xfrm>
-            <a:off x="2636282" y="3217739"/>
+            <a:off x="2744620" y="3040480"/>
             <a:ext cx="911126" cy="244289"/>
           </a:xfrm>
           <a:prstGeom prst="roundRect">
@@ -4915,7 +5212,7 @@
         </p:nvSpPr>
         <p:spPr>
           <a:xfrm>
-            <a:off x="4127640" y="3225659"/>
+            <a:off x="4419015" y="3057453"/>
             <a:ext cx="911126" cy="244289"/>
           </a:xfrm>
           <a:prstGeom prst="roundRect">
@@ -4962,7 +5259,7 @@
         </p:nvSpPr>
         <p:spPr>
           <a:xfrm>
-            <a:off x="4833960" y="2871900"/>
+            <a:off x="5238332" y="2704540"/>
             <a:ext cx="911126" cy="244289"/>
           </a:xfrm>
           <a:prstGeom prst="roundRect">
@@ -5005,16 +5302,17 @@
         <p:nvCxnSpPr>
           <p:cNvPr id="62" name="Straight Arrow Connector 61"/>
           <p:cNvCxnSpPr>
+            <a:stCxn id="58" idx="2"/>
             <a:endCxn id="59" idx="1"/>
           </p:cNvCxnSpPr>
           <p:nvPr/>
         </p:nvCxnSpPr>
         <p:spPr>
-          <a:xfrm>
-            <a:off x="2362200" y="3116189"/>
-            <a:ext cx="274082" cy="223695"/>
-          </a:xfrm>
-          <a:prstGeom prst="straightConnector1">
+          <a:xfrm rot="16200000" flipH="1">
+            <a:off x="2441879" y="2859884"/>
+            <a:ext cx="213796" cy="391685"/>
+          </a:xfrm>
+          <a:prstGeom prst="bentConnector2">
             <a:avLst/>
           </a:prstGeom>
           <a:ln>
@@ -5046,11 +5344,11 @@
           <p:nvPr/>
         </p:nvCxnSpPr>
         <p:spPr>
-          <a:xfrm flipV="1">
-            <a:off x="3091845" y="2998759"/>
-            <a:ext cx="262248" cy="218980"/>
-          </a:xfrm>
-          <a:prstGeom prst="straightConnector1">
+          <a:xfrm rot="5400000" flipH="1" flipV="1">
+            <a:off x="3277120" y="2749749"/>
+            <a:ext cx="213795" cy="367669"/>
+          </a:xfrm>
+          <a:prstGeom prst="bentConnector2">
             <a:avLst/>
           </a:prstGeom>
           <a:ln>
@@ -5077,15 +5375,16 @@
           <p:cNvPr id="69" name="Straight Arrow Connector 68"/>
           <p:cNvCxnSpPr>
             <a:stCxn id="60" idx="0"/>
+            <a:endCxn id="61" idx="1"/>
           </p:cNvCxnSpPr>
           <p:nvPr/>
         </p:nvCxnSpPr>
         <p:spPr>
-          <a:xfrm flipV="1">
-            <a:off x="4583203" y="2994045"/>
-            <a:ext cx="247422" cy="231614"/>
-          </a:xfrm>
-          <a:prstGeom prst="straightConnector1">
+          <a:xfrm rot="5400000" flipH="1" flipV="1">
+            <a:off x="4941071" y="2760192"/>
+            <a:ext cx="230768" cy="363754"/>
+          </a:xfrm>
+          <a:prstGeom prst="bentConnector2">
             <a:avLst/>
           </a:prstGeom>
           <a:ln>
@@ -5117,11 +5416,11 @@
           <p:nvPr/>
         </p:nvCxnSpPr>
         <p:spPr>
-          <a:xfrm>
-            <a:off x="3809656" y="3120903"/>
-            <a:ext cx="317984" cy="226901"/>
-          </a:xfrm>
-          <a:prstGeom prst="straightConnector1">
+          <a:xfrm rot="16200000" flipH="1">
+            <a:off x="4105831" y="2866413"/>
+            <a:ext cx="230769" cy="395600"/>
+          </a:xfrm>
+          <a:prstGeom prst="bentConnector2">
             <a:avLst/>
           </a:prstGeom>
           <a:ln>
@@ -5154,12 +5453,12 @@
         </p:nvCxnSpPr>
         <p:spPr>
           <a:xfrm>
-            <a:off x="5824814" y="2539875"/>
-            <a:ext cx="12700" cy="614456"/>
+            <a:off x="6268821" y="2393909"/>
+            <a:ext cx="4979" cy="600136"/>
           </a:xfrm>
           <a:prstGeom prst="bentConnector3">
             <a:avLst>
-              <a:gd name="adj1" fmla="val 1107693"/>
+              <a:gd name="adj1" fmla="val 4691283"/>
             </a:avLst>
           </a:prstGeom>
           <a:ln>
@@ -5192,7 +5491,7 @@
         </p:nvCxnSpPr>
         <p:spPr>
           <a:xfrm>
-            <a:off x="892088" y="1014131"/>
+            <a:off x="880792" y="853845"/>
             <a:ext cx="0" cy="519898"/>
           </a:xfrm>
           <a:prstGeom prst="straightConnector1">
@@ -5228,8 +5527,8 @@
         </p:nvCxnSpPr>
         <p:spPr>
           <a:xfrm>
-            <a:off x="892088" y="2031570"/>
-            <a:ext cx="2142" cy="673014"/>
+            <a:off x="880792" y="1871284"/>
+            <a:ext cx="0" cy="673014"/>
           </a:xfrm>
           <a:prstGeom prst="straightConnector1">
             <a:avLst/>
@@ -5263,9 +5562,9 @@
           <p:nvPr/>
         </p:nvCxnSpPr>
         <p:spPr>
-          <a:xfrm flipH="1">
-            <a:off x="892088" y="3202125"/>
-            <a:ext cx="2142" cy="673014"/>
+          <a:xfrm>
+            <a:off x="880792" y="3041839"/>
+            <a:ext cx="0" cy="823436"/>
           </a:xfrm>
           <a:prstGeom prst="straightConnector1">
             <a:avLst/>
@@ -5297,14 +5596,63 @@
         </p:nvSpPr>
         <p:spPr>
           <a:xfrm>
-            <a:off x="1684149" y="3824495"/>
-            <a:ext cx="4405990" cy="548185"/>
+            <a:off x="1678035" y="3597662"/>
+            <a:ext cx="4997520" cy="1032767"/>
           </a:xfrm>
           <a:prstGeom prst="roundRect">
             <a:avLst/>
           </a:prstGeom>
+          <a:solidFill>
+            <a:srgbClr val="FFEEE5"/>
+          </a:solidFill>
           <a:ln>
             <a:prstDash val="dash"/>
+          </a:ln>
+        </p:spPr>
+        <p:style>
+          <a:lnRef idx="1">
+            <a:schemeClr val="accent2"/>
+          </a:lnRef>
+          <a:fillRef idx="2">
+            <a:schemeClr val="accent2"/>
+          </a:fillRef>
+          <a:effectRef idx="1">
+            <a:schemeClr val="accent2"/>
+          </a:effectRef>
+          <a:fontRef idx="minor">
+            <a:schemeClr val="dk1"/>
+          </a:fontRef>
+        </p:style>
+        <p:txBody>
+          <a:bodyPr rtlCol="0" anchor="ctr"/>
+          <a:lstStyle/>
+          <a:p>
+            <a:pPr algn="ctr"/>
+            <a:endParaRPr lang="en-GB" sz="1000" dirty="0"/>
+          </a:p>
+        </p:txBody>
+      </p:sp>
+      <p:sp>
+        <p:nvSpPr>
+          <p:cNvPr id="45" name="Rounded Rectangle 44"/>
+          <p:cNvSpPr/>
+          <p:nvPr/>
+        </p:nvSpPr>
+        <p:spPr>
+          <a:xfrm>
+            <a:off x="295845" y="4789697"/>
+            <a:ext cx="1169894" cy="497541"/>
+          </a:xfrm>
+          <a:prstGeom prst="roundRect">
+            <a:avLst/>
+          </a:prstGeom>
+          <a:solidFill>
+            <a:srgbClr val="F3EBF9"/>
+          </a:solidFill>
+          <a:ln>
+            <a:solidFill>
+              <a:srgbClr val="7030A0"/>
+            </a:solidFill>
           </a:ln>
         </p:spPr>
         <p:style>
@@ -5326,24 +5674,37 @@
           <a:lstStyle/>
           <a:p>
             <a:pPr algn="ctr"/>
+            <a:r>
+              <a:rPr lang="en-GB" sz="1000" dirty="0" smtClean="0"/>
+              <a:t>Prototype Implementation</a:t>
+            </a:r>
             <a:endParaRPr lang="en-GB" sz="1000" dirty="0"/>
           </a:p>
         </p:txBody>
       </p:sp>
       <p:sp>
         <p:nvSpPr>
-          <p:cNvPr id="45" name="Rounded Rectangle 44"/>
+          <p:cNvPr id="46" name="Rounded Rectangle 45"/>
           <p:cNvSpPr/>
           <p:nvPr/>
         </p:nvSpPr>
         <p:spPr>
           <a:xfrm>
-            <a:off x="307141" y="4548153"/>
-            <a:ext cx="1169894" cy="497541"/>
+            <a:off x="1682045" y="4739053"/>
+            <a:ext cx="4997520" cy="548185"/>
           </a:xfrm>
           <a:prstGeom prst="roundRect">
             <a:avLst/>
           </a:prstGeom>
+          <a:solidFill>
+            <a:srgbClr val="F3EBF9"/>
+          </a:solidFill>
+          <a:ln>
+            <a:solidFill>
+              <a:srgbClr val="7030A0"/>
+            </a:solidFill>
+            <a:prstDash val="dash"/>
+          </a:ln>
         </p:spPr>
         <p:style>
           <a:lnRef idx="1">
@@ -5364,30 +5725,33 @@
           <a:lstStyle/>
           <a:p>
             <a:pPr algn="ctr"/>
-            <a:r>
-              <a:rPr lang="en-GB" sz="1000" dirty="0" smtClean="0"/>
-              <a:t>Prototype Implementation</a:t>
-            </a:r>
             <a:endParaRPr lang="en-GB" sz="1000" dirty="0"/>
           </a:p>
         </p:txBody>
       </p:sp>
       <p:sp>
         <p:nvSpPr>
-          <p:cNvPr id="46" name="Rounded Rectangle 45"/>
+          <p:cNvPr id="48" name="Rounded Rectangle 47"/>
           <p:cNvSpPr/>
           <p:nvPr/>
         </p:nvSpPr>
         <p:spPr>
           <a:xfrm>
-            <a:off x="1684149" y="4497509"/>
-            <a:ext cx="4405990" cy="548185"/>
+            <a:off x="295845" y="5510064"/>
+            <a:ext cx="1169894" cy="497541"/>
           </a:xfrm>
           <a:prstGeom prst="roundRect">
             <a:avLst/>
           </a:prstGeom>
+          <a:solidFill>
+            <a:srgbClr val="EBEEF1"/>
+          </a:solidFill>
           <a:ln>
-            <a:prstDash val="dash"/>
+            <a:solidFill>
+              <a:schemeClr val="bg1">
+                <a:lumMod val="50000"/>
+              </a:schemeClr>
+            </a:solidFill>
           </a:ln>
         </p:spPr>
         <p:style>
@@ -5409,24 +5773,39 @@
           <a:lstStyle/>
           <a:p>
             <a:pPr algn="ctr"/>
+            <a:r>
+              <a:rPr lang="en-GB" sz="1000" smtClean="0"/>
+              <a:t>Evaluation</a:t>
+            </a:r>
             <a:endParaRPr lang="en-GB" sz="1000" dirty="0"/>
           </a:p>
         </p:txBody>
       </p:sp>
       <p:sp>
         <p:nvSpPr>
-          <p:cNvPr id="48" name="Rounded Rectangle 47"/>
+          <p:cNvPr id="49" name="Rounded Rectangle 48"/>
           <p:cNvSpPr/>
           <p:nvPr/>
         </p:nvSpPr>
         <p:spPr>
           <a:xfrm>
-            <a:off x="307141" y="5268520"/>
-            <a:ext cx="1169894" cy="497541"/>
+            <a:off x="1682045" y="5459420"/>
+            <a:ext cx="4997520" cy="548185"/>
           </a:xfrm>
           <a:prstGeom prst="roundRect">
             <a:avLst/>
           </a:prstGeom>
+          <a:solidFill>
+            <a:srgbClr val="EBEEF1"/>
+          </a:solidFill>
+          <a:ln>
+            <a:solidFill>
+              <a:schemeClr val="bg1">
+                <a:lumMod val="50000"/>
+              </a:schemeClr>
+            </a:solidFill>
+            <a:prstDash val="dash"/>
+          </a:ln>
         </p:spPr>
         <p:style>
           <a:lnRef idx="1">
@@ -5447,30 +5826,31 @@
           <a:lstStyle/>
           <a:p>
             <a:pPr algn="ctr"/>
-            <a:r>
-              <a:rPr lang="en-GB" sz="1000" smtClean="0"/>
-              <a:t>Evaluation</a:t>
-            </a:r>
             <a:endParaRPr lang="en-GB" sz="1000" dirty="0"/>
           </a:p>
         </p:txBody>
       </p:sp>
       <p:sp>
         <p:nvSpPr>
-          <p:cNvPr id="49" name="Rounded Rectangle 48"/>
+          <p:cNvPr id="50" name="Rounded Rectangle 49"/>
           <p:cNvSpPr/>
           <p:nvPr/>
         </p:nvSpPr>
         <p:spPr>
           <a:xfrm>
-            <a:off x="1684149" y="5217876"/>
-            <a:ext cx="4405990" cy="548185"/>
+            <a:off x="295845" y="6230431"/>
+            <a:ext cx="1169894" cy="497541"/>
           </a:xfrm>
           <a:prstGeom prst="roundRect">
             <a:avLst/>
           </a:prstGeom>
+          <a:solidFill>
+            <a:schemeClr val="bg1"/>
+          </a:solidFill>
           <a:ln>
-            <a:prstDash val="dash"/>
+            <a:solidFill>
+              <a:schemeClr val="tx1"/>
+            </a:solidFill>
           </a:ln>
         </p:spPr>
         <p:style>
@@ -5492,24 +5872,37 @@
           <a:lstStyle/>
           <a:p>
             <a:pPr algn="ctr"/>
+            <a:r>
+              <a:rPr lang="en-GB" sz="1000" dirty="0" smtClean="0"/>
+              <a:t>Conclusion</a:t>
+            </a:r>
             <a:endParaRPr lang="en-GB" sz="1000" dirty="0"/>
           </a:p>
         </p:txBody>
       </p:sp>
       <p:sp>
         <p:nvSpPr>
-          <p:cNvPr id="50" name="Rounded Rectangle 49"/>
+          <p:cNvPr id="51" name="Rounded Rectangle 50"/>
           <p:cNvSpPr/>
           <p:nvPr/>
         </p:nvSpPr>
         <p:spPr>
           <a:xfrm>
-            <a:off x="307140" y="5988887"/>
-            <a:ext cx="1169894" cy="497541"/>
+            <a:off x="1682044" y="6179787"/>
+            <a:ext cx="4997520" cy="548185"/>
           </a:xfrm>
           <a:prstGeom prst="roundRect">
             <a:avLst/>
           </a:prstGeom>
+          <a:solidFill>
+            <a:schemeClr val="bg1"/>
+          </a:solidFill>
+          <a:ln>
+            <a:solidFill>
+              <a:schemeClr val="tx1"/>
+            </a:solidFill>
+            <a:prstDash val="dash"/>
+          </a:ln>
         </p:spPr>
         <p:style>
           <a:lnRef idx="1">
@@ -5530,51 +5923,6 @@
           <a:lstStyle/>
           <a:p>
             <a:pPr algn="ctr"/>
-            <a:r>
-              <a:rPr lang="en-GB" sz="1000" dirty="0" smtClean="0"/>
-              <a:t>Conclusion</a:t>
-            </a:r>
-            <a:endParaRPr lang="en-GB" sz="1000" dirty="0"/>
-          </a:p>
-        </p:txBody>
-      </p:sp>
-      <p:sp>
-        <p:nvSpPr>
-          <p:cNvPr id="51" name="Rounded Rectangle 50"/>
-          <p:cNvSpPr/>
-          <p:nvPr/>
-        </p:nvSpPr>
-        <p:spPr>
-          <a:xfrm>
-            <a:off x="1684148" y="5938243"/>
-            <a:ext cx="4405990" cy="548185"/>
-          </a:xfrm>
-          <a:prstGeom prst="roundRect">
-            <a:avLst/>
-          </a:prstGeom>
-          <a:ln>
-            <a:prstDash val="dash"/>
-          </a:ln>
-        </p:spPr>
-        <p:style>
-          <a:lnRef idx="1">
-            <a:schemeClr val="accent3"/>
-          </a:lnRef>
-          <a:fillRef idx="2">
-            <a:schemeClr val="accent3"/>
-          </a:fillRef>
-          <a:effectRef idx="1">
-            <a:schemeClr val="accent3"/>
-          </a:effectRef>
-          <a:fontRef idx="minor">
-            <a:schemeClr val="dk1"/>
-          </a:fontRef>
-        </p:style>
-        <p:txBody>
-          <a:bodyPr rtlCol="0" anchor="ctr"/>
-          <a:lstStyle/>
-          <a:p>
-            <a:pPr algn="ctr"/>
             <a:endParaRPr lang="en-GB" sz="1000" dirty="0"/>
           </a:p>
         </p:txBody>
@@ -5590,8 +5938,8 @@
         </p:nvCxnSpPr>
         <p:spPr>
           <a:xfrm>
-            <a:off x="892088" y="4372680"/>
-            <a:ext cx="0" cy="175473"/>
+            <a:off x="880792" y="4362816"/>
+            <a:ext cx="0" cy="426881"/>
           </a:xfrm>
           <a:prstGeom prst="straightConnector1">
             <a:avLst/>
@@ -5626,7 +5974,7 @@
         </p:nvCxnSpPr>
         <p:spPr>
           <a:xfrm>
-            <a:off x="892088" y="5045694"/>
+            <a:off x="880792" y="5287238"/>
             <a:ext cx="0" cy="222826"/>
           </a:xfrm>
           <a:prstGeom prst="straightConnector1">
@@ -5661,9 +6009,411 @@
           <p:nvPr/>
         </p:nvCxnSpPr>
         <p:spPr>
-          <a:xfrm flipH="1">
-            <a:off x="892087" y="5766061"/>
-            <a:ext cx="1" cy="222826"/>
+          <a:xfrm>
+            <a:off x="880792" y="6007605"/>
+            <a:ext cx="0" cy="222826"/>
+          </a:xfrm>
+          <a:prstGeom prst="straightConnector1">
+            <a:avLst/>
+          </a:prstGeom>
+          <a:ln>
+            <a:tailEnd type="triangle"/>
+          </a:ln>
+        </p:spPr>
+        <p:style>
+          <a:lnRef idx="1">
+            <a:schemeClr val="dk1"/>
+          </a:lnRef>
+          <a:fillRef idx="0">
+            <a:schemeClr val="dk1"/>
+          </a:fillRef>
+          <a:effectRef idx="0">
+            <a:schemeClr val="dk1"/>
+          </a:effectRef>
+          <a:fontRef idx="minor">
+            <a:schemeClr val="tx1"/>
+          </a:fontRef>
+        </p:style>
+      </p:cxnSp>
+      <p:sp>
+        <p:nvSpPr>
+          <p:cNvPr id="88" name="Rounded Rectangle 87"/>
+          <p:cNvSpPr/>
+          <p:nvPr/>
+        </p:nvSpPr>
+        <p:spPr>
+          <a:xfrm>
+            <a:off x="5809181" y="701981"/>
+            <a:ext cx="569345" cy="244289"/>
+          </a:xfrm>
+          <a:prstGeom prst="roundRect">
+            <a:avLst/>
+          </a:prstGeom>
+          <a:solidFill>
+            <a:srgbClr val="FFEEE5"/>
+          </a:solidFill>
+          <a:ln>
+            <a:solidFill>
+              <a:schemeClr val="accent2">
+                <a:lumMod val="50000"/>
+              </a:schemeClr>
+            </a:solidFill>
+          </a:ln>
+        </p:spPr>
+        <p:style>
+          <a:lnRef idx="1">
+            <a:schemeClr val="accent4"/>
+          </a:lnRef>
+          <a:fillRef idx="2">
+            <a:schemeClr val="accent4"/>
+          </a:fillRef>
+          <a:effectRef idx="1">
+            <a:schemeClr val="accent4"/>
+          </a:effectRef>
+          <a:fontRef idx="minor">
+            <a:schemeClr val="dk1"/>
+          </a:fontRef>
+        </p:style>
+        <p:txBody>
+          <a:bodyPr rtlCol="0" anchor="ctr"/>
+          <a:lstStyle/>
+          <a:p>
+            <a:pPr algn="ctr"/>
+            <a:r>
+              <a:rPr lang="en-GB" sz="1000" dirty="0" smtClean="0"/>
+              <a:t>SRQ4</a:t>
+            </a:r>
+            <a:endParaRPr lang="en-GB" sz="1000" dirty="0"/>
+          </a:p>
+        </p:txBody>
+      </p:sp>
+      <p:cxnSp>
+        <p:nvCxnSpPr>
+          <p:cNvPr id="90" name="Straight Arrow Connector 89"/>
+          <p:cNvCxnSpPr>
+            <a:stCxn id="88" idx="2"/>
+            <a:endCxn id="92" idx="3"/>
+          </p:cNvCxnSpPr>
+          <p:nvPr/>
+        </p:nvCxnSpPr>
+        <p:spPr>
+          <a:xfrm rot="16200000" flipH="1">
+            <a:off x="4800816" y="2239307"/>
+            <a:ext cx="3167776" cy="581701"/>
+          </a:xfrm>
+          <a:prstGeom prst="bentConnector4">
+            <a:avLst>
+              <a:gd name="adj1" fmla="val 7571"/>
+              <a:gd name="adj2" fmla="val 125108"/>
+            </a:avLst>
+          </a:prstGeom>
+          <a:ln>
+            <a:tailEnd type="triangle"/>
+          </a:ln>
+        </p:spPr>
+        <p:style>
+          <a:lnRef idx="1">
+            <a:schemeClr val="dk1"/>
+          </a:lnRef>
+          <a:fillRef idx="0">
+            <a:schemeClr val="dk1"/>
+          </a:fillRef>
+          <a:effectRef idx="0">
+            <a:schemeClr val="dk1"/>
+          </a:effectRef>
+          <a:fontRef idx="minor">
+            <a:schemeClr val="tx1"/>
+          </a:fontRef>
+        </p:style>
+      </p:cxnSp>
+      <p:sp>
+        <p:nvSpPr>
+          <p:cNvPr id="151" name="Rounded Rectangle 150"/>
+          <p:cNvSpPr/>
+          <p:nvPr/>
+        </p:nvSpPr>
+        <p:spPr>
+          <a:xfrm>
+            <a:off x="3605592" y="3682776"/>
+            <a:ext cx="1241611" cy="244289"/>
+          </a:xfrm>
+          <a:prstGeom prst="roundRect">
+            <a:avLst/>
+          </a:prstGeom>
+          <a:ln w="6350">
+            <a:solidFill>
+              <a:schemeClr val="tx1"/>
+            </a:solidFill>
+          </a:ln>
+        </p:spPr>
+        <p:style>
+          <a:lnRef idx="2">
+            <a:schemeClr val="accent1"/>
+          </a:lnRef>
+          <a:fillRef idx="1">
+            <a:schemeClr val="lt1"/>
+          </a:fillRef>
+          <a:effectRef idx="0">
+            <a:schemeClr val="accent1"/>
+          </a:effectRef>
+          <a:fontRef idx="minor">
+            <a:schemeClr val="dk1"/>
+          </a:fontRef>
+        </p:style>
+        <p:txBody>
+          <a:bodyPr rtlCol="0" anchor="ctr"/>
+          <a:lstStyle/>
+          <a:p>
+            <a:pPr algn="ctr"/>
+            <a:r>
+              <a:rPr lang="en-GB" sz="1000" dirty="0" smtClean="0"/>
+              <a:t>Goals of the Design</a:t>
+            </a:r>
+            <a:endParaRPr lang="en-GB" sz="1000" dirty="0"/>
+          </a:p>
+        </p:txBody>
+      </p:sp>
+      <p:sp>
+        <p:nvSpPr>
+          <p:cNvPr id="154" name="Rounded Rectangle 153"/>
+          <p:cNvSpPr/>
+          <p:nvPr/>
+        </p:nvSpPr>
+        <p:spPr>
+          <a:xfrm>
+            <a:off x="3605592" y="4086072"/>
+            <a:ext cx="1241611" cy="438238"/>
+          </a:xfrm>
+          <a:prstGeom prst="roundRect">
+            <a:avLst/>
+          </a:prstGeom>
+          <a:ln w="6350">
+            <a:solidFill>
+              <a:schemeClr val="tx1"/>
+            </a:solidFill>
+          </a:ln>
+        </p:spPr>
+        <p:style>
+          <a:lnRef idx="2">
+            <a:schemeClr val="accent1"/>
+          </a:lnRef>
+          <a:fillRef idx="1">
+            <a:schemeClr val="lt1"/>
+          </a:fillRef>
+          <a:effectRef idx="0">
+            <a:schemeClr val="accent1"/>
+          </a:effectRef>
+          <a:fontRef idx="minor">
+            <a:schemeClr val="dk1"/>
+          </a:fontRef>
+        </p:style>
+        <p:txBody>
+          <a:bodyPr rtlCol="0" anchor="ctr"/>
+          <a:lstStyle/>
+          <a:p>
+            <a:pPr algn="ctr"/>
+            <a:r>
+              <a:rPr lang="en-GB" sz="1000" dirty="0" smtClean="0"/>
+              <a:t>Visualisation of Data and Views</a:t>
+            </a:r>
+            <a:endParaRPr lang="en-GB" sz="1000" dirty="0"/>
+          </a:p>
+        </p:txBody>
+      </p:sp>
+      <p:sp>
+        <p:nvSpPr>
+          <p:cNvPr id="155" name="Rounded Rectangle 154"/>
+          <p:cNvSpPr/>
+          <p:nvPr/>
+        </p:nvSpPr>
+        <p:spPr>
+          <a:xfrm>
+            <a:off x="5311640" y="4093022"/>
+            <a:ext cx="1257994" cy="431288"/>
+          </a:xfrm>
+          <a:prstGeom prst="roundRect">
+            <a:avLst/>
+          </a:prstGeom>
+          <a:ln w="6350">
+            <a:solidFill>
+              <a:schemeClr val="tx1"/>
+            </a:solidFill>
+          </a:ln>
+        </p:spPr>
+        <p:style>
+          <a:lnRef idx="2">
+            <a:schemeClr val="accent1"/>
+          </a:lnRef>
+          <a:fillRef idx="1">
+            <a:schemeClr val="lt1"/>
+          </a:fillRef>
+          <a:effectRef idx="0">
+            <a:schemeClr val="accent1"/>
+          </a:effectRef>
+          <a:fontRef idx="minor">
+            <a:schemeClr val="dk1"/>
+          </a:fontRef>
+        </p:style>
+        <p:txBody>
+          <a:bodyPr rtlCol="0" anchor="ctr"/>
+          <a:lstStyle/>
+          <a:p>
+            <a:pPr algn="ctr"/>
+            <a:r>
+              <a:rPr lang="en-GB" sz="1000" dirty="0" smtClean="0"/>
+              <a:t>Mapping of</a:t>
+            </a:r>
+            <a:br>
+              <a:rPr lang="en-GB" sz="1000" dirty="0" smtClean="0"/>
+            </a:br>
+            <a:r>
+              <a:rPr lang="en-GB" sz="1000" dirty="0" smtClean="0"/>
+              <a:t>Interaction Patterns</a:t>
+            </a:r>
+            <a:endParaRPr lang="en-GB" sz="1000" dirty="0"/>
+          </a:p>
+        </p:txBody>
+      </p:sp>
+      <p:sp>
+        <p:nvSpPr>
+          <p:cNvPr id="156" name="Rounded Rectangle 155"/>
+          <p:cNvSpPr/>
+          <p:nvPr/>
+        </p:nvSpPr>
+        <p:spPr>
+          <a:xfrm>
+            <a:off x="1901968" y="4086072"/>
+            <a:ext cx="1241611" cy="438238"/>
+          </a:xfrm>
+          <a:prstGeom prst="roundRect">
+            <a:avLst/>
+          </a:prstGeom>
+          <a:ln w="6350">
+            <a:solidFill>
+              <a:schemeClr val="tx1"/>
+            </a:solidFill>
+          </a:ln>
+        </p:spPr>
+        <p:style>
+          <a:lnRef idx="2">
+            <a:schemeClr val="accent1"/>
+          </a:lnRef>
+          <a:fillRef idx="1">
+            <a:schemeClr val="lt1"/>
+          </a:fillRef>
+          <a:effectRef idx="0">
+            <a:schemeClr val="accent1"/>
+          </a:effectRef>
+          <a:fontRef idx="minor">
+            <a:schemeClr val="dk1"/>
+          </a:fontRef>
+        </p:style>
+        <p:txBody>
+          <a:bodyPr rtlCol="0" anchor="ctr"/>
+          <a:lstStyle/>
+          <a:p>
+            <a:pPr algn="ctr"/>
+            <a:r>
+              <a:rPr lang="en-GB" sz="1000" dirty="0"/>
+              <a:t>View </a:t>
+            </a:r>
+            <a:r>
+              <a:rPr lang="en-GB" sz="1000" dirty="0" smtClean="0"/>
+              <a:t>Definition </a:t>
+            </a:r>
+            <a:r>
+              <a:rPr lang="en-GB" sz="1000" dirty="0"/>
+              <a:t>and Navigation Map</a:t>
+            </a:r>
+            <a:endParaRPr lang="en-GB" sz="1000" dirty="0"/>
+          </a:p>
+        </p:txBody>
+      </p:sp>
+      <p:cxnSp>
+        <p:nvCxnSpPr>
+          <p:cNvPr id="159" name="Straight Arrow Connector 158"/>
+          <p:cNvCxnSpPr>
+            <a:stCxn id="151" idx="1"/>
+            <a:endCxn id="156" idx="0"/>
+          </p:cNvCxnSpPr>
+          <p:nvPr/>
+        </p:nvCxnSpPr>
+        <p:spPr>
+          <a:xfrm rot="10800000" flipV="1">
+            <a:off x="2522774" y="3804920"/>
+            <a:ext cx="1082818" cy="281151"/>
+          </a:xfrm>
+          <a:prstGeom prst="bentConnector2">
+            <a:avLst/>
+          </a:prstGeom>
+          <a:ln>
+            <a:tailEnd type="triangle"/>
+          </a:ln>
+        </p:spPr>
+        <p:style>
+          <a:lnRef idx="1">
+            <a:schemeClr val="dk1"/>
+          </a:lnRef>
+          <a:fillRef idx="0">
+            <a:schemeClr val="dk1"/>
+          </a:fillRef>
+          <a:effectRef idx="0">
+            <a:schemeClr val="dk1"/>
+          </a:effectRef>
+          <a:fontRef idx="minor">
+            <a:schemeClr val="tx1"/>
+          </a:fontRef>
+        </p:style>
+      </p:cxnSp>
+      <p:cxnSp>
+        <p:nvCxnSpPr>
+          <p:cNvPr id="164" name="Straight Arrow Connector 163"/>
+          <p:cNvCxnSpPr>
+            <a:stCxn id="151" idx="3"/>
+            <a:endCxn id="155" idx="0"/>
+          </p:cNvCxnSpPr>
+          <p:nvPr/>
+        </p:nvCxnSpPr>
+        <p:spPr>
+          <a:xfrm>
+            <a:off x="4847203" y="3804921"/>
+            <a:ext cx="1093434" cy="288101"/>
+          </a:xfrm>
+          <a:prstGeom prst="bentConnector2">
+            <a:avLst/>
+          </a:prstGeom>
+          <a:ln>
+            <a:tailEnd type="triangle"/>
+          </a:ln>
+        </p:spPr>
+        <p:style>
+          <a:lnRef idx="1">
+            <a:schemeClr val="dk1"/>
+          </a:lnRef>
+          <a:fillRef idx="0">
+            <a:schemeClr val="dk1"/>
+          </a:fillRef>
+          <a:effectRef idx="0">
+            <a:schemeClr val="dk1"/>
+          </a:effectRef>
+          <a:fontRef idx="minor">
+            <a:schemeClr val="tx1"/>
+          </a:fontRef>
+        </p:style>
+      </p:cxnSp>
+      <p:cxnSp>
+        <p:nvCxnSpPr>
+          <p:cNvPr id="167" name="Straight Arrow Connector 166"/>
+          <p:cNvCxnSpPr>
+            <a:stCxn id="151" idx="2"/>
+            <a:endCxn id="154" idx="0"/>
+          </p:cNvCxnSpPr>
+          <p:nvPr/>
+        </p:nvCxnSpPr>
+        <p:spPr>
+          <a:xfrm>
+            <a:off x="4226398" y="3927065"/>
+            <a:ext cx="0" cy="159007"/>
           </a:xfrm>
           <a:prstGeom prst="straightConnector1">
             <a:avLst/>

</xml_diff>

<commit_message>
update thesis map, re-genereate .bib
</commit_message>
<xml_diff>
--- a/03_Figures/06_Introduction/ThesisMap.pptx
+++ b/03_Figures/06_Introduction/ThesisMap.pptx
@@ -5,10 +5,11 @@
     <p:sldMasterId id="2147483648" r:id="rId1"/>
   </p:sldMasterIdLst>
   <p:notesMasterIdLst>
-    <p:notesMasterId r:id="rId3"/>
+    <p:notesMasterId r:id="rId4"/>
   </p:notesMasterIdLst>
   <p:sldIdLst>
     <p:sldId id="256" r:id="rId2"/>
+    <p:sldId id="257" r:id="rId3"/>
   </p:sldIdLst>
   <p:sldSz cx="12192000" cy="6858000"/>
   <p:notesSz cx="6858000" cy="9144000"/>
@@ -208,7 +209,7 @@
           <a:p>
             <a:fld id="{6D649B26-A475-EE47-90EF-A6F457C5E45C}" type="datetimeFigureOut">
               <a:rPr lang="en-GB" smtClean="0"/>
-              <a:t>10/01/2017</a:t>
+              <a:t>25/01/2017</a:t>
             </a:fld>
             <a:endParaRPr lang="en-GB"/>
           </a:p>
@@ -560,6 +561,90 @@
 </p:notes>
 </file>
 
+<file path=ppt/notesSlides/notesSlide2.xml><?xml version="1.0" encoding="utf-8"?>
+<p:notes xmlns:a="http://schemas.openxmlformats.org/drawingml/2006/main" xmlns:r="http://schemas.openxmlformats.org/officeDocument/2006/relationships" xmlns:p="http://schemas.openxmlformats.org/presentationml/2006/main">
+  <p:cSld>
+    <p:spTree>
+      <p:nvGrpSpPr>
+        <p:cNvPr id="1" name=""/>
+        <p:cNvGrpSpPr/>
+        <p:nvPr/>
+      </p:nvGrpSpPr>
+      <p:grpSpPr>
+        <a:xfrm>
+          <a:off x="0" y="0"/>
+          <a:ext cx="0" cy="0"/>
+          <a:chOff x="0" y="0"/>
+          <a:chExt cx="0" cy="0"/>
+        </a:xfrm>
+      </p:grpSpPr>
+      <p:sp>
+        <p:nvSpPr>
+          <p:cNvPr id="2" name="Slide Image Placeholder 1"/>
+          <p:cNvSpPr>
+            <a:spLocks noGrp="1" noRot="1" noChangeAspect="1"/>
+          </p:cNvSpPr>
+          <p:nvPr>
+            <p:ph type="sldImg"/>
+          </p:nvPr>
+        </p:nvSpPr>
+        <p:spPr/>
+      </p:sp>
+      <p:sp>
+        <p:nvSpPr>
+          <p:cNvPr id="3" name="Notes Placeholder 2"/>
+          <p:cNvSpPr>
+            <a:spLocks noGrp="1"/>
+          </p:cNvSpPr>
+          <p:nvPr>
+            <p:ph type="body" idx="1"/>
+          </p:nvPr>
+        </p:nvSpPr>
+        <p:spPr/>
+        <p:txBody>
+          <a:bodyPr/>
+          <a:lstStyle/>
+          <a:p>
+            <a:endParaRPr lang="en-GB" dirty="0"/>
+          </a:p>
+        </p:txBody>
+      </p:sp>
+      <p:sp>
+        <p:nvSpPr>
+          <p:cNvPr id="4" name="Slide Number Placeholder 3"/>
+          <p:cNvSpPr>
+            <a:spLocks noGrp="1"/>
+          </p:cNvSpPr>
+          <p:nvPr>
+            <p:ph type="sldNum" sz="quarter" idx="10"/>
+          </p:nvPr>
+        </p:nvSpPr>
+        <p:spPr/>
+        <p:txBody>
+          <a:bodyPr/>
+          <a:lstStyle/>
+          <a:p>
+            <a:fld id="{5FCD6146-9DB0-6046-BE66-5DBF5B845113}" type="slidenum">
+              <a:rPr lang="en-GB" smtClean="0"/>
+              <a:t>2</a:t>
+            </a:fld>
+            <a:endParaRPr lang="en-GB"/>
+          </a:p>
+        </p:txBody>
+      </p:sp>
+    </p:spTree>
+    <p:extLst>
+      <p:ext uri="{BB962C8B-B14F-4D97-AF65-F5344CB8AC3E}">
+        <p14:creationId xmlns:p14="http://schemas.microsoft.com/office/powerpoint/2010/main" val="1129257004"/>
+      </p:ext>
+    </p:extLst>
+  </p:cSld>
+  <p:clrMapOvr>
+    <a:masterClrMapping/>
+  </p:clrMapOvr>
+</p:notes>
+</file>
+
 <file path=ppt/slideLayouts/slideLayout1.xml><?xml version="1.0" encoding="utf-8"?>
 <p:sldLayout xmlns:a="http://schemas.openxmlformats.org/drawingml/2006/main" xmlns:r="http://schemas.openxmlformats.org/officeDocument/2006/relationships" xmlns:p="http://schemas.openxmlformats.org/presentationml/2006/main" type="title" preserve="1">
   <p:cSld name="Title Slide">
@@ -705,7 +790,7 @@
           <a:p>
             <a:fld id="{C46EF7F6-8777-C24D-B115-3C749887A399}" type="datetimeFigureOut">
               <a:rPr lang="en-GB" smtClean="0"/>
-              <a:t>10/01/2017</a:t>
+              <a:t>25/01/2017</a:t>
             </a:fld>
             <a:endParaRPr lang="en-GB"/>
           </a:p>
@@ -922,7 +1007,7 @@
           <a:p>
             <a:fld id="{C46EF7F6-8777-C24D-B115-3C749887A399}" type="datetimeFigureOut">
               <a:rPr lang="en-GB" smtClean="0"/>
-              <a:t>10/01/2017</a:t>
+              <a:t>25/01/2017</a:t>
             </a:fld>
             <a:endParaRPr lang="en-GB"/>
           </a:p>
@@ -1132,7 +1217,7 @@
           <a:p>
             <a:fld id="{C46EF7F6-8777-C24D-B115-3C749887A399}" type="datetimeFigureOut">
               <a:rPr lang="en-GB" smtClean="0"/>
-              <a:t>10/01/2017</a:t>
+              <a:t>25/01/2017</a:t>
             </a:fld>
             <a:endParaRPr lang="en-GB"/>
           </a:p>
@@ -1342,7 +1427,7 @@
           <a:p>
             <a:fld id="{C46EF7F6-8777-C24D-B115-3C749887A399}" type="datetimeFigureOut">
               <a:rPr lang="en-GB" smtClean="0"/>
-              <a:t>10/01/2017</a:t>
+              <a:t>25/01/2017</a:t>
             </a:fld>
             <a:endParaRPr lang="en-GB"/>
           </a:p>
@@ -1625,7 +1710,7 @@
           <a:p>
             <a:fld id="{C46EF7F6-8777-C24D-B115-3C749887A399}" type="datetimeFigureOut">
               <a:rPr lang="en-GB" smtClean="0"/>
-              <a:t>10/01/2017</a:t>
+              <a:t>25/01/2017</a:t>
             </a:fld>
             <a:endParaRPr lang="en-GB"/>
           </a:p>
@@ -1902,7 +1987,7 @@
           <a:p>
             <a:fld id="{C46EF7F6-8777-C24D-B115-3C749887A399}" type="datetimeFigureOut">
               <a:rPr lang="en-GB" smtClean="0"/>
-              <a:t>10/01/2017</a:t>
+              <a:t>25/01/2017</a:t>
             </a:fld>
             <a:endParaRPr lang="en-GB"/>
           </a:p>
@@ -2315,7 +2400,7 @@
           <a:p>
             <a:fld id="{C46EF7F6-8777-C24D-B115-3C749887A399}" type="datetimeFigureOut">
               <a:rPr lang="en-GB" smtClean="0"/>
-              <a:t>10/01/2017</a:t>
+              <a:t>25/01/2017</a:t>
             </a:fld>
             <a:endParaRPr lang="en-GB"/>
           </a:p>
@@ -2472,7 +2557,7 @@
           <a:p>
             <a:fld id="{C46EF7F6-8777-C24D-B115-3C749887A399}" type="datetimeFigureOut">
               <a:rPr lang="en-GB" smtClean="0"/>
-              <a:t>10/01/2017</a:t>
+              <a:t>25/01/2017</a:t>
             </a:fld>
             <a:endParaRPr lang="en-GB"/>
           </a:p>
@@ -2598,7 +2683,7 @@
           <a:p>
             <a:fld id="{C46EF7F6-8777-C24D-B115-3C749887A399}" type="datetimeFigureOut">
               <a:rPr lang="en-GB" smtClean="0"/>
-              <a:t>10/01/2017</a:t>
+              <a:t>25/01/2017</a:t>
             </a:fld>
             <a:endParaRPr lang="en-GB"/>
           </a:p>
@@ -2915,7 +3000,7 @@
           <a:p>
             <a:fld id="{C46EF7F6-8777-C24D-B115-3C749887A399}" type="datetimeFigureOut">
               <a:rPr lang="en-GB" smtClean="0"/>
-              <a:t>10/01/2017</a:t>
+              <a:t>25/01/2017</a:t>
             </a:fld>
             <a:endParaRPr lang="en-GB"/>
           </a:p>
@@ -3208,7 +3293,7 @@
           <a:p>
             <a:fld id="{C46EF7F6-8777-C24D-B115-3C749887A399}" type="datetimeFigureOut">
               <a:rPr lang="en-GB" smtClean="0"/>
-              <a:t>10/01/2017</a:t>
+              <a:t>25/01/2017</a:t>
             </a:fld>
             <a:endParaRPr lang="en-GB"/>
           </a:p>
@@ -5640,7 +5725,7 @@
         </p:nvSpPr>
         <p:spPr>
           <a:xfrm>
-            <a:off x="295845" y="4789697"/>
+            <a:off x="295845" y="4802397"/>
             <a:ext cx="1169894" cy="497541"/>
           </a:xfrm>
           <a:prstGeom prst="roundRect">
@@ -5676,7 +5761,11 @@
             <a:pPr algn="ctr"/>
             <a:r>
               <a:rPr lang="en-GB" sz="1000" dirty="0" smtClean="0"/>
-              <a:t>Prototype Implementation</a:t>
+              <a:t>Prototype </a:t>
+            </a:r>
+            <a:r>
+              <a:rPr lang="en-GB" sz="1000" dirty="0" smtClean="0"/>
+              <a:t>Development</a:t>
             </a:r>
             <a:endParaRPr lang="en-GB" sz="1000" dirty="0"/>
           </a:p>
@@ -5690,8 +5779,8 @@
         </p:nvSpPr>
         <p:spPr>
           <a:xfrm>
-            <a:off x="1682045" y="4739053"/>
-            <a:ext cx="4997520" cy="548185"/>
+            <a:off x="1682045" y="4739052"/>
+            <a:ext cx="4997520" cy="617173"/>
           </a:xfrm>
           <a:prstGeom prst="roundRect">
             <a:avLst/>
@@ -5737,7 +5826,7 @@
         </p:nvSpPr>
         <p:spPr>
           <a:xfrm>
-            <a:off x="295845" y="5510064"/>
+            <a:off x="295845" y="5586264"/>
             <a:ext cx="1169894" cy="497541"/>
           </a:xfrm>
           <a:prstGeom prst="roundRect">
@@ -5789,8 +5878,8 @@
         </p:nvSpPr>
         <p:spPr>
           <a:xfrm>
-            <a:off x="1682045" y="5459420"/>
-            <a:ext cx="4997520" cy="548185"/>
+            <a:off x="1682044" y="5461221"/>
+            <a:ext cx="4997520" cy="844329"/>
           </a:xfrm>
           <a:prstGeom prst="roundRect">
             <a:avLst/>
@@ -5838,7 +5927,7 @@
         </p:nvSpPr>
         <p:spPr>
           <a:xfrm>
-            <a:off x="295845" y="6230431"/>
+            <a:off x="295845" y="6443158"/>
             <a:ext cx="1169894" cy="497541"/>
           </a:xfrm>
           <a:prstGeom prst="roundRect">
@@ -5888,7 +5977,7 @@
         </p:nvSpPr>
         <p:spPr>
           <a:xfrm>
-            <a:off x="1682044" y="6179787"/>
+            <a:off x="1682045" y="6414454"/>
             <a:ext cx="4997520" cy="548185"/>
           </a:xfrm>
           <a:prstGeom prst="roundRect">
@@ -5939,7 +6028,7 @@
         <p:spPr>
           <a:xfrm>
             <a:off x="880792" y="4362816"/>
-            <a:ext cx="0" cy="426881"/>
+            <a:ext cx="0" cy="439581"/>
           </a:xfrm>
           <a:prstGeom prst="straightConnector1">
             <a:avLst/>
@@ -5974,8 +6063,8 @@
         </p:nvCxnSpPr>
         <p:spPr>
           <a:xfrm>
-            <a:off x="880792" y="5287238"/>
-            <a:ext cx="0" cy="222826"/>
+            <a:off x="880792" y="5299938"/>
+            <a:ext cx="0" cy="286326"/>
           </a:xfrm>
           <a:prstGeom prst="straightConnector1">
             <a:avLst/>
@@ -6010,8 +6099,8 @@
         </p:nvCxnSpPr>
         <p:spPr>
           <a:xfrm>
-            <a:off x="880792" y="6007605"/>
-            <a:ext cx="0" cy="222826"/>
+            <a:off x="880792" y="6083805"/>
+            <a:ext cx="0" cy="359353"/>
           </a:xfrm>
           <a:prstGeom prst="straightConnector1">
             <a:avLst/>
@@ -6181,7 +6270,7 @@
         </p:nvSpPr>
         <p:spPr>
           <a:xfrm>
-            <a:off x="3605592" y="4086072"/>
+            <a:off x="3600408" y="4086072"/>
             <a:ext cx="1241611" cy="438238"/>
           </a:xfrm>
           <a:prstGeom prst="roundRect">
@@ -6228,7 +6317,7 @@
         </p:nvSpPr>
         <p:spPr>
           <a:xfrm>
-            <a:off x="5311640" y="4093022"/>
+            <a:off x="5330141" y="4093022"/>
             <a:ext cx="1257994" cy="431288"/>
           </a:xfrm>
           <a:prstGeom prst="roundRect">
@@ -6282,7 +6371,7 @@
         </p:nvSpPr>
         <p:spPr>
           <a:xfrm>
-            <a:off x="1901968" y="4086072"/>
+            <a:off x="1867568" y="4086072"/>
             <a:ext cx="1241611" cy="438238"/>
           </a:xfrm>
           <a:prstGeom prst="roundRect">
@@ -6325,7 +6414,6 @@
               <a:rPr lang="en-GB" sz="1000" dirty="0"/>
               <a:t>and Navigation Map</a:t>
             </a:r>
-            <a:endParaRPr lang="en-GB" sz="1000" dirty="0"/>
           </a:p>
         </p:txBody>
       </p:sp>
@@ -6340,8 +6428,8 @@
         </p:nvCxnSpPr>
         <p:spPr>
           <a:xfrm rot="10800000" flipV="1">
-            <a:off x="2522774" y="3804920"/>
-            <a:ext cx="1082818" cy="281151"/>
+            <a:off x="2488374" y="3804920"/>
+            <a:ext cx="1117218" cy="281151"/>
           </a:xfrm>
           <a:prstGeom prst="bentConnector2">
             <a:avLst/>
@@ -6377,7 +6465,7 @@
         <p:spPr>
           <a:xfrm>
             <a:off x="4847203" y="3804921"/>
-            <a:ext cx="1093434" cy="288101"/>
+            <a:ext cx="1111935" cy="288101"/>
           </a:xfrm>
           <a:prstGeom prst="bentConnector2">
             <a:avLst/>
@@ -6411,9 +6499,631 @@
           <p:nvPr/>
         </p:nvCxnSpPr>
         <p:spPr>
-          <a:xfrm>
-            <a:off x="4226398" y="3927065"/>
-            <a:ext cx="0" cy="159007"/>
+          <a:xfrm flipH="1">
+            <a:off x="4221214" y="3927065"/>
+            <a:ext cx="5184" cy="159007"/>
+          </a:xfrm>
+          <a:prstGeom prst="straightConnector1">
+            <a:avLst/>
+          </a:prstGeom>
+          <a:ln>
+            <a:tailEnd type="triangle"/>
+          </a:ln>
+        </p:spPr>
+        <p:style>
+          <a:lnRef idx="1">
+            <a:schemeClr val="dk1"/>
+          </a:lnRef>
+          <a:fillRef idx="0">
+            <a:schemeClr val="dk1"/>
+          </a:fillRef>
+          <a:effectRef idx="0">
+            <a:schemeClr val="dk1"/>
+          </a:effectRef>
+          <a:fontRef idx="minor">
+            <a:schemeClr val="tx1"/>
+          </a:fontRef>
+        </p:style>
+      </p:cxnSp>
+      <p:sp>
+        <p:nvSpPr>
+          <p:cNvPr id="73" name="Rounded Rectangle 72"/>
+          <p:cNvSpPr/>
+          <p:nvPr/>
+        </p:nvSpPr>
+        <p:spPr>
+          <a:xfrm>
+            <a:off x="1867568" y="4830215"/>
+            <a:ext cx="1241611" cy="438238"/>
+          </a:xfrm>
+          <a:prstGeom prst="roundRect">
+            <a:avLst/>
+          </a:prstGeom>
+          <a:ln w="6350">
+            <a:solidFill>
+              <a:schemeClr val="tx1"/>
+            </a:solidFill>
+          </a:ln>
+        </p:spPr>
+        <p:style>
+          <a:lnRef idx="2">
+            <a:schemeClr val="accent1"/>
+          </a:lnRef>
+          <a:fillRef idx="1">
+            <a:schemeClr val="lt1"/>
+          </a:fillRef>
+          <a:effectRef idx="0">
+            <a:schemeClr val="accent1"/>
+          </a:effectRef>
+          <a:fontRef idx="minor">
+            <a:schemeClr val="dk1"/>
+          </a:fontRef>
+        </p:style>
+        <p:txBody>
+          <a:bodyPr rtlCol="0" anchor="ctr"/>
+          <a:lstStyle/>
+          <a:p>
+            <a:pPr algn="ctr"/>
+            <a:r>
+              <a:rPr lang="en-GB" sz="1000" dirty="0"/>
+              <a:t>Technical Setup</a:t>
+            </a:r>
+            <a:endParaRPr lang="en-GB" sz="1000" dirty="0"/>
+          </a:p>
+        </p:txBody>
+      </p:sp>
+      <p:sp>
+        <p:nvSpPr>
+          <p:cNvPr id="74" name="Rounded Rectangle 73"/>
+          <p:cNvSpPr/>
+          <p:nvPr/>
+        </p:nvSpPr>
+        <p:spPr>
+          <a:xfrm>
+            <a:off x="3605592" y="4830215"/>
+            <a:ext cx="1241611" cy="438238"/>
+          </a:xfrm>
+          <a:prstGeom prst="roundRect">
+            <a:avLst/>
+          </a:prstGeom>
+          <a:ln w="6350">
+            <a:solidFill>
+              <a:schemeClr val="tx1"/>
+            </a:solidFill>
+          </a:ln>
+        </p:spPr>
+        <p:style>
+          <a:lnRef idx="2">
+            <a:schemeClr val="accent1"/>
+          </a:lnRef>
+          <a:fillRef idx="1">
+            <a:schemeClr val="lt1"/>
+          </a:fillRef>
+          <a:effectRef idx="0">
+            <a:schemeClr val="accent1"/>
+          </a:effectRef>
+          <a:fontRef idx="minor">
+            <a:schemeClr val="dk1"/>
+          </a:fontRef>
+        </p:style>
+        <p:txBody>
+          <a:bodyPr rtlCol="0" anchor="ctr"/>
+          <a:lstStyle/>
+          <a:p>
+            <a:pPr algn="ctr"/>
+            <a:r>
+              <a:rPr lang="en-GB" sz="1000" dirty="0"/>
+              <a:t>Architecture and Design</a:t>
+            </a:r>
+            <a:endParaRPr lang="en-GB" sz="1000" dirty="0"/>
+          </a:p>
+        </p:txBody>
+      </p:sp>
+      <p:sp>
+        <p:nvSpPr>
+          <p:cNvPr id="76" name="Rounded Rectangle 75"/>
+          <p:cNvSpPr/>
+          <p:nvPr/>
+        </p:nvSpPr>
+        <p:spPr>
+          <a:xfrm>
+            <a:off x="5220210" y="4838287"/>
+            <a:ext cx="1367925" cy="431288"/>
+          </a:xfrm>
+          <a:prstGeom prst="roundRect">
+            <a:avLst/>
+          </a:prstGeom>
+          <a:ln w="6350">
+            <a:solidFill>
+              <a:schemeClr val="tx1"/>
+            </a:solidFill>
+          </a:ln>
+        </p:spPr>
+        <p:style>
+          <a:lnRef idx="2">
+            <a:schemeClr val="accent1"/>
+          </a:lnRef>
+          <a:fillRef idx="1">
+            <a:schemeClr val="lt1"/>
+          </a:fillRef>
+          <a:effectRef idx="0">
+            <a:schemeClr val="accent1"/>
+          </a:effectRef>
+          <a:fontRef idx="minor">
+            <a:schemeClr val="dk1"/>
+          </a:fontRef>
+        </p:style>
+        <p:txBody>
+          <a:bodyPr rtlCol="0" anchor="ctr"/>
+          <a:lstStyle/>
+          <a:p>
+            <a:pPr algn="ctr"/>
+            <a:r>
+              <a:rPr lang="en-GB" sz="1000" dirty="0"/>
+              <a:t>Implementation of Views and Interaction</a:t>
+            </a:r>
+            <a:endParaRPr lang="en-GB" sz="1000" dirty="0"/>
+          </a:p>
+        </p:txBody>
+      </p:sp>
+      <p:sp>
+        <p:nvSpPr>
+          <p:cNvPr id="80" name="Rounded Rectangle 79"/>
+          <p:cNvSpPr/>
+          <p:nvPr/>
+        </p:nvSpPr>
+        <p:spPr>
+          <a:xfrm>
+            <a:off x="3540170" y="5556026"/>
+            <a:ext cx="1362085" cy="244289"/>
+          </a:xfrm>
+          <a:prstGeom prst="roundRect">
+            <a:avLst/>
+          </a:prstGeom>
+          <a:ln w="6350">
+            <a:solidFill>
+              <a:schemeClr val="tx1"/>
+            </a:solidFill>
+          </a:ln>
+        </p:spPr>
+        <p:style>
+          <a:lnRef idx="2">
+            <a:schemeClr val="accent1"/>
+          </a:lnRef>
+          <a:fillRef idx="1">
+            <a:schemeClr val="lt1"/>
+          </a:fillRef>
+          <a:effectRef idx="0">
+            <a:schemeClr val="accent1"/>
+          </a:effectRef>
+          <a:fontRef idx="minor">
+            <a:schemeClr val="dk1"/>
+          </a:fontRef>
+        </p:style>
+        <p:txBody>
+          <a:bodyPr rtlCol="0" anchor="ctr"/>
+          <a:lstStyle/>
+          <a:p>
+            <a:pPr algn="ctr"/>
+            <a:r>
+              <a:rPr lang="en-GB" sz="1000" dirty="0" smtClean="0"/>
+              <a:t>Descriptive Evaluation</a:t>
+            </a:r>
+            <a:endParaRPr lang="en-GB" sz="1000" dirty="0"/>
+          </a:p>
+        </p:txBody>
+      </p:sp>
+      <p:sp>
+        <p:nvSpPr>
+          <p:cNvPr id="81" name="Rounded Rectangle 80"/>
+          <p:cNvSpPr/>
+          <p:nvPr/>
+        </p:nvSpPr>
+        <p:spPr>
+          <a:xfrm>
+            <a:off x="1867568" y="5903689"/>
+            <a:ext cx="1241611" cy="244289"/>
+          </a:xfrm>
+          <a:prstGeom prst="roundRect">
+            <a:avLst/>
+          </a:prstGeom>
+          <a:ln w="6350">
+            <a:solidFill>
+              <a:schemeClr val="tx1"/>
+            </a:solidFill>
+          </a:ln>
+        </p:spPr>
+        <p:style>
+          <a:lnRef idx="2">
+            <a:schemeClr val="accent1"/>
+          </a:lnRef>
+          <a:fillRef idx="1">
+            <a:schemeClr val="lt1"/>
+          </a:fillRef>
+          <a:effectRef idx="0">
+            <a:schemeClr val="accent1"/>
+          </a:effectRef>
+          <a:fontRef idx="minor">
+            <a:schemeClr val="dk1"/>
+          </a:fontRef>
+        </p:style>
+        <p:txBody>
+          <a:bodyPr rtlCol="0" anchor="ctr"/>
+          <a:lstStyle/>
+          <a:p>
+            <a:pPr algn="ctr"/>
+            <a:r>
+              <a:rPr lang="en-GB" sz="1000" dirty="0" smtClean="0"/>
+              <a:t>Scenarios</a:t>
+            </a:r>
+            <a:endParaRPr lang="en-GB" sz="1000" dirty="0"/>
+          </a:p>
+        </p:txBody>
+      </p:sp>
+      <p:sp>
+        <p:nvSpPr>
+          <p:cNvPr id="82" name="Rounded Rectangle 81"/>
+          <p:cNvSpPr/>
+          <p:nvPr/>
+        </p:nvSpPr>
+        <p:spPr>
+          <a:xfrm>
+            <a:off x="5220210" y="5903689"/>
+            <a:ext cx="1366015" cy="244289"/>
+          </a:xfrm>
+          <a:prstGeom prst="roundRect">
+            <a:avLst/>
+          </a:prstGeom>
+          <a:ln w="6350">
+            <a:solidFill>
+              <a:schemeClr val="tx1"/>
+            </a:solidFill>
+          </a:ln>
+        </p:spPr>
+        <p:style>
+          <a:lnRef idx="2">
+            <a:schemeClr val="accent1"/>
+          </a:lnRef>
+          <a:fillRef idx="1">
+            <a:schemeClr val="lt1"/>
+          </a:fillRef>
+          <a:effectRef idx="0">
+            <a:schemeClr val="accent1"/>
+          </a:effectRef>
+          <a:fontRef idx="minor">
+            <a:schemeClr val="dk1"/>
+          </a:fontRef>
+        </p:style>
+        <p:txBody>
+          <a:bodyPr rtlCol="0" anchor="ctr"/>
+          <a:lstStyle/>
+          <a:p>
+            <a:pPr algn="ctr"/>
+            <a:r>
+              <a:rPr lang="en-GB" sz="1000" dirty="0" smtClean="0"/>
+              <a:t>Informed Arguments</a:t>
+            </a:r>
+            <a:endParaRPr lang="en-GB" sz="1000" dirty="0"/>
+          </a:p>
+        </p:txBody>
+      </p:sp>
+      <p:cxnSp>
+        <p:nvCxnSpPr>
+          <p:cNvPr id="84" name="Straight Arrow Connector 158"/>
+          <p:cNvCxnSpPr>
+            <a:stCxn id="80" idx="1"/>
+            <a:endCxn id="81" idx="0"/>
+          </p:cNvCxnSpPr>
+          <p:nvPr/>
+        </p:nvCxnSpPr>
+        <p:spPr>
+          <a:xfrm rot="10800000" flipV="1">
+            <a:off x="2488374" y="5678171"/>
+            <a:ext cx="1051796" cy="225518"/>
+          </a:xfrm>
+          <a:prstGeom prst="bentConnector2">
+            <a:avLst/>
+          </a:prstGeom>
+          <a:ln>
+            <a:tailEnd type="triangle"/>
+          </a:ln>
+        </p:spPr>
+        <p:style>
+          <a:lnRef idx="1">
+            <a:schemeClr val="dk1"/>
+          </a:lnRef>
+          <a:fillRef idx="0">
+            <a:schemeClr val="dk1"/>
+          </a:fillRef>
+          <a:effectRef idx="0">
+            <a:schemeClr val="dk1"/>
+          </a:effectRef>
+          <a:fontRef idx="minor">
+            <a:schemeClr val="tx1"/>
+          </a:fontRef>
+        </p:style>
+      </p:cxnSp>
+      <p:cxnSp>
+        <p:nvCxnSpPr>
+          <p:cNvPr id="85" name="Straight Arrow Connector 158"/>
+          <p:cNvCxnSpPr>
+            <a:stCxn id="80" idx="3"/>
+            <a:endCxn id="82" idx="0"/>
+          </p:cNvCxnSpPr>
+          <p:nvPr/>
+        </p:nvCxnSpPr>
+        <p:spPr>
+          <a:xfrm>
+            <a:off x="4902255" y="5678171"/>
+            <a:ext cx="1000963" cy="225518"/>
+          </a:xfrm>
+          <a:prstGeom prst="bentConnector2">
+            <a:avLst/>
+          </a:prstGeom>
+          <a:ln>
+            <a:tailEnd type="triangle"/>
+          </a:ln>
+        </p:spPr>
+        <p:style>
+          <a:lnRef idx="1">
+            <a:schemeClr val="dk1"/>
+          </a:lnRef>
+          <a:fillRef idx="0">
+            <a:schemeClr val="dk1"/>
+          </a:fillRef>
+          <a:effectRef idx="0">
+            <a:schemeClr val="dk1"/>
+          </a:effectRef>
+          <a:fontRef idx="minor">
+            <a:schemeClr val="tx1"/>
+          </a:fontRef>
+        </p:style>
+      </p:cxnSp>
+      <p:sp>
+        <p:nvSpPr>
+          <p:cNvPr id="91" name="Rounded Rectangle 90"/>
+          <p:cNvSpPr/>
+          <p:nvPr/>
+        </p:nvSpPr>
+        <p:spPr>
+          <a:xfrm>
+            <a:off x="1867567" y="6566401"/>
+            <a:ext cx="1241611" cy="244289"/>
+          </a:xfrm>
+          <a:prstGeom prst="roundRect">
+            <a:avLst/>
+          </a:prstGeom>
+          <a:ln w="6350">
+            <a:solidFill>
+              <a:schemeClr val="tx1"/>
+            </a:solidFill>
+          </a:ln>
+        </p:spPr>
+        <p:style>
+          <a:lnRef idx="2">
+            <a:schemeClr val="accent1"/>
+          </a:lnRef>
+          <a:fillRef idx="1">
+            <a:schemeClr val="lt1"/>
+          </a:fillRef>
+          <a:effectRef idx="0">
+            <a:schemeClr val="accent1"/>
+          </a:effectRef>
+          <a:fontRef idx="minor">
+            <a:schemeClr val="dk1"/>
+          </a:fontRef>
+        </p:style>
+        <p:txBody>
+          <a:bodyPr rtlCol="0" anchor="ctr"/>
+          <a:lstStyle/>
+          <a:p>
+            <a:pPr algn="ctr"/>
+            <a:r>
+              <a:rPr lang="en-GB" sz="1000" dirty="0" smtClean="0"/>
+              <a:t>Summary</a:t>
+            </a:r>
+            <a:endParaRPr lang="en-GB" sz="1000" dirty="0"/>
+          </a:p>
+        </p:txBody>
+      </p:sp>
+      <p:sp>
+        <p:nvSpPr>
+          <p:cNvPr id="93" name="Rounded Rectangle 92"/>
+          <p:cNvSpPr/>
+          <p:nvPr/>
+        </p:nvSpPr>
+        <p:spPr>
+          <a:xfrm>
+            <a:off x="3592119" y="6566400"/>
+            <a:ext cx="1241611" cy="244289"/>
+          </a:xfrm>
+          <a:prstGeom prst="roundRect">
+            <a:avLst/>
+          </a:prstGeom>
+          <a:ln w="6350">
+            <a:solidFill>
+              <a:schemeClr val="tx1"/>
+            </a:solidFill>
+          </a:ln>
+        </p:spPr>
+        <p:style>
+          <a:lnRef idx="2">
+            <a:schemeClr val="accent1"/>
+          </a:lnRef>
+          <a:fillRef idx="1">
+            <a:schemeClr val="lt1"/>
+          </a:fillRef>
+          <a:effectRef idx="0">
+            <a:schemeClr val="accent1"/>
+          </a:effectRef>
+          <a:fontRef idx="minor">
+            <a:schemeClr val="dk1"/>
+          </a:fontRef>
+        </p:style>
+        <p:txBody>
+          <a:bodyPr rtlCol="0" anchor="ctr"/>
+          <a:lstStyle/>
+          <a:p>
+            <a:pPr algn="ctr"/>
+            <a:r>
+              <a:rPr lang="en-GB" sz="1000" dirty="0" smtClean="0"/>
+              <a:t>Findings</a:t>
+            </a:r>
+            <a:endParaRPr lang="en-GB" sz="1000" dirty="0"/>
+          </a:p>
+        </p:txBody>
+      </p:sp>
+      <p:sp>
+        <p:nvSpPr>
+          <p:cNvPr id="94" name="Rounded Rectangle 93"/>
+          <p:cNvSpPr/>
+          <p:nvPr/>
+        </p:nvSpPr>
+        <p:spPr>
+          <a:xfrm>
+            <a:off x="5316672" y="6569158"/>
+            <a:ext cx="1241611" cy="244289"/>
+          </a:xfrm>
+          <a:prstGeom prst="roundRect">
+            <a:avLst/>
+          </a:prstGeom>
+          <a:ln w="6350">
+            <a:solidFill>
+              <a:schemeClr val="tx1"/>
+            </a:solidFill>
+          </a:ln>
+        </p:spPr>
+        <p:style>
+          <a:lnRef idx="2">
+            <a:schemeClr val="accent1"/>
+          </a:lnRef>
+          <a:fillRef idx="1">
+            <a:schemeClr val="lt1"/>
+          </a:fillRef>
+          <a:effectRef idx="0">
+            <a:schemeClr val="accent1"/>
+          </a:effectRef>
+          <a:fontRef idx="minor">
+            <a:schemeClr val="dk1"/>
+          </a:fontRef>
+        </p:style>
+        <p:txBody>
+          <a:bodyPr rtlCol="0" anchor="ctr"/>
+          <a:lstStyle/>
+          <a:p>
+            <a:pPr algn="ctr"/>
+            <a:r>
+              <a:rPr lang="en-GB" sz="1000" dirty="0" smtClean="0"/>
+              <a:t>Future Research</a:t>
+            </a:r>
+            <a:endParaRPr lang="en-GB" sz="1000" dirty="0"/>
+          </a:p>
+        </p:txBody>
+      </p:sp>
+      <p:sp>
+        <p:nvSpPr>
+          <p:cNvPr id="95" name="Rounded Rectangle 94"/>
+          <p:cNvSpPr/>
+          <p:nvPr/>
+        </p:nvSpPr>
+        <p:spPr>
+          <a:xfrm>
+            <a:off x="3605592" y="5905311"/>
+            <a:ext cx="1241611" cy="244289"/>
+          </a:xfrm>
+          <a:prstGeom prst="roundRect">
+            <a:avLst/>
+          </a:prstGeom>
+          <a:solidFill>
+            <a:schemeClr val="accent4">
+              <a:lumMod val="20000"/>
+              <a:lumOff val="80000"/>
+            </a:schemeClr>
+          </a:solidFill>
+          <a:ln>
+            <a:solidFill>
+              <a:schemeClr val="accent2">
+                <a:lumMod val="50000"/>
+              </a:schemeClr>
+            </a:solidFill>
+          </a:ln>
+        </p:spPr>
+        <p:style>
+          <a:lnRef idx="1">
+            <a:schemeClr val="accent4"/>
+          </a:lnRef>
+          <a:fillRef idx="2">
+            <a:schemeClr val="accent4"/>
+          </a:fillRef>
+          <a:effectRef idx="1">
+            <a:schemeClr val="accent4"/>
+          </a:effectRef>
+          <a:fontRef idx="minor">
+            <a:schemeClr val="dk1"/>
+          </a:fontRef>
+        </p:style>
+        <p:txBody>
+          <a:bodyPr rtlCol="0" anchor="ctr"/>
+          <a:lstStyle/>
+          <a:p>
+            <a:pPr algn="ctr"/>
+            <a:r>
+              <a:rPr lang="en-GB" sz="1000" dirty="0" smtClean="0"/>
+              <a:t>MRQ</a:t>
+            </a:r>
+            <a:endParaRPr lang="en-GB" sz="1000" dirty="0"/>
+          </a:p>
+        </p:txBody>
+      </p:sp>
+      <p:cxnSp>
+        <p:nvCxnSpPr>
+          <p:cNvPr id="96" name="Straight Arrow Connector 158"/>
+          <p:cNvCxnSpPr>
+            <a:stCxn id="82" idx="1"/>
+            <a:endCxn id="95" idx="3"/>
+          </p:cNvCxnSpPr>
+          <p:nvPr/>
+        </p:nvCxnSpPr>
+        <p:spPr>
+          <a:xfrm flipH="1">
+            <a:off x="4847203" y="6025834"/>
+            <a:ext cx="373007" cy="1622"/>
+          </a:xfrm>
+          <a:prstGeom prst="straightConnector1">
+            <a:avLst/>
+          </a:prstGeom>
+          <a:ln>
+            <a:tailEnd type="triangle"/>
+          </a:ln>
+        </p:spPr>
+        <p:style>
+          <a:lnRef idx="1">
+            <a:schemeClr val="dk1"/>
+          </a:lnRef>
+          <a:fillRef idx="0">
+            <a:schemeClr val="dk1"/>
+          </a:fillRef>
+          <a:effectRef idx="0">
+            <a:schemeClr val="dk1"/>
+          </a:effectRef>
+          <a:fontRef idx="minor">
+            <a:schemeClr val="tx1"/>
+          </a:fontRef>
+        </p:style>
+      </p:cxnSp>
+      <p:cxnSp>
+        <p:nvCxnSpPr>
+          <p:cNvPr id="97" name="Straight Arrow Connector 158"/>
+          <p:cNvCxnSpPr>
+            <a:stCxn id="81" idx="3"/>
+            <a:endCxn id="95" idx="1"/>
+          </p:cNvCxnSpPr>
+          <p:nvPr/>
+        </p:nvCxnSpPr>
+        <p:spPr>
+          <a:xfrm>
+            <a:off x="3109179" y="6025834"/>
+            <a:ext cx="496413" cy="1622"/>
           </a:xfrm>
           <a:prstGeom prst="straightConnector1">
             <a:avLst/>
@@ -6441,6 +7151,3422 @@
     <p:extLst>
       <p:ext uri="{BB962C8B-B14F-4D97-AF65-F5344CB8AC3E}">
         <p14:creationId xmlns:p14="http://schemas.microsoft.com/office/powerpoint/2010/main" val="1635935134"/>
+      </p:ext>
+    </p:extLst>
+  </p:cSld>
+  <p:clrMapOvr>
+    <a:masterClrMapping/>
+  </p:clrMapOvr>
+  <p:timing>
+    <p:tnLst>
+      <p:par>
+        <p:cTn id="1" dur="indefinite" restart="never" nodeType="tmRoot"/>
+      </p:par>
+    </p:tnLst>
+  </p:timing>
+</p:sld>
+</file>
+
+<file path=ppt/slides/slide2.xml><?xml version="1.0" encoding="utf-8"?>
+<p:sld xmlns:a="http://schemas.openxmlformats.org/drawingml/2006/main" xmlns:r="http://schemas.openxmlformats.org/officeDocument/2006/relationships" xmlns:p="http://schemas.openxmlformats.org/presentationml/2006/main">
+  <p:cSld>
+    <p:spTree>
+      <p:nvGrpSpPr>
+        <p:cNvPr id="1" name=""/>
+        <p:cNvGrpSpPr/>
+        <p:nvPr/>
+      </p:nvGrpSpPr>
+      <p:grpSpPr>
+        <a:xfrm>
+          <a:off x="0" y="0"/>
+          <a:ext cx="0" cy="0"/>
+          <a:chOff x="0" y="0"/>
+          <a:chExt cx="0" cy="0"/>
+        </a:xfrm>
+      </p:grpSpPr>
+      <p:sp>
+        <p:nvSpPr>
+          <p:cNvPr id="4" name="Rounded Rectangle 3"/>
+          <p:cNvSpPr/>
+          <p:nvPr/>
+        </p:nvSpPr>
+        <p:spPr>
+          <a:xfrm>
+            <a:off x="295845" y="-951796"/>
+            <a:ext cx="1169894" cy="497541"/>
+          </a:xfrm>
+          <a:prstGeom prst="roundRect">
+            <a:avLst/>
+          </a:prstGeom>
+          <a:solidFill>
+            <a:schemeClr val="accent1">
+              <a:lumMod val="20000"/>
+              <a:lumOff val="80000"/>
+            </a:schemeClr>
+          </a:solidFill>
+          <a:ln>
+            <a:solidFill>
+              <a:schemeClr val="accent1">
+                <a:lumMod val="50000"/>
+              </a:schemeClr>
+            </a:solidFill>
+          </a:ln>
+        </p:spPr>
+        <p:style>
+          <a:lnRef idx="1">
+            <a:schemeClr val="accent1"/>
+          </a:lnRef>
+          <a:fillRef idx="2">
+            <a:schemeClr val="accent1"/>
+          </a:fillRef>
+          <a:effectRef idx="1">
+            <a:schemeClr val="accent1"/>
+          </a:effectRef>
+          <a:fontRef idx="minor">
+            <a:schemeClr val="dk1"/>
+          </a:fontRef>
+        </p:style>
+        <p:txBody>
+          <a:bodyPr rtlCol="0" anchor="ctr"/>
+          <a:lstStyle/>
+          <a:p>
+            <a:pPr algn="ctr"/>
+            <a:r>
+              <a:rPr lang="en-GB" sz="1000" dirty="0" smtClean="0"/>
+              <a:t>Introduction</a:t>
+            </a:r>
+            <a:endParaRPr lang="en-GB" sz="1000" dirty="0"/>
+          </a:p>
+        </p:txBody>
+      </p:sp>
+      <p:sp>
+        <p:nvSpPr>
+          <p:cNvPr id="5" name="Rounded Rectangle 4"/>
+          <p:cNvSpPr/>
+          <p:nvPr/>
+        </p:nvSpPr>
+        <p:spPr>
+          <a:xfrm>
+            <a:off x="295845" y="65643"/>
+            <a:ext cx="1169894" cy="497541"/>
+          </a:xfrm>
+          <a:prstGeom prst="roundRect">
+            <a:avLst/>
+          </a:prstGeom>
+          <a:solidFill>
+            <a:schemeClr val="accent4">
+              <a:lumMod val="20000"/>
+              <a:lumOff val="80000"/>
+            </a:schemeClr>
+          </a:solidFill>
+          <a:ln>
+            <a:solidFill>
+              <a:schemeClr val="accent2">
+                <a:lumMod val="50000"/>
+              </a:schemeClr>
+            </a:solidFill>
+          </a:ln>
+        </p:spPr>
+        <p:style>
+          <a:lnRef idx="1">
+            <a:schemeClr val="accent4"/>
+          </a:lnRef>
+          <a:fillRef idx="2">
+            <a:schemeClr val="accent4"/>
+          </a:fillRef>
+          <a:effectRef idx="1">
+            <a:schemeClr val="accent4"/>
+          </a:effectRef>
+          <a:fontRef idx="minor">
+            <a:schemeClr val="dk1"/>
+          </a:fontRef>
+        </p:style>
+        <p:txBody>
+          <a:bodyPr rtlCol="0" anchor="ctr"/>
+          <a:lstStyle/>
+          <a:p>
+            <a:pPr algn="ctr"/>
+            <a:r>
+              <a:rPr lang="en-GB" sz="1000" smtClean="0"/>
+              <a:t>Literature Review</a:t>
+            </a:r>
+            <a:endParaRPr lang="en-GB" sz="1000" dirty="0"/>
+          </a:p>
+        </p:txBody>
+      </p:sp>
+      <p:sp>
+        <p:nvSpPr>
+          <p:cNvPr id="6" name="Rounded Rectangle 5"/>
+          <p:cNvSpPr/>
+          <p:nvPr/>
+        </p:nvSpPr>
+        <p:spPr>
+          <a:xfrm>
+            <a:off x="295845" y="1236198"/>
+            <a:ext cx="1169894" cy="497541"/>
+          </a:xfrm>
+          <a:prstGeom prst="roundRect">
+            <a:avLst/>
+          </a:prstGeom>
+          <a:solidFill>
+            <a:schemeClr val="accent6">
+              <a:lumMod val="20000"/>
+              <a:lumOff val="80000"/>
+            </a:schemeClr>
+          </a:solidFill>
+          <a:ln>
+            <a:solidFill>
+              <a:schemeClr val="accent6">
+                <a:lumMod val="50000"/>
+              </a:schemeClr>
+            </a:solidFill>
+          </a:ln>
+        </p:spPr>
+        <p:style>
+          <a:lnRef idx="1">
+            <a:schemeClr val="accent6"/>
+          </a:lnRef>
+          <a:fillRef idx="2">
+            <a:schemeClr val="accent6"/>
+          </a:fillRef>
+          <a:effectRef idx="1">
+            <a:schemeClr val="accent6"/>
+          </a:effectRef>
+          <a:fontRef idx="minor">
+            <a:schemeClr val="dk1"/>
+          </a:fontRef>
+        </p:style>
+        <p:txBody>
+          <a:bodyPr rtlCol="0" anchor="ctr"/>
+          <a:lstStyle/>
+          <a:p>
+            <a:pPr algn="ctr"/>
+            <a:r>
+              <a:rPr lang="en-GB" sz="1000" dirty="0" smtClean="0"/>
+              <a:t>Research Method</a:t>
+            </a:r>
+            <a:endParaRPr lang="en-GB" sz="1000" dirty="0"/>
+          </a:p>
+        </p:txBody>
+      </p:sp>
+      <p:sp>
+        <p:nvSpPr>
+          <p:cNvPr id="7" name="Rounded Rectangle 6"/>
+          <p:cNvSpPr/>
+          <p:nvPr/>
+        </p:nvSpPr>
+        <p:spPr>
+          <a:xfrm>
+            <a:off x="295845" y="2557175"/>
+            <a:ext cx="1169894" cy="497541"/>
+          </a:xfrm>
+          <a:prstGeom prst="roundRect">
+            <a:avLst/>
+          </a:prstGeom>
+          <a:solidFill>
+            <a:srgbClr val="FFEEE5"/>
+          </a:solidFill>
+        </p:spPr>
+        <p:style>
+          <a:lnRef idx="1">
+            <a:schemeClr val="accent2"/>
+          </a:lnRef>
+          <a:fillRef idx="2">
+            <a:schemeClr val="accent2"/>
+          </a:fillRef>
+          <a:effectRef idx="1">
+            <a:schemeClr val="accent2"/>
+          </a:effectRef>
+          <a:fontRef idx="minor">
+            <a:schemeClr val="dk1"/>
+          </a:fontRef>
+        </p:style>
+        <p:txBody>
+          <a:bodyPr rtlCol="0" anchor="ctr"/>
+          <a:lstStyle/>
+          <a:p>
+            <a:pPr algn="ctr"/>
+            <a:r>
+              <a:rPr lang="en-GB" sz="1000" dirty="0" smtClean="0"/>
+              <a:t>Design Suggestion</a:t>
+            </a:r>
+            <a:endParaRPr lang="en-GB" sz="1000" dirty="0"/>
+          </a:p>
+        </p:txBody>
+      </p:sp>
+      <p:sp>
+        <p:nvSpPr>
+          <p:cNvPr id="8" name="Rounded Rectangle 7"/>
+          <p:cNvSpPr/>
+          <p:nvPr/>
+        </p:nvSpPr>
+        <p:spPr>
+          <a:xfrm>
+            <a:off x="1694239" y="-1233063"/>
+            <a:ext cx="4973261" cy="1060077"/>
+          </a:xfrm>
+          <a:prstGeom prst="roundRect">
+            <a:avLst/>
+          </a:prstGeom>
+          <a:solidFill>
+            <a:schemeClr val="accent1">
+              <a:lumMod val="20000"/>
+              <a:lumOff val="80000"/>
+            </a:schemeClr>
+          </a:solidFill>
+          <a:ln>
+            <a:solidFill>
+              <a:schemeClr val="accent1">
+                <a:lumMod val="50000"/>
+              </a:schemeClr>
+            </a:solidFill>
+            <a:prstDash val="dash"/>
+          </a:ln>
+        </p:spPr>
+        <p:style>
+          <a:lnRef idx="1">
+            <a:schemeClr val="accent1"/>
+          </a:lnRef>
+          <a:fillRef idx="2">
+            <a:schemeClr val="accent1"/>
+          </a:fillRef>
+          <a:effectRef idx="1">
+            <a:schemeClr val="accent1"/>
+          </a:effectRef>
+          <a:fontRef idx="minor">
+            <a:schemeClr val="dk1"/>
+          </a:fontRef>
+        </p:style>
+        <p:txBody>
+          <a:bodyPr rtlCol="0" anchor="ctr"/>
+          <a:lstStyle/>
+          <a:p>
+            <a:pPr algn="ctr"/>
+            <a:endParaRPr lang="en-GB" sz="1000" dirty="0"/>
+          </a:p>
+        </p:txBody>
+      </p:sp>
+      <p:sp>
+        <p:nvSpPr>
+          <p:cNvPr id="9" name="Rounded Rectangle 8"/>
+          <p:cNvSpPr/>
+          <p:nvPr/>
+        </p:nvSpPr>
+        <p:spPr>
+          <a:xfrm>
+            <a:off x="1797334" y="-1106438"/>
+            <a:ext cx="1241611" cy="244289"/>
+          </a:xfrm>
+          <a:prstGeom prst="roundRect">
+            <a:avLst/>
+          </a:prstGeom>
+          <a:ln w="6350">
+            <a:solidFill>
+              <a:schemeClr val="tx1"/>
+            </a:solidFill>
+          </a:ln>
+        </p:spPr>
+        <p:style>
+          <a:lnRef idx="2">
+            <a:schemeClr val="accent1"/>
+          </a:lnRef>
+          <a:fillRef idx="1">
+            <a:schemeClr val="lt1"/>
+          </a:fillRef>
+          <a:effectRef idx="0">
+            <a:schemeClr val="accent1"/>
+          </a:effectRef>
+          <a:fontRef idx="minor">
+            <a:schemeClr val="dk1"/>
+          </a:fontRef>
+        </p:style>
+        <p:txBody>
+          <a:bodyPr rtlCol="0" anchor="ctr"/>
+          <a:lstStyle/>
+          <a:p>
+            <a:pPr algn="ctr"/>
+            <a:r>
+              <a:rPr lang="en-GB" sz="1000" smtClean="0"/>
+              <a:t>Background</a:t>
+            </a:r>
+            <a:endParaRPr lang="en-GB" sz="1000" dirty="0"/>
+          </a:p>
+        </p:txBody>
+      </p:sp>
+      <p:sp>
+        <p:nvSpPr>
+          <p:cNvPr id="10" name="Rounded Rectangle 9"/>
+          <p:cNvSpPr/>
+          <p:nvPr/>
+        </p:nvSpPr>
+        <p:spPr>
+          <a:xfrm>
+            <a:off x="3555991" y="-1106440"/>
+            <a:ext cx="1241611" cy="244289"/>
+          </a:xfrm>
+          <a:prstGeom prst="roundRect">
+            <a:avLst/>
+          </a:prstGeom>
+          <a:ln w="6350">
+            <a:solidFill>
+              <a:schemeClr val="tx1"/>
+            </a:solidFill>
+          </a:ln>
+        </p:spPr>
+        <p:style>
+          <a:lnRef idx="2">
+            <a:schemeClr val="accent1"/>
+          </a:lnRef>
+          <a:fillRef idx="1">
+            <a:schemeClr val="lt1"/>
+          </a:fillRef>
+          <a:effectRef idx="0">
+            <a:schemeClr val="accent1"/>
+          </a:effectRef>
+          <a:fontRef idx="minor">
+            <a:schemeClr val="dk1"/>
+          </a:fontRef>
+        </p:style>
+        <p:txBody>
+          <a:bodyPr rtlCol="0" anchor="ctr"/>
+          <a:lstStyle/>
+          <a:p>
+            <a:pPr algn="ctr"/>
+            <a:r>
+              <a:rPr lang="en-GB" sz="1000" dirty="0" smtClean="0"/>
+              <a:t>Problem Statement</a:t>
+            </a:r>
+            <a:endParaRPr lang="en-GB" sz="1000" dirty="0"/>
+          </a:p>
+        </p:txBody>
+      </p:sp>
+      <p:sp>
+        <p:nvSpPr>
+          <p:cNvPr id="12" name="Rounded Rectangle 11"/>
+          <p:cNvSpPr/>
+          <p:nvPr/>
+        </p:nvSpPr>
+        <p:spPr>
+          <a:xfrm>
+            <a:off x="5314648" y="-1106440"/>
+            <a:ext cx="1241611" cy="244289"/>
+          </a:xfrm>
+          <a:prstGeom prst="roundRect">
+            <a:avLst/>
+          </a:prstGeom>
+          <a:ln w="6350">
+            <a:solidFill>
+              <a:schemeClr val="tx1"/>
+            </a:solidFill>
+          </a:ln>
+        </p:spPr>
+        <p:style>
+          <a:lnRef idx="2">
+            <a:schemeClr val="accent1"/>
+          </a:lnRef>
+          <a:fillRef idx="1">
+            <a:schemeClr val="lt1"/>
+          </a:fillRef>
+          <a:effectRef idx="0">
+            <a:schemeClr val="accent1"/>
+          </a:effectRef>
+          <a:fontRef idx="minor">
+            <a:schemeClr val="dk1"/>
+          </a:fontRef>
+        </p:style>
+        <p:txBody>
+          <a:bodyPr rtlCol="0" anchor="ctr"/>
+          <a:lstStyle/>
+          <a:p>
+            <a:pPr algn="ctr"/>
+            <a:r>
+              <a:rPr lang="en-GB" sz="1000" dirty="0" smtClean="0"/>
+              <a:t>Thesis Statement</a:t>
+            </a:r>
+            <a:endParaRPr lang="en-GB" sz="1000" dirty="0"/>
+          </a:p>
+        </p:txBody>
+      </p:sp>
+      <p:cxnSp>
+        <p:nvCxnSpPr>
+          <p:cNvPr id="14" name="Straight Arrow Connector 13"/>
+          <p:cNvCxnSpPr>
+            <a:stCxn id="9" idx="3"/>
+            <a:endCxn id="10" idx="1"/>
+          </p:cNvCxnSpPr>
+          <p:nvPr/>
+        </p:nvCxnSpPr>
+        <p:spPr>
+          <a:xfrm flipV="1">
+            <a:off x="3038945" y="-984295"/>
+            <a:ext cx="517046" cy="2"/>
+          </a:xfrm>
+          <a:prstGeom prst="straightConnector1">
+            <a:avLst/>
+          </a:prstGeom>
+          <a:ln>
+            <a:tailEnd type="triangle"/>
+          </a:ln>
+        </p:spPr>
+        <p:style>
+          <a:lnRef idx="1">
+            <a:schemeClr val="dk1"/>
+          </a:lnRef>
+          <a:fillRef idx="0">
+            <a:schemeClr val="dk1"/>
+          </a:fillRef>
+          <a:effectRef idx="0">
+            <a:schemeClr val="dk1"/>
+          </a:effectRef>
+          <a:fontRef idx="minor">
+            <a:schemeClr val="tx1"/>
+          </a:fontRef>
+        </p:style>
+      </p:cxnSp>
+      <p:cxnSp>
+        <p:nvCxnSpPr>
+          <p:cNvPr id="16" name="Straight Arrow Connector 15"/>
+          <p:cNvCxnSpPr>
+            <a:stCxn id="10" idx="3"/>
+            <a:endCxn id="12" idx="1"/>
+          </p:cNvCxnSpPr>
+          <p:nvPr/>
+        </p:nvCxnSpPr>
+        <p:spPr>
+          <a:xfrm>
+            <a:off x="4797602" y="-984295"/>
+            <a:ext cx="517046" cy="0"/>
+          </a:xfrm>
+          <a:prstGeom prst="straightConnector1">
+            <a:avLst/>
+          </a:prstGeom>
+          <a:ln>
+            <a:tailEnd type="triangle"/>
+          </a:ln>
+        </p:spPr>
+        <p:style>
+          <a:lnRef idx="1">
+            <a:schemeClr val="dk1"/>
+          </a:lnRef>
+          <a:fillRef idx="0">
+            <a:schemeClr val="dk1"/>
+          </a:fillRef>
+          <a:effectRef idx="0">
+            <a:schemeClr val="dk1"/>
+          </a:effectRef>
+          <a:fontRef idx="minor">
+            <a:schemeClr val="tx1"/>
+          </a:fontRef>
+        </p:style>
+      </p:cxnSp>
+      <p:sp>
+        <p:nvSpPr>
+          <p:cNvPr id="21" name="Rounded Rectangle 20"/>
+          <p:cNvSpPr/>
+          <p:nvPr/>
+        </p:nvSpPr>
+        <p:spPr>
+          <a:xfrm>
+            <a:off x="1797330" y="-614785"/>
+            <a:ext cx="1241611" cy="244289"/>
+          </a:xfrm>
+          <a:prstGeom prst="roundRect">
+            <a:avLst/>
+          </a:prstGeom>
+          <a:solidFill>
+            <a:schemeClr val="accent4">
+              <a:lumMod val="20000"/>
+              <a:lumOff val="80000"/>
+            </a:schemeClr>
+          </a:solidFill>
+          <a:ln>
+            <a:solidFill>
+              <a:schemeClr val="accent2">
+                <a:lumMod val="50000"/>
+              </a:schemeClr>
+            </a:solidFill>
+          </a:ln>
+        </p:spPr>
+        <p:style>
+          <a:lnRef idx="1">
+            <a:schemeClr val="accent4"/>
+          </a:lnRef>
+          <a:fillRef idx="2">
+            <a:schemeClr val="accent4"/>
+          </a:fillRef>
+          <a:effectRef idx="1">
+            <a:schemeClr val="accent4"/>
+          </a:effectRef>
+          <a:fontRef idx="minor">
+            <a:schemeClr val="dk1"/>
+          </a:fontRef>
+        </p:style>
+        <p:txBody>
+          <a:bodyPr rtlCol="0" anchor="ctr"/>
+          <a:lstStyle/>
+          <a:p>
+            <a:pPr algn="ctr"/>
+            <a:r>
+              <a:rPr lang="en-GB" sz="1000" dirty="0" smtClean="0"/>
+              <a:t>MRQ</a:t>
+            </a:r>
+            <a:endParaRPr lang="en-GB" sz="1000" dirty="0"/>
+          </a:p>
+        </p:txBody>
+      </p:sp>
+      <p:cxnSp>
+        <p:nvCxnSpPr>
+          <p:cNvPr id="22" name="Straight Arrow Connector 21"/>
+          <p:cNvCxnSpPr>
+            <a:stCxn id="12" idx="2"/>
+            <a:endCxn id="21" idx="0"/>
+          </p:cNvCxnSpPr>
+          <p:nvPr/>
+        </p:nvCxnSpPr>
+        <p:spPr>
+          <a:xfrm rot="5400000">
+            <a:off x="4053112" y="-2497127"/>
+            <a:ext cx="247366" cy="3517318"/>
+          </a:xfrm>
+          <a:prstGeom prst="bentConnector3">
+            <a:avLst>
+              <a:gd name="adj1" fmla="val 34598"/>
+            </a:avLst>
+          </a:prstGeom>
+          <a:ln>
+            <a:tailEnd type="triangle"/>
+          </a:ln>
+        </p:spPr>
+        <p:style>
+          <a:lnRef idx="1">
+            <a:schemeClr val="dk1"/>
+          </a:lnRef>
+          <a:fillRef idx="0">
+            <a:schemeClr val="dk1"/>
+          </a:fillRef>
+          <a:effectRef idx="0">
+            <a:schemeClr val="dk1"/>
+          </a:effectRef>
+          <a:fontRef idx="minor">
+            <a:schemeClr val="tx1"/>
+          </a:fontRef>
+        </p:style>
+      </p:cxnSp>
+      <p:sp>
+        <p:nvSpPr>
+          <p:cNvPr id="26" name="Rounded Rectangle 25"/>
+          <p:cNvSpPr/>
+          <p:nvPr/>
+        </p:nvSpPr>
+        <p:spPr>
+          <a:xfrm>
+            <a:off x="3196740" y="-715298"/>
+            <a:ext cx="3359519" cy="445311"/>
+          </a:xfrm>
+          <a:prstGeom prst="roundRect">
+            <a:avLst/>
+          </a:prstGeom>
+          <a:gradFill flip="none" rotWithShape="1">
+            <a:gsLst>
+              <a:gs pos="53000">
+                <a:srgbClr val="FFF5D5"/>
+              </a:gs>
+              <a:gs pos="0">
+                <a:srgbClr val="FFEEE5"/>
+              </a:gs>
+              <a:gs pos="100000">
+                <a:srgbClr val="FFF5D5"/>
+              </a:gs>
+            </a:gsLst>
+            <a:lin ang="10800000" scaled="1"/>
+            <a:tileRect/>
+          </a:gradFill>
+          <a:ln>
+            <a:solidFill>
+              <a:schemeClr val="accent2">
+                <a:lumMod val="50000"/>
+              </a:schemeClr>
+            </a:solidFill>
+          </a:ln>
+        </p:spPr>
+        <p:style>
+          <a:lnRef idx="1">
+            <a:schemeClr val="accent4"/>
+          </a:lnRef>
+          <a:fillRef idx="2">
+            <a:schemeClr val="accent4"/>
+          </a:fillRef>
+          <a:effectRef idx="1">
+            <a:schemeClr val="accent4"/>
+          </a:effectRef>
+          <a:fontRef idx="minor">
+            <a:schemeClr val="dk1"/>
+          </a:fontRef>
+        </p:style>
+        <p:txBody>
+          <a:bodyPr rtlCol="0" anchor="ctr"/>
+          <a:lstStyle/>
+          <a:p>
+            <a:pPr algn="ctr"/>
+            <a:endParaRPr lang="en-GB" sz="1000" dirty="0"/>
+          </a:p>
+        </p:txBody>
+      </p:sp>
+      <p:cxnSp>
+        <p:nvCxnSpPr>
+          <p:cNvPr id="27" name="Straight Arrow Connector 26"/>
+          <p:cNvCxnSpPr>
+            <a:stCxn id="21" idx="3"/>
+            <a:endCxn id="26" idx="1"/>
+          </p:cNvCxnSpPr>
+          <p:nvPr/>
+        </p:nvCxnSpPr>
+        <p:spPr>
+          <a:xfrm flipV="1">
+            <a:off x="3038941" y="-492642"/>
+            <a:ext cx="157799" cy="2"/>
+          </a:xfrm>
+          <a:prstGeom prst="straightConnector1">
+            <a:avLst/>
+          </a:prstGeom>
+          <a:ln>
+            <a:tailEnd type="triangle"/>
+          </a:ln>
+        </p:spPr>
+        <p:style>
+          <a:lnRef idx="1">
+            <a:schemeClr val="dk1"/>
+          </a:lnRef>
+          <a:fillRef idx="0">
+            <a:schemeClr val="dk1"/>
+          </a:fillRef>
+          <a:effectRef idx="0">
+            <a:schemeClr val="dk1"/>
+          </a:effectRef>
+          <a:fontRef idx="minor">
+            <a:schemeClr val="tx1"/>
+          </a:fontRef>
+        </p:style>
+      </p:cxnSp>
+      <p:sp>
+        <p:nvSpPr>
+          <p:cNvPr id="30" name="Rounded Rectangle 29"/>
+          <p:cNvSpPr/>
+          <p:nvPr/>
+        </p:nvSpPr>
+        <p:spPr>
+          <a:xfrm>
+            <a:off x="3402466" y="-605479"/>
+            <a:ext cx="569345" cy="244289"/>
+          </a:xfrm>
+          <a:prstGeom prst="roundRect">
+            <a:avLst/>
+          </a:prstGeom>
+          <a:solidFill>
+            <a:schemeClr val="accent4">
+              <a:lumMod val="20000"/>
+              <a:lumOff val="80000"/>
+            </a:schemeClr>
+          </a:solidFill>
+          <a:ln>
+            <a:solidFill>
+              <a:schemeClr val="accent2">
+                <a:lumMod val="50000"/>
+              </a:schemeClr>
+            </a:solidFill>
+          </a:ln>
+        </p:spPr>
+        <p:style>
+          <a:lnRef idx="1">
+            <a:schemeClr val="accent4"/>
+          </a:lnRef>
+          <a:fillRef idx="2">
+            <a:schemeClr val="accent4"/>
+          </a:fillRef>
+          <a:effectRef idx="1">
+            <a:schemeClr val="accent4"/>
+          </a:effectRef>
+          <a:fontRef idx="minor">
+            <a:schemeClr val="dk1"/>
+          </a:fontRef>
+        </p:style>
+        <p:txBody>
+          <a:bodyPr rtlCol="0" anchor="ctr"/>
+          <a:lstStyle/>
+          <a:p>
+            <a:pPr algn="ctr"/>
+            <a:r>
+              <a:rPr lang="en-GB" sz="1000" smtClean="0"/>
+              <a:t>SRQ1</a:t>
+            </a:r>
+            <a:endParaRPr lang="en-GB" sz="1000" dirty="0"/>
+          </a:p>
+        </p:txBody>
+      </p:sp>
+      <p:sp>
+        <p:nvSpPr>
+          <p:cNvPr id="34" name="Rounded Rectangle 33"/>
+          <p:cNvSpPr/>
+          <p:nvPr/>
+        </p:nvSpPr>
+        <p:spPr>
+          <a:xfrm>
+            <a:off x="5006942" y="-612456"/>
+            <a:ext cx="569345" cy="244289"/>
+          </a:xfrm>
+          <a:prstGeom prst="roundRect">
+            <a:avLst/>
+          </a:prstGeom>
+          <a:solidFill>
+            <a:schemeClr val="accent4">
+              <a:lumMod val="20000"/>
+              <a:lumOff val="80000"/>
+            </a:schemeClr>
+          </a:solidFill>
+          <a:ln>
+            <a:solidFill>
+              <a:schemeClr val="accent2">
+                <a:lumMod val="50000"/>
+              </a:schemeClr>
+            </a:solidFill>
+          </a:ln>
+        </p:spPr>
+        <p:style>
+          <a:lnRef idx="1">
+            <a:schemeClr val="accent4"/>
+          </a:lnRef>
+          <a:fillRef idx="2">
+            <a:schemeClr val="accent4"/>
+          </a:fillRef>
+          <a:effectRef idx="1">
+            <a:schemeClr val="accent4"/>
+          </a:effectRef>
+          <a:fontRef idx="minor">
+            <a:schemeClr val="dk1"/>
+          </a:fontRef>
+        </p:style>
+        <p:txBody>
+          <a:bodyPr rtlCol="0" anchor="ctr"/>
+          <a:lstStyle/>
+          <a:p>
+            <a:pPr algn="ctr"/>
+            <a:r>
+              <a:rPr lang="en-GB" sz="1000" dirty="0" smtClean="0"/>
+              <a:t>SRQ3</a:t>
+            </a:r>
+            <a:endParaRPr lang="en-GB" sz="1000" dirty="0"/>
+          </a:p>
+        </p:txBody>
+      </p:sp>
+      <p:sp>
+        <p:nvSpPr>
+          <p:cNvPr id="35" name="Rounded Rectangle 34"/>
+          <p:cNvSpPr/>
+          <p:nvPr/>
+        </p:nvSpPr>
+        <p:spPr>
+          <a:xfrm>
+            <a:off x="4204704" y="-601347"/>
+            <a:ext cx="569345" cy="244289"/>
+          </a:xfrm>
+          <a:prstGeom prst="roundRect">
+            <a:avLst/>
+          </a:prstGeom>
+          <a:solidFill>
+            <a:schemeClr val="accent4">
+              <a:lumMod val="20000"/>
+              <a:lumOff val="80000"/>
+            </a:schemeClr>
+          </a:solidFill>
+          <a:ln>
+            <a:solidFill>
+              <a:schemeClr val="accent2">
+                <a:lumMod val="50000"/>
+              </a:schemeClr>
+            </a:solidFill>
+          </a:ln>
+        </p:spPr>
+        <p:style>
+          <a:lnRef idx="1">
+            <a:schemeClr val="accent4"/>
+          </a:lnRef>
+          <a:fillRef idx="2">
+            <a:schemeClr val="accent4"/>
+          </a:fillRef>
+          <a:effectRef idx="1">
+            <a:schemeClr val="accent4"/>
+          </a:effectRef>
+          <a:fontRef idx="minor">
+            <a:schemeClr val="dk1"/>
+          </a:fontRef>
+        </p:style>
+        <p:txBody>
+          <a:bodyPr rtlCol="0" anchor="ctr"/>
+          <a:lstStyle/>
+          <a:p>
+            <a:pPr algn="ctr"/>
+            <a:r>
+              <a:rPr lang="en-GB" sz="1000" smtClean="0"/>
+              <a:t>SRQ2</a:t>
+            </a:r>
+            <a:endParaRPr lang="en-GB" sz="1000" dirty="0"/>
+          </a:p>
+        </p:txBody>
+      </p:sp>
+      <p:sp>
+        <p:nvSpPr>
+          <p:cNvPr id="37" name="Rounded Rectangle 36"/>
+          <p:cNvSpPr/>
+          <p:nvPr/>
+        </p:nvSpPr>
+        <p:spPr>
+          <a:xfrm>
+            <a:off x="1694239" y="-74990"/>
+            <a:ext cx="4973261" cy="778808"/>
+          </a:xfrm>
+          <a:prstGeom prst="roundRect">
+            <a:avLst/>
+          </a:prstGeom>
+          <a:solidFill>
+            <a:schemeClr val="accent4">
+              <a:lumMod val="20000"/>
+              <a:lumOff val="80000"/>
+            </a:schemeClr>
+          </a:solidFill>
+          <a:ln>
+            <a:solidFill>
+              <a:schemeClr val="accent2">
+                <a:lumMod val="50000"/>
+              </a:schemeClr>
+            </a:solidFill>
+            <a:prstDash val="dash"/>
+          </a:ln>
+        </p:spPr>
+        <p:style>
+          <a:lnRef idx="1">
+            <a:schemeClr val="accent4"/>
+          </a:lnRef>
+          <a:fillRef idx="2">
+            <a:schemeClr val="accent4"/>
+          </a:fillRef>
+          <a:effectRef idx="1">
+            <a:schemeClr val="accent4"/>
+          </a:effectRef>
+          <a:fontRef idx="minor">
+            <a:schemeClr val="dk1"/>
+          </a:fontRef>
+        </p:style>
+        <p:txBody>
+          <a:bodyPr rtlCol="0" anchor="ctr"/>
+          <a:lstStyle/>
+          <a:p>
+            <a:pPr algn="ctr"/>
+            <a:endParaRPr lang="en-GB" sz="1000" dirty="0"/>
+          </a:p>
+        </p:txBody>
+      </p:sp>
+      <p:sp>
+        <p:nvSpPr>
+          <p:cNvPr id="38" name="Rounded Rectangle 37"/>
+          <p:cNvSpPr/>
+          <p:nvPr/>
+        </p:nvSpPr>
+        <p:spPr>
+          <a:xfrm>
+            <a:off x="1797333" y="75779"/>
+            <a:ext cx="1241611" cy="501411"/>
+          </a:xfrm>
+          <a:prstGeom prst="roundRect">
+            <a:avLst/>
+          </a:prstGeom>
+          <a:ln w="6350">
+            <a:solidFill>
+              <a:schemeClr val="tx1"/>
+            </a:solidFill>
+          </a:ln>
+        </p:spPr>
+        <p:style>
+          <a:lnRef idx="2">
+            <a:schemeClr val="accent1"/>
+          </a:lnRef>
+          <a:fillRef idx="1">
+            <a:schemeClr val="lt1"/>
+          </a:fillRef>
+          <a:effectRef idx="0">
+            <a:schemeClr val="accent1"/>
+          </a:effectRef>
+          <a:fontRef idx="minor">
+            <a:schemeClr val="dk1"/>
+          </a:fontRef>
+        </p:style>
+        <p:txBody>
+          <a:bodyPr rtlCol="0" anchor="ctr"/>
+          <a:lstStyle/>
+          <a:p>
+            <a:pPr algn="ctr"/>
+            <a:r>
+              <a:rPr lang="en-GB" sz="1000" dirty="0" smtClean="0"/>
+              <a:t>Methods for User Input in VR</a:t>
+            </a:r>
+            <a:endParaRPr lang="en-GB" sz="1000" dirty="0"/>
+          </a:p>
+        </p:txBody>
+      </p:sp>
+      <p:sp>
+        <p:nvSpPr>
+          <p:cNvPr id="39" name="Rounded Rectangle 38"/>
+          <p:cNvSpPr/>
+          <p:nvPr/>
+        </p:nvSpPr>
+        <p:spPr>
+          <a:xfrm>
+            <a:off x="3555990" y="69833"/>
+            <a:ext cx="1241611" cy="501411"/>
+          </a:xfrm>
+          <a:prstGeom prst="roundRect">
+            <a:avLst/>
+          </a:prstGeom>
+          <a:ln w="6350">
+            <a:solidFill>
+              <a:schemeClr val="tx1"/>
+            </a:solidFill>
+          </a:ln>
+        </p:spPr>
+        <p:style>
+          <a:lnRef idx="2">
+            <a:schemeClr val="accent1"/>
+          </a:lnRef>
+          <a:fillRef idx="1">
+            <a:schemeClr val="lt1"/>
+          </a:fillRef>
+          <a:effectRef idx="0">
+            <a:schemeClr val="accent1"/>
+          </a:effectRef>
+          <a:fontRef idx="minor">
+            <a:schemeClr val="dk1"/>
+          </a:fontRef>
+        </p:style>
+        <p:txBody>
+          <a:bodyPr rtlCol="0" anchor="ctr"/>
+          <a:lstStyle/>
+          <a:p>
+            <a:pPr algn="ctr"/>
+            <a:r>
+              <a:rPr lang="en-GB" sz="1000" dirty="0" smtClean="0"/>
+              <a:t>Interaction Patterns in VR</a:t>
+            </a:r>
+            <a:endParaRPr lang="en-GB" sz="1000" dirty="0"/>
+          </a:p>
+        </p:txBody>
+      </p:sp>
+      <p:sp>
+        <p:nvSpPr>
+          <p:cNvPr id="40" name="Rounded Rectangle 39"/>
+          <p:cNvSpPr/>
+          <p:nvPr/>
+        </p:nvSpPr>
+        <p:spPr>
+          <a:xfrm>
+            <a:off x="5314647" y="83479"/>
+            <a:ext cx="1241611" cy="505887"/>
+          </a:xfrm>
+          <a:prstGeom prst="roundRect">
+            <a:avLst/>
+          </a:prstGeom>
+          <a:ln w="6350">
+            <a:solidFill>
+              <a:schemeClr val="tx1"/>
+            </a:solidFill>
+          </a:ln>
+        </p:spPr>
+        <p:style>
+          <a:lnRef idx="2">
+            <a:schemeClr val="accent1"/>
+          </a:lnRef>
+          <a:fillRef idx="1">
+            <a:schemeClr val="lt1"/>
+          </a:fillRef>
+          <a:effectRef idx="0">
+            <a:schemeClr val="accent1"/>
+          </a:effectRef>
+          <a:fontRef idx="minor">
+            <a:schemeClr val="dk1"/>
+          </a:fontRef>
+        </p:style>
+        <p:txBody>
+          <a:bodyPr rtlCol="0" anchor="ctr"/>
+          <a:lstStyle/>
+          <a:p>
+            <a:pPr algn="ctr"/>
+            <a:r>
+              <a:rPr lang="en-GB" sz="1000" dirty="0" smtClean="0"/>
+              <a:t>Data Visualisation</a:t>
+            </a:r>
+            <a:endParaRPr lang="en-GB" sz="1000" dirty="0"/>
+          </a:p>
+        </p:txBody>
+      </p:sp>
+      <p:cxnSp>
+        <p:nvCxnSpPr>
+          <p:cNvPr id="41" name="Straight Arrow Connector 40"/>
+          <p:cNvCxnSpPr>
+            <a:stCxn id="30" idx="2"/>
+            <a:endCxn id="38" idx="0"/>
+          </p:cNvCxnSpPr>
+          <p:nvPr/>
+        </p:nvCxnSpPr>
+        <p:spPr>
+          <a:xfrm rot="5400000">
+            <a:off x="2834155" y="-777206"/>
+            <a:ext cx="436969" cy="1269000"/>
+          </a:xfrm>
+          <a:prstGeom prst="bentConnector3">
+            <a:avLst>
+              <a:gd name="adj1" fmla="val 53270"/>
+            </a:avLst>
+          </a:prstGeom>
+          <a:ln>
+            <a:tailEnd type="triangle"/>
+          </a:ln>
+        </p:spPr>
+        <p:style>
+          <a:lnRef idx="1">
+            <a:schemeClr val="dk1"/>
+          </a:lnRef>
+          <a:fillRef idx="0">
+            <a:schemeClr val="dk1"/>
+          </a:fillRef>
+          <a:effectRef idx="0">
+            <a:schemeClr val="dk1"/>
+          </a:effectRef>
+          <a:fontRef idx="minor">
+            <a:schemeClr val="tx1"/>
+          </a:fontRef>
+        </p:style>
+      </p:cxnSp>
+      <p:cxnSp>
+        <p:nvCxnSpPr>
+          <p:cNvPr id="44" name="Straight Arrow Connector 43"/>
+          <p:cNvCxnSpPr>
+            <a:stCxn id="34" idx="2"/>
+            <a:endCxn id="40" idx="0"/>
+          </p:cNvCxnSpPr>
+          <p:nvPr/>
+        </p:nvCxnSpPr>
+        <p:spPr>
+          <a:xfrm rot="16200000" flipH="1">
+            <a:off x="5387711" y="-464263"/>
+            <a:ext cx="451646" cy="643838"/>
+          </a:xfrm>
+          <a:prstGeom prst="bentConnector3">
+            <a:avLst>
+              <a:gd name="adj1" fmla="val 54218"/>
+            </a:avLst>
+          </a:prstGeom>
+          <a:ln>
+            <a:tailEnd type="triangle"/>
+          </a:ln>
+        </p:spPr>
+        <p:style>
+          <a:lnRef idx="1">
+            <a:schemeClr val="dk1"/>
+          </a:lnRef>
+          <a:fillRef idx="0">
+            <a:schemeClr val="dk1"/>
+          </a:fillRef>
+          <a:effectRef idx="0">
+            <a:schemeClr val="dk1"/>
+          </a:effectRef>
+          <a:fontRef idx="minor">
+            <a:schemeClr val="tx1"/>
+          </a:fontRef>
+        </p:style>
+      </p:cxnSp>
+      <p:cxnSp>
+        <p:nvCxnSpPr>
+          <p:cNvPr id="47" name="Straight Arrow Connector 46"/>
+          <p:cNvCxnSpPr>
+            <a:stCxn id="35" idx="2"/>
+            <a:endCxn id="39" idx="0"/>
+          </p:cNvCxnSpPr>
+          <p:nvPr/>
+        </p:nvCxnSpPr>
+        <p:spPr>
+          <a:xfrm rot="5400000">
+            <a:off x="4119642" y="-299903"/>
+            <a:ext cx="426891" cy="312581"/>
+          </a:xfrm>
+          <a:prstGeom prst="bentConnector3">
+            <a:avLst>
+              <a:gd name="adj1" fmla="val 54463"/>
+            </a:avLst>
+          </a:prstGeom>
+          <a:ln>
+            <a:tailEnd type="triangle"/>
+          </a:ln>
+        </p:spPr>
+        <p:style>
+          <a:lnRef idx="1">
+            <a:schemeClr val="dk1"/>
+          </a:lnRef>
+          <a:fillRef idx="0">
+            <a:schemeClr val="dk1"/>
+          </a:fillRef>
+          <a:effectRef idx="0">
+            <a:schemeClr val="dk1"/>
+          </a:effectRef>
+          <a:fontRef idx="minor">
+            <a:schemeClr val="tx1"/>
+          </a:fontRef>
+        </p:style>
+      </p:cxnSp>
+      <p:sp>
+        <p:nvSpPr>
+          <p:cNvPr id="52" name="Rounded Rectangle 51"/>
+          <p:cNvSpPr/>
+          <p:nvPr/>
+        </p:nvSpPr>
+        <p:spPr>
+          <a:xfrm>
+            <a:off x="1694239" y="801814"/>
+            <a:ext cx="4973261" cy="1379124"/>
+          </a:xfrm>
+          <a:prstGeom prst="roundRect">
+            <a:avLst/>
+          </a:prstGeom>
+          <a:solidFill>
+            <a:schemeClr val="accent6">
+              <a:lumMod val="20000"/>
+              <a:lumOff val="80000"/>
+            </a:schemeClr>
+          </a:solidFill>
+          <a:ln>
+            <a:solidFill>
+              <a:schemeClr val="accent6">
+                <a:lumMod val="50000"/>
+              </a:schemeClr>
+            </a:solidFill>
+            <a:prstDash val="dash"/>
+          </a:ln>
+        </p:spPr>
+        <p:style>
+          <a:lnRef idx="1">
+            <a:schemeClr val="accent6"/>
+          </a:lnRef>
+          <a:fillRef idx="2">
+            <a:schemeClr val="accent6"/>
+          </a:fillRef>
+          <a:effectRef idx="1">
+            <a:schemeClr val="accent6"/>
+          </a:effectRef>
+          <a:fontRef idx="minor">
+            <a:schemeClr val="dk1"/>
+          </a:fontRef>
+        </p:style>
+        <p:txBody>
+          <a:bodyPr rtlCol="0" anchor="ctr"/>
+          <a:lstStyle/>
+          <a:p>
+            <a:pPr algn="ctr"/>
+            <a:endParaRPr lang="en-GB" sz="1000" dirty="0"/>
+          </a:p>
+        </p:txBody>
+      </p:sp>
+      <p:sp>
+        <p:nvSpPr>
+          <p:cNvPr id="53" name="Rounded Rectangle 52"/>
+          <p:cNvSpPr/>
+          <p:nvPr/>
+        </p:nvSpPr>
+        <p:spPr>
+          <a:xfrm>
+            <a:off x="1797332" y="949344"/>
+            <a:ext cx="1241611" cy="244289"/>
+          </a:xfrm>
+          <a:prstGeom prst="roundRect">
+            <a:avLst/>
+          </a:prstGeom>
+          <a:ln w="6350">
+            <a:solidFill>
+              <a:schemeClr val="tx1"/>
+            </a:solidFill>
+          </a:ln>
+        </p:spPr>
+        <p:style>
+          <a:lnRef idx="2">
+            <a:schemeClr val="accent1"/>
+          </a:lnRef>
+          <a:fillRef idx="1">
+            <a:schemeClr val="lt1"/>
+          </a:fillRef>
+          <a:effectRef idx="0">
+            <a:schemeClr val="accent1"/>
+          </a:effectRef>
+          <a:fontRef idx="minor">
+            <a:schemeClr val="dk1"/>
+          </a:fontRef>
+        </p:style>
+        <p:txBody>
+          <a:bodyPr rtlCol="0" anchor="ctr"/>
+          <a:lstStyle/>
+          <a:p>
+            <a:pPr algn="ctr"/>
+            <a:r>
+              <a:rPr lang="en-GB" sz="1000" dirty="0" smtClean="0"/>
+              <a:t>Philosophy</a:t>
+            </a:r>
+            <a:endParaRPr lang="en-GB" sz="1000" dirty="0"/>
+          </a:p>
+        </p:txBody>
+      </p:sp>
+      <p:sp>
+        <p:nvSpPr>
+          <p:cNvPr id="54" name="Rounded Rectangle 53"/>
+          <p:cNvSpPr/>
+          <p:nvPr/>
+        </p:nvSpPr>
+        <p:spPr>
+          <a:xfrm>
+            <a:off x="3412271" y="949344"/>
+            <a:ext cx="1241611" cy="244289"/>
+          </a:xfrm>
+          <a:prstGeom prst="roundRect">
+            <a:avLst/>
+          </a:prstGeom>
+          <a:ln w="6350">
+            <a:solidFill>
+              <a:schemeClr val="tx1"/>
+            </a:solidFill>
+          </a:ln>
+        </p:spPr>
+        <p:style>
+          <a:lnRef idx="2">
+            <a:schemeClr val="accent1"/>
+          </a:lnRef>
+          <a:fillRef idx="1">
+            <a:schemeClr val="lt1"/>
+          </a:fillRef>
+          <a:effectRef idx="0">
+            <a:schemeClr val="accent1"/>
+          </a:effectRef>
+          <a:fontRef idx="minor">
+            <a:schemeClr val="dk1"/>
+          </a:fontRef>
+        </p:style>
+        <p:txBody>
+          <a:bodyPr rtlCol="0" anchor="ctr"/>
+          <a:lstStyle/>
+          <a:p>
+            <a:pPr algn="ctr"/>
+            <a:r>
+              <a:rPr lang="en-GB" sz="1000" smtClean="0"/>
+              <a:t>Approach</a:t>
+            </a:r>
+            <a:endParaRPr lang="en-GB" sz="1000" dirty="0"/>
+          </a:p>
+        </p:txBody>
+      </p:sp>
+      <p:sp>
+        <p:nvSpPr>
+          <p:cNvPr id="55" name="Rounded Rectangle 54"/>
+          <p:cNvSpPr/>
+          <p:nvPr/>
+        </p:nvSpPr>
+        <p:spPr>
+          <a:xfrm>
+            <a:off x="5027210" y="963664"/>
+            <a:ext cx="1241611" cy="244289"/>
+          </a:xfrm>
+          <a:prstGeom prst="roundRect">
+            <a:avLst/>
+          </a:prstGeom>
+          <a:ln w="6350">
+            <a:solidFill>
+              <a:schemeClr val="tx1"/>
+            </a:solidFill>
+          </a:ln>
+        </p:spPr>
+        <p:style>
+          <a:lnRef idx="2">
+            <a:schemeClr val="accent1"/>
+          </a:lnRef>
+          <a:fillRef idx="1">
+            <a:schemeClr val="lt1"/>
+          </a:fillRef>
+          <a:effectRef idx="0">
+            <a:schemeClr val="accent1"/>
+          </a:effectRef>
+          <a:fontRef idx="minor">
+            <a:schemeClr val="dk1"/>
+          </a:fontRef>
+        </p:style>
+        <p:txBody>
+          <a:bodyPr rtlCol="0" anchor="ctr"/>
+          <a:lstStyle/>
+          <a:p>
+            <a:pPr algn="ctr"/>
+            <a:r>
+              <a:rPr lang="en-GB" sz="1000" dirty="0" smtClean="0"/>
+              <a:t>Strategy</a:t>
+            </a:r>
+            <a:endParaRPr lang="en-GB" sz="1000" dirty="0"/>
+          </a:p>
+        </p:txBody>
+      </p:sp>
+      <p:sp>
+        <p:nvSpPr>
+          <p:cNvPr id="56" name="Rounded Rectangle 55"/>
+          <p:cNvSpPr/>
+          <p:nvPr/>
+        </p:nvSpPr>
+        <p:spPr>
+          <a:xfrm>
+            <a:off x="1797332" y="1294044"/>
+            <a:ext cx="4476468" cy="783801"/>
+          </a:xfrm>
+          <a:prstGeom prst="roundRect">
+            <a:avLst/>
+          </a:prstGeom>
+          <a:solidFill>
+            <a:schemeClr val="accent6">
+              <a:lumMod val="20000"/>
+              <a:lumOff val="80000"/>
+            </a:schemeClr>
+          </a:solidFill>
+          <a:ln>
+            <a:solidFill>
+              <a:schemeClr val="accent6">
+                <a:lumMod val="50000"/>
+              </a:schemeClr>
+            </a:solidFill>
+          </a:ln>
+        </p:spPr>
+        <p:style>
+          <a:lnRef idx="1">
+            <a:schemeClr val="accent6"/>
+          </a:lnRef>
+          <a:fillRef idx="2">
+            <a:schemeClr val="accent6"/>
+          </a:fillRef>
+          <a:effectRef idx="1">
+            <a:schemeClr val="accent6"/>
+          </a:effectRef>
+          <a:fontRef idx="minor">
+            <a:schemeClr val="dk1"/>
+          </a:fontRef>
+        </p:style>
+        <p:txBody>
+          <a:bodyPr rtlCol="0" anchor="ctr"/>
+          <a:lstStyle/>
+          <a:p>
+            <a:pPr algn="ctr"/>
+            <a:endParaRPr lang="en-GB" sz="1000" dirty="0"/>
+          </a:p>
+        </p:txBody>
+      </p:sp>
+      <p:sp>
+        <p:nvSpPr>
+          <p:cNvPr id="57" name="Rounded Rectangle 56"/>
+          <p:cNvSpPr/>
+          <p:nvPr/>
+        </p:nvSpPr>
+        <p:spPr>
+          <a:xfrm>
+            <a:off x="3567852" y="1396440"/>
+            <a:ext cx="911126" cy="244289"/>
+          </a:xfrm>
+          <a:prstGeom prst="roundRect">
+            <a:avLst/>
+          </a:prstGeom>
+          <a:ln w="6350">
+            <a:solidFill>
+              <a:schemeClr val="tx1"/>
+            </a:solidFill>
+          </a:ln>
+        </p:spPr>
+        <p:style>
+          <a:lnRef idx="2">
+            <a:schemeClr val="accent1"/>
+          </a:lnRef>
+          <a:fillRef idx="1">
+            <a:schemeClr val="lt1"/>
+          </a:fillRef>
+          <a:effectRef idx="0">
+            <a:schemeClr val="accent1"/>
+          </a:effectRef>
+          <a:fontRef idx="minor">
+            <a:schemeClr val="dk1"/>
+          </a:fontRef>
+        </p:style>
+        <p:txBody>
+          <a:bodyPr rtlCol="0" anchor="ctr"/>
+          <a:lstStyle/>
+          <a:p>
+            <a:pPr algn="ctr"/>
+            <a:r>
+              <a:rPr lang="en-GB" sz="1000" smtClean="0"/>
+              <a:t>Development</a:t>
+            </a:r>
+            <a:endParaRPr lang="en-GB" sz="1000" dirty="0"/>
+          </a:p>
+        </p:txBody>
+      </p:sp>
+      <p:sp>
+        <p:nvSpPr>
+          <p:cNvPr id="58" name="Rounded Rectangle 57"/>
+          <p:cNvSpPr/>
+          <p:nvPr/>
+        </p:nvSpPr>
+        <p:spPr>
+          <a:xfrm>
+            <a:off x="1897372" y="1396440"/>
+            <a:ext cx="911126" cy="244289"/>
+          </a:xfrm>
+          <a:prstGeom prst="roundRect">
+            <a:avLst/>
+          </a:prstGeom>
+          <a:ln w="6350">
+            <a:solidFill>
+              <a:schemeClr val="tx1"/>
+            </a:solidFill>
+          </a:ln>
+        </p:spPr>
+        <p:style>
+          <a:lnRef idx="2">
+            <a:schemeClr val="accent1"/>
+          </a:lnRef>
+          <a:fillRef idx="1">
+            <a:schemeClr val="lt1"/>
+          </a:fillRef>
+          <a:effectRef idx="0">
+            <a:schemeClr val="accent1"/>
+          </a:effectRef>
+          <a:fontRef idx="minor">
+            <a:schemeClr val="dk1"/>
+          </a:fontRef>
+        </p:style>
+        <p:txBody>
+          <a:bodyPr rtlCol="0" anchor="ctr"/>
+          <a:lstStyle/>
+          <a:p>
+            <a:pPr algn="ctr"/>
+            <a:r>
+              <a:rPr lang="en-GB" sz="1000" dirty="0" smtClean="0"/>
+              <a:t>Awareness</a:t>
+            </a:r>
+            <a:endParaRPr lang="en-GB" sz="1000" dirty="0"/>
+          </a:p>
+        </p:txBody>
+      </p:sp>
+      <p:sp>
+        <p:nvSpPr>
+          <p:cNvPr id="59" name="Rounded Rectangle 58"/>
+          <p:cNvSpPr/>
+          <p:nvPr/>
+        </p:nvSpPr>
+        <p:spPr>
+          <a:xfrm>
+            <a:off x="2744620" y="1732380"/>
+            <a:ext cx="911126" cy="244289"/>
+          </a:xfrm>
+          <a:prstGeom prst="roundRect">
+            <a:avLst/>
+          </a:prstGeom>
+          <a:ln w="6350">
+            <a:solidFill>
+              <a:schemeClr val="tx1"/>
+            </a:solidFill>
+          </a:ln>
+        </p:spPr>
+        <p:style>
+          <a:lnRef idx="2">
+            <a:schemeClr val="accent1"/>
+          </a:lnRef>
+          <a:fillRef idx="1">
+            <a:schemeClr val="lt1"/>
+          </a:fillRef>
+          <a:effectRef idx="0">
+            <a:schemeClr val="accent1"/>
+          </a:effectRef>
+          <a:fontRef idx="minor">
+            <a:schemeClr val="dk1"/>
+          </a:fontRef>
+        </p:style>
+        <p:txBody>
+          <a:bodyPr rtlCol="0" anchor="ctr"/>
+          <a:lstStyle/>
+          <a:p>
+            <a:pPr algn="ctr"/>
+            <a:r>
+              <a:rPr lang="en-GB" sz="1000" dirty="0" smtClean="0"/>
+              <a:t>Suggestion</a:t>
+            </a:r>
+            <a:endParaRPr lang="en-GB" sz="1000" dirty="0"/>
+          </a:p>
+        </p:txBody>
+      </p:sp>
+      <p:sp>
+        <p:nvSpPr>
+          <p:cNvPr id="60" name="Rounded Rectangle 59"/>
+          <p:cNvSpPr/>
+          <p:nvPr/>
+        </p:nvSpPr>
+        <p:spPr>
+          <a:xfrm>
+            <a:off x="4419015" y="1749353"/>
+            <a:ext cx="911126" cy="244289"/>
+          </a:xfrm>
+          <a:prstGeom prst="roundRect">
+            <a:avLst/>
+          </a:prstGeom>
+          <a:ln w="6350">
+            <a:solidFill>
+              <a:schemeClr val="tx1"/>
+            </a:solidFill>
+          </a:ln>
+        </p:spPr>
+        <p:style>
+          <a:lnRef idx="2">
+            <a:schemeClr val="accent1"/>
+          </a:lnRef>
+          <a:fillRef idx="1">
+            <a:schemeClr val="lt1"/>
+          </a:fillRef>
+          <a:effectRef idx="0">
+            <a:schemeClr val="accent1"/>
+          </a:effectRef>
+          <a:fontRef idx="minor">
+            <a:schemeClr val="dk1"/>
+          </a:fontRef>
+        </p:style>
+        <p:txBody>
+          <a:bodyPr rtlCol="0" anchor="ctr"/>
+          <a:lstStyle/>
+          <a:p>
+            <a:pPr algn="ctr"/>
+            <a:r>
+              <a:rPr lang="en-GB" sz="1000" dirty="0" smtClean="0"/>
+              <a:t>Evaluation</a:t>
+            </a:r>
+            <a:endParaRPr lang="en-GB" sz="1000" dirty="0"/>
+          </a:p>
+        </p:txBody>
+      </p:sp>
+      <p:sp>
+        <p:nvSpPr>
+          <p:cNvPr id="61" name="Rounded Rectangle 60"/>
+          <p:cNvSpPr/>
+          <p:nvPr/>
+        </p:nvSpPr>
+        <p:spPr>
+          <a:xfrm>
+            <a:off x="5238332" y="1396440"/>
+            <a:ext cx="911126" cy="244289"/>
+          </a:xfrm>
+          <a:prstGeom prst="roundRect">
+            <a:avLst/>
+          </a:prstGeom>
+          <a:ln w="6350">
+            <a:solidFill>
+              <a:schemeClr val="tx1"/>
+            </a:solidFill>
+          </a:ln>
+        </p:spPr>
+        <p:style>
+          <a:lnRef idx="2">
+            <a:schemeClr val="accent1"/>
+          </a:lnRef>
+          <a:fillRef idx="1">
+            <a:schemeClr val="lt1"/>
+          </a:fillRef>
+          <a:effectRef idx="0">
+            <a:schemeClr val="accent1"/>
+          </a:effectRef>
+          <a:fontRef idx="minor">
+            <a:schemeClr val="dk1"/>
+          </a:fontRef>
+        </p:style>
+        <p:txBody>
+          <a:bodyPr rtlCol="0" anchor="ctr"/>
+          <a:lstStyle/>
+          <a:p>
+            <a:pPr algn="ctr"/>
+            <a:r>
+              <a:rPr lang="en-GB" sz="1000" dirty="0" smtClean="0"/>
+              <a:t>Conclusion</a:t>
+            </a:r>
+            <a:endParaRPr lang="en-GB" sz="1000" dirty="0"/>
+          </a:p>
+        </p:txBody>
+      </p:sp>
+      <p:cxnSp>
+        <p:nvCxnSpPr>
+          <p:cNvPr id="62" name="Straight Arrow Connector 61"/>
+          <p:cNvCxnSpPr>
+            <a:stCxn id="58" idx="2"/>
+            <a:endCxn id="59" idx="1"/>
+          </p:cNvCxnSpPr>
+          <p:nvPr/>
+        </p:nvCxnSpPr>
+        <p:spPr>
+          <a:xfrm rot="16200000" flipH="1">
+            <a:off x="2441879" y="1551784"/>
+            <a:ext cx="213796" cy="391685"/>
+          </a:xfrm>
+          <a:prstGeom prst="bentConnector2">
+            <a:avLst/>
+          </a:prstGeom>
+          <a:ln>
+            <a:tailEnd type="triangle"/>
+          </a:ln>
+        </p:spPr>
+        <p:style>
+          <a:lnRef idx="1">
+            <a:schemeClr val="dk1"/>
+          </a:lnRef>
+          <a:fillRef idx="0">
+            <a:schemeClr val="dk1"/>
+          </a:fillRef>
+          <a:effectRef idx="0">
+            <a:schemeClr val="dk1"/>
+          </a:effectRef>
+          <a:fontRef idx="minor">
+            <a:schemeClr val="tx1"/>
+          </a:fontRef>
+        </p:style>
+      </p:cxnSp>
+      <p:cxnSp>
+        <p:nvCxnSpPr>
+          <p:cNvPr id="65" name="Straight Arrow Connector 64"/>
+          <p:cNvCxnSpPr>
+            <a:stCxn id="59" idx="0"/>
+            <a:endCxn id="57" idx="1"/>
+          </p:cNvCxnSpPr>
+          <p:nvPr/>
+        </p:nvCxnSpPr>
+        <p:spPr>
+          <a:xfrm rot="5400000" flipH="1" flipV="1">
+            <a:off x="3277120" y="1441649"/>
+            <a:ext cx="213795" cy="367669"/>
+          </a:xfrm>
+          <a:prstGeom prst="bentConnector2">
+            <a:avLst/>
+          </a:prstGeom>
+          <a:ln>
+            <a:tailEnd type="triangle"/>
+          </a:ln>
+        </p:spPr>
+        <p:style>
+          <a:lnRef idx="1">
+            <a:schemeClr val="dk1"/>
+          </a:lnRef>
+          <a:fillRef idx="0">
+            <a:schemeClr val="dk1"/>
+          </a:fillRef>
+          <a:effectRef idx="0">
+            <a:schemeClr val="dk1"/>
+          </a:effectRef>
+          <a:fontRef idx="minor">
+            <a:schemeClr val="tx1"/>
+          </a:fontRef>
+        </p:style>
+      </p:cxnSp>
+      <p:cxnSp>
+        <p:nvCxnSpPr>
+          <p:cNvPr id="69" name="Straight Arrow Connector 68"/>
+          <p:cNvCxnSpPr>
+            <a:stCxn id="60" idx="0"/>
+            <a:endCxn id="61" idx="1"/>
+          </p:cNvCxnSpPr>
+          <p:nvPr/>
+        </p:nvCxnSpPr>
+        <p:spPr>
+          <a:xfrm rot="5400000" flipH="1" flipV="1">
+            <a:off x="4941071" y="1452092"/>
+            <a:ext cx="230768" cy="363754"/>
+          </a:xfrm>
+          <a:prstGeom prst="bentConnector2">
+            <a:avLst/>
+          </a:prstGeom>
+          <a:ln>
+            <a:tailEnd type="triangle"/>
+          </a:ln>
+        </p:spPr>
+        <p:style>
+          <a:lnRef idx="1">
+            <a:schemeClr val="dk1"/>
+          </a:lnRef>
+          <a:fillRef idx="0">
+            <a:schemeClr val="dk1"/>
+          </a:fillRef>
+          <a:effectRef idx="0">
+            <a:schemeClr val="dk1"/>
+          </a:effectRef>
+          <a:fontRef idx="minor">
+            <a:schemeClr val="tx1"/>
+          </a:fontRef>
+        </p:style>
+      </p:cxnSp>
+      <p:cxnSp>
+        <p:nvCxnSpPr>
+          <p:cNvPr id="72" name="Straight Arrow Connector 71"/>
+          <p:cNvCxnSpPr>
+            <a:stCxn id="57" idx="2"/>
+            <a:endCxn id="60" idx="1"/>
+          </p:cNvCxnSpPr>
+          <p:nvPr/>
+        </p:nvCxnSpPr>
+        <p:spPr>
+          <a:xfrm rot="16200000" flipH="1">
+            <a:off x="4105831" y="1558313"/>
+            <a:ext cx="230769" cy="395600"/>
+          </a:xfrm>
+          <a:prstGeom prst="bentConnector2">
+            <a:avLst/>
+          </a:prstGeom>
+          <a:ln>
+            <a:tailEnd type="triangle"/>
+          </a:ln>
+        </p:spPr>
+        <p:style>
+          <a:lnRef idx="1">
+            <a:schemeClr val="dk1"/>
+          </a:lnRef>
+          <a:fillRef idx="0">
+            <a:schemeClr val="dk1"/>
+          </a:fillRef>
+          <a:effectRef idx="0">
+            <a:schemeClr val="dk1"/>
+          </a:effectRef>
+          <a:fontRef idx="minor">
+            <a:schemeClr val="tx1"/>
+          </a:fontRef>
+        </p:style>
+      </p:cxnSp>
+      <p:cxnSp>
+        <p:nvCxnSpPr>
+          <p:cNvPr id="75" name="Straight Arrow Connector 74"/>
+          <p:cNvCxnSpPr>
+            <a:stCxn id="55" idx="3"/>
+            <a:endCxn id="56" idx="3"/>
+          </p:cNvCxnSpPr>
+          <p:nvPr/>
+        </p:nvCxnSpPr>
+        <p:spPr>
+          <a:xfrm>
+            <a:off x="6268821" y="1085809"/>
+            <a:ext cx="4979" cy="600136"/>
+          </a:xfrm>
+          <a:prstGeom prst="bentConnector3">
+            <a:avLst>
+              <a:gd name="adj1" fmla="val 4691283"/>
+            </a:avLst>
+          </a:prstGeom>
+          <a:ln>
+            <a:tailEnd type="triangle"/>
+          </a:ln>
+        </p:spPr>
+        <p:style>
+          <a:lnRef idx="1">
+            <a:schemeClr val="dk1"/>
+          </a:lnRef>
+          <a:fillRef idx="0">
+            <a:schemeClr val="dk1"/>
+          </a:fillRef>
+          <a:effectRef idx="0">
+            <a:schemeClr val="dk1"/>
+          </a:effectRef>
+          <a:fontRef idx="minor">
+            <a:schemeClr val="tx1"/>
+          </a:fontRef>
+        </p:style>
+      </p:cxnSp>
+      <p:cxnSp>
+        <p:nvCxnSpPr>
+          <p:cNvPr id="83" name="Straight Arrow Connector 82"/>
+          <p:cNvCxnSpPr>
+            <a:stCxn id="4" idx="2"/>
+            <a:endCxn id="5" idx="0"/>
+          </p:cNvCxnSpPr>
+          <p:nvPr/>
+        </p:nvCxnSpPr>
+        <p:spPr>
+          <a:xfrm>
+            <a:off x="880792" y="-454255"/>
+            <a:ext cx="0" cy="519898"/>
+          </a:xfrm>
+          <a:prstGeom prst="straightConnector1">
+            <a:avLst/>
+          </a:prstGeom>
+          <a:ln>
+            <a:tailEnd type="triangle"/>
+          </a:ln>
+        </p:spPr>
+        <p:style>
+          <a:lnRef idx="1">
+            <a:schemeClr val="dk1"/>
+          </a:lnRef>
+          <a:fillRef idx="0">
+            <a:schemeClr val="dk1"/>
+          </a:fillRef>
+          <a:effectRef idx="0">
+            <a:schemeClr val="dk1"/>
+          </a:effectRef>
+          <a:fontRef idx="minor">
+            <a:schemeClr val="tx1"/>
+          </a:fontRef>
+        </p:style>
+      </p:cxnSp>
+      <p:cxnSp>
+        <p:nvCxnSpPr>
+          <p:cNvPr id="86" name="Straight Arrow Connector 85"/>
+          <p:cNvCxnSpPr>
+            <a:stCxn id="5" idx="2"/>
+            <a:endCxn id="6" idx="0"/>
+          </p:cNvCxnSpPr>
+          <p:nvPr/>
+        </p:nvCxnSpPr>
+        <p:spPr>
+          <a:xfrm>
+            <a:off x="880792" y="563184"/>
+            <a:ext cx="0" cy="673014"/>
+          </a:xfrm>
+          <a:prstGeom prst="straightConnector1">
+            <a:avLst/>
+          </a:prstGeom>
+          <a:ln>
+            <a:tailEnd type="triangle"/>
+          </a:ln>
+        </p:spPr>
+        <p:style>
+          <a:lnRef idx="1">
+            <a:schemeClr val="dk1"/>
+          </a:lnRef>
+          <a:fillRef idx="0">
+            <a:schemeClr val="dk1"/>
+          </a:fillRef>
+          <a:effectRef idx="0">
+            <a:schemeClr val="dk1"/>
+          </a:effectRef>
+          <a:fontRef idx="minor">
+            <a:schemeClr val="tx1"/>
+          </a:fontRef>
+        </p:style>
+      </p:cxnSp>
+      <p:cxnSp>
+        <p:nvCxnSpPr>
+          <p:cNvPr id="89" name="Straight Arrow Connector 88"/>
+          <p:cNvCxnSpPr>
+            <a:stCxn id="6" idx="2"/>
+            <a:endCxn id="7" idx="0"/>
+          </p:cNvCxnSpPr>
+          <p:nvPr/>
+        </p:nvCxnSpPr>
+        <p:spPr>
+          <a:xfrm>
+            <a:off x="880792" y="1733739"/>
+            <a:ext cx="0" cy="823436"/>
+          </a:xfrm>
+          <a:prstGeom prst="straightConnector1">
+            <a:avLst/>
+          </a:prstGeom>
+          <a:ln>
+            <a:tailEnd type="triangle"/>
+          </a:ln>
+        </p:spPr>
+        <p:style>
+          <a:lnRef idx="1">
+            <a:schemeClr val="dk1"/>
+          </a:lnRef>
+          <a:fillRef idx="0">
+            <a:schemeClr val="dk1"/>
+          </a:fillRef>
+          <a:effectRef idx="0">
+            <a:schemeClr val="dk1"/>
+          </a:effectRef>
+          <a:fontRef idx="minor">
+            <a:schemeClr val="tx1"/>
+          </a:fontRef>
+        </p:style>
+      </p:cxnSp>
+      <p:sp>
+        <p:nvSpPr>
+          <p:cNvPr id="92" name="Rounded Rectangle 91"/>
+          <p:cNvSpPr/>
+          <p:nvPr/>
+        </p:nvSpPr>
+        <p:spPr>
+          <a:xfrm>
+            <a:off x="1678035" y="2289562"/>
+            <a:ext cx="4997520" cy="1032767"/>
+          </a:xfrm>
+          <a:prstGeom prst="roundRect">
+            <a:avLst/>
+          </a:prstGeom>
+          <a:solidFill>
+            <a:srgbClr val="FFEEE5"/>
+          </a:solidFill>
+          <a:ln>
+            <a:prstDash val="dash"/>
+          </a:ln>
+        </p:spPr>
+        <p:style>
+          <a:lnRef idx="1">
+            <a:schemeClr val="accent2"/>
+          </a:lnRef>
+          <a:fillRef idx="2">
+            <a:schemeClr val="accent2"/>
+          </a:fillRef>
+          <a:effectRef idx="1">
+            <a:schemeClr val="accent2"/>
+          </a:effectRef>
+          <a:fontRef idx="minor">
+            <a:schemeClr val="dk1"/>
+          </a:fontRef>
+        </p:style>
+        <p:txBody>
+          <a:bodyPr rtlCol="0" anchor="ctr"/>
+          <a:lstStyle/>
+          <a:p>
+            <a:pPr algn="ctr"/>
+            <a:endParaRPr lang="en-GB" sz="1000" dirty="0"/>
+          </a:p>
+        </p:txBody>
+      </p:sp>
+      <p:sp>
+        <p:nvSpPr>
+          <p:cNvPr id="45" name="Rounded Rectangle 44"/>
+          <p:cNvSpPr/>
+          <p:nvPr/>
+        </p:nvSpPr>
+        <p:spPr>
+          <a:xfrm>
+            <a:off x="295845" y="3494297"/>
+            <a:ext cx="1169894" cy="497541"/>
+          </a:xfrm>
+          <a:prstGeom prst="roundRect">
+            <a:avLst/>
+          </a:prstGeom>
+          <a:solidFill>
+            <a:srgbClr val="F3EBF9"/>
+          </a:solidFill>
+          <a:ln>
+            <a:solidFill>
+              <a:srgbClr val="7030A0"/>
+            </a:solidFill>
+          </a:ln>
+        </p:spPr>
+        <p:style>
+          <a:lnRef idx="1">
+            <a:schemeClr val="accent3"/>
+          </a:lnRef>
+          <a:fillRef idx="2">
+            <a:schemeClr val="accent3"/>
+          </a:fillRef>
+          <a:effectRef idx="1">
+            <a:schemeClr val="accent3"/>
+          </a:effectRef>
+          <a:fontRef idx="minor">
+            <a:schemeClr val="dk1"/>
+          </a:fontRef>
+        </p:style>
+        <p:txBody>
+          <a:bodyPr rtlCol="0" anchor="ctr"/>
+          <a:lstStyle/>
+          <a:p>
+            <a:pPr algn="ctr"/>
+            <a:r>
+              <a:rPr lang="en-GB" sz="1000" dirty="0" smtClean="0"/>
+              <a:t>Prototype </a:t>
+            </a:r>
+            <a:r>
+              <a:rPr lang="en-GB" sz="1000" dirty="0" smtClean="0"/>
+              <a:t>Development</a:t>
+            </a:r>
+            <a:endParaRPr lang="en-GB" sz="1000" dirty="0"/>
+          </a:p>
+        </p:txBody>
+      </p:sp>
+      <p:sp>
+        <p:nvSpPr>
+          <p:cNvPr id="46" name="Rounded Rectangle 45"/>
+          <p:cNvSpPr/>
+          <p:nvPr/>
+        </p:nvSpPr>
+        <p:spPr>
+          <a:xfrm>
+            <a:off x="1682045" y="3430952"/>
+            <a:ext cx="4997520" cy="617173"/>
+          </a:xfrm>
+          <a:prstGeom prst="roundRect">
+            <a:avLst/>
+          </a:prstGeom>
+          <a:solidFill>
+            <a:srgbClr val="F3EBF9"/>
+          </a:solidFill>
+          <a:ln>
+            <a:solidFill>
+              <a:srgbClr val="7030A0"/>
+            </a:solidFill>
+            <a:prstDash val="dash"/>
+          </a:ln>
+        </p:spPr>
+        <p:style>
+          <a:lnRef idx="1">
+            <a:schemeClr val="accent3"/>
+          </a:lnRef>
+          <a:fillRef idx="2">
+            <a:schemeClr val="accent3"/>
+          </a:fillRef>
+          <a:effectRef idx="1">
+            <a:schemeClr val="accent3"/>
+          </a:effectRef>
+          <a:fontRef idx="minor">
+            <a:schemeClr val="dk1"/>
+          </a:fontRef>
+        </p:style>
+        <p:txBody>
+          <a:bodyPr rtlCol="0" anchor="ctr"/>
+          <a:lstStyle/>
+          <a:p>
+            <a:pPr algn="ctr"/>
+            <a:endParaRPr lang="en-GB" sz="1000" dirty="0"/>
+          </a:p>
+        </p:txBody>
+      </p:sp>
+      <p:sp>
+        <p:nvSpPr>
+          <p:cNvPr id="48" name="Rounded Rectangle 47"/>
+          <p:cNvSpPr/>
+          <p:nvPr/>
+        </p:nvSpPr>
+        <p:spPr>
+          <a:xfrm>
+            <a:off x="295845" y="4278164"/>
+            <a:ext cx="1169894" cy="497541"/>
+          </a:xfrm>
+          <a:prstGeom prst="roundRect">
+            <a:avLst/>
+          </a:prstGeom>
+          <a:solidFill>
+            <a:srgbClr val="EBEEF1"/>
+          </a:solidFill>
+          <a:ln>
+            <a:solidFill>
+              <a:schemeClr val="bg1">
+                <a:lumMod val="50000"/>
+              </a:schemeClr>
+            </a:solidFill>
+          </a:ln>
+        </p:spPr>
+        <p:style>
+          <a:lnRef idx="1">
+            <a:schemeClr val="accent3"/>
+          </a:lnRef>
+          <a:fillRef idx="2">
+            <a:schemeClr val="accent3"/>
+          </a:fillRef>
+          <a:effectRef idx="1">
+            <a:schemeClr val="accent3"/>
+          </a:effectRef>
+          <a:fontRef idx="minor">
+            <a:schemeClr val="dk1"/>
+          </a:fontRef>
+        </p:style>
+        <p:txBody>
+          <a:bodyPr rtlCol="0" anchor="ctr"/>
+          <a:lstStyle/>
+          <a:p>
+            <a:pPr algn="ctr"/>
+            <a:r>
+              <a:rPr lang="en-GB" sz="1000" smtClean="0"/>
+              <a:t>Evaluation</a:t>
+            </a:r>
+            <a:endParaRPr lang="en-GB" sz="1000" dirty="0"/>
+          </a:p>
+        </p:txBody>
+      </p:sp>
+      <p:sp>
+        <p:nvSpPr>
+          <p:cNvPr id="49" name="Rounded Rectangle 48"/>
+          <p:cNvSpPr/>
+          <p:nvPr/>
+        </p:nvSpPr>
+        <p:spPr>
+          <a:xfrm>
+            <a:off x="1682044" y="4153121"/>
+            <a:ext cx="4997520" cy="844329"/>
+          </a:xfrm>
+          <a:prstGeom prst="roundRect">
+            <a:avLst/>
+          </a:prstGeom>
+          <a:solidFill>
+            <a:srgbClr val="EBEEF1"/>
+          </a:solidFill>
+          <a:ln>
+            <a:solidFill>
+              <a:schemeClr val="bg1">
+                <a:lumMod val="50000"/>
+              </a:schemeClr>
+            </a:solidFill>
+            <a:prstDash val="dash"/>
+          </a:ln>
+        </p:spPr>
+        <p:style>
+          <a:lnRef idx="1">
+            <a:schemeClr val="accent3"/>
+          </a:lnRef>
+          <a:fillRef idx="2">
+            <a:schemeClr val="accent3"/>
+          </a:fillRef>
+          <a:effectRef idx="1">
+            <a:schemeClr val="accent3"/>
+          </a:effectRef>
+          <a:fontRef idx="minor">
+            <a:schemeClr val="dk1"/>
+          </a:fontRef>
+        </p:style>
+        <p:txBody>
+          <a:bodyPr rtlCol="0" anchor="ctr"/>
+          <a:lstStyle/>
+          <a:p>
+            <a:pPr algn="ctr"/>
+            <a:endParaRPr lang="en-GB" sz="1000" dirty="0"/>
+          </a:p>
+        </p:txBody>
+      </p:sp>
+      <p:sp>
+        <p:nvSpPr>
+          <p:cNvPr id="50" name="Rounded Rectangle 49"/>
+          <p:cNvSpPr/>
+          <p:nvPr/>
+        </p:nvSpPr>
+        <p:spPr>
+          <a:xfrm>
+            <a:off x="295845" y="5135058"/>
+            <a:ext cx="1169894" cy="497541"/>
+          </a:xfrm>
+          <a:prstGeom prst="roundRect">
+            <a:avLst/>
+          </a:prstGeom>
+          <a:solidFill>
+            <a:schemeClr val="bg1"/>
+          </a:solidFill>
+          <a:ln>
+            <a:solidFill>
+              <a:schemeClr val="tx1"/>
+            </a:solidFill>
+          </a:ln>
+        </p:spPr>
+        <p:style>
+          <a:lnRef idx="1">
+            <a:schemeClr val="accent3"/>
+          </a:lnRef>
+          <a:fillRef idx="2">
+            <a:schemeClr val="accent3"/>
+          </a:fillRef>
+          <a:effectRef idx="1">
+            <a:schemeClr val="accent3"/>
+          </a:effectRef>
+          <a:fontRef idx="minor">
+            <a:schemeClr val="dk1"/>
+          </a:fontRef>
+        </p:style>
+        <p:txBody>
+          <a:bodyPr rtlCol="0" anchor="ctr"/>
+          <a:lstStyle/>
+          <a:p>
+            <a:pPr algn="ctr"/>
+            <a:r>
+              <a:rPr lang="en-GB" sz="1000" dirty="0" smtClean="0"/>
+              <a:t>Conclusion</a:t>
+            </a:r>
+            <a:endParaRPr lang="en-GB" sz="1000" dirty="0"/>
+          </a:p>
+        </p:txBody>
+      </p:sp>
+      <p:sp>
+        <p:nvSpPr>
+          <p:cNvPr id="51" name="Rounded Rectangle 50"/>
+          <p:cNvSpPr/>
+          <p:nvPr/>
+        </p:nvSpPr>
+        <p:spPr>
+          <a:xfrm>
+            <a:off x="1682045" y="5106354"/>
+            <a:ext cx="4997520" cy="548185"/>
+          </a:xfrm>
+          <a:prstGeom prst="roundRect">
+            <a:avLst/>
+          </a:prstGeom>
+          <a:solidFill>
+            <a:schemeClr val="bg1"/>
+          </a:solidFill>
+          <a:ln>
+            <a:solidFill>
+              <a:schemeClr val="tx1"/>
+            </a:solidFill>
+            <a:prstDash val="dash"/>
+          </a:ln>
+        </p:spPr>
+        <p:style>
+          <a:lnRef idx="1">
+            <a:schemeClr val="accent3"/>
+          </a:lnRef>
+          <a:fillRef idx="2">
+            <a:schemeClr val="accent3"/>
+          </a:fillRef>
+          <a:effectRef idx="1">
+            <a:schemeClr val="accent3"/>
+          </a:effectRef>
+          <a:fontRef idx="minor">
+            <a:schemeClr val="dk1"/>
+          </a:fontRef>
+        </p:style>
+        <p:txBody>
+          <a:bodyPr rtlCol="0" anchor="ctr"/>
+          <a:lstStyle/>
+          <a:p>
+            <a:pPr algn="ctr"/>
+            <a:endParaRPr lang="en-GB" sz="1000" dirty="0"/>
+          </a:p>
+        </p:txBody>
+      </p:sp>
+      <p:cxnSp>
+        <p:nvCxnSpPr>
+          <p:cNvPr id="63" name="Straight Arrow Connector 62"/>
+          <p:cNvCxnSpPr>
+            <a:stCxn id="7" idx="2"/>
+            <a:endCxn id="45" idx="0"/>
+          </p:cNvCxnSpPr>
+          <p:nvPr/>
+        </p:nvCxnSpPr>
+        <p:spPr>
+          <a:xfrm>
+            <a:off x="880792" y="3054716"/>
+            <a:ext cx="0" cy="439581"/>
+          </a:xfrm>
+          <a:prstGeom prst="straightConnector1">
+            <a:avLst/>
+          </a:prstGeom>
+          <a:ln>
+            <a:tailEnd type="triangle"/>
+          </a:ln>
+        </p:spPr>
+        <p:style>
+          <a:lnRef idx="1">
+            <a:schemeClr val="dk1"/>
+          </a:lnRef>
+          <a:fillRef idx="0">
+            <a:schemeClr val="dk1"/>
+          </a:fillRef>
+          <a:effectRef idx="0">
+            <a:schemeClr val="dk1"/>
+          </a:effectRef>
+          <a:fontRef idx="minor">
+            <a:schemeClr val="tx1"/>
+          </a:fontRef>
+        </p:style>
+      </p:cxnSp>
+      <p:cxnSp>
+        <p:nvCxnSpPr>
+          <p:cNvPr id="64" name="Straight Arrow Connector 63"/>
+          <p:cNvCxnSpPr>
+            <a:stCxn id="45" idx="2"/>
+            <a:endCxn id="48" idx="0"/>
+          </p:cNvCxnSpPr>
+          <p:nvPr/>
+        </p:nvCxnSpPr>
+        <p:spPr>
+          <a:xfrm>
+            <a:off x="880792" y="3991838"/>
+            <a:ext cx="0" cy="286326"/>
+          </a:xfrm>
+          <a:prstGeom prst="straightConnector1">
+            <a:avLst/>
+          </a:prstGeom>
+          <a:ln>
+            <a:tailEnd type="triangle"/>
+          </a:ln>
+        </p:spPr>
+        <p:style>
+          <a:lnRef idx="1">
+            <a:schemeClr val="dk1"/>
+          </a:lnRef>
+          <a:fillRef idx="0">
+            <a:schemeClr val="dk1"/>
+          </a:fillRef>
+          <a:effectRef idx="0">
+            <a:schemeClr val="dk1"/>
+          </a:effectRef>
+          <a:fontRef idx="minor">
+            <a:schemeClr val="tx1"/>
+          </a:fontRef>
+        </p:style>
+      </p:cxnSp>
+      <p:cxnSp>
+        <p:nvCxnSpPr>
+          <p:cNvPr id="66" name="Straight Arrow Connector 65"/>
+          <p:cNvCxnSpPr>
+            <a:stCxn id="48" idx="2"/>
+            <a:endCxn id="50" idx="0"/>
+          </p:cNvCxnSpPr>
+          <p:nvPr/>
+        </p:nvCxnSpPr>
+        <p:spPr>
+          <a:xfrm>
+            <a:off x="880792" y="4775705"/>
+            <a:ext cx="0" cy="359353"/>
+          </a:xfrm>
+          <a:prstGeom prst="straightConnector1">
+            <a:avLst/>
+          </a:prstGeom>
+          <a:ln>
+            <a:tailEnd type="triangle"/>
+          </a:ln>
+        </p:spPr>
+        <p:style>
+          <a:lnRef idx="1">
+            <a:schemeClr val="dk1"/>
+          </a:lnRef>
+          <a:fillRef idx="0">
+            <a:schemeClr val="dk1"/>
+          </a:fillRef>
+          <a:effectRef idx="0">
+            <a:schemeClr val="dk1"/>
+          </a:effectRef>
+          <a:fontRef idx="minor">
+            <a:schemeClr val="tx1"/>
+          </a:fontRef>
+        </p:style>
+      </p:cxnSp>
+      <p:sp>
+        <p:nvSpPr>
+          <p:cNvPr id="88" name="Rounded Rectangle 87"/>
+          <p:cNvSpPr/>
+          <p:nvPr/>
+        </p:nvSpPr>
+        <p:spPr>
+          <a:xfrm>
+            <a:off x="5809181" y="-606119"/>
+            <a:ext cx="569345" cy="244289"/>
+          </a:xfrm>
+          <a:prstGeom prst="roundRect">
+            <a:avLst/>
+          </a:prstGeom>
+          <a:solidFill>
+            <a:srgbClr val="FFEEE5"/>
+          </a:solidFill>
+          <a:ln>
+            <a:solidFill>
+              <a:schemeClr val="accent2">
+                <a:lumMod val="50000"/>
+              </a:schemeClr>
+            </a:solidFill>
+          </a:ln>
+        </p:spPr>
+        <p:style>
+          <a:lnRef idx="1">
+            <a:schemeClr val="accent4"/>
+          </a:lnRef>
+          <a:fillRef idx="2">
+            <a:schemeClr val="accent4"/>
+          </a:fillRef>
+          <a:effectRef idx="1">
+            <a:schemeClr val="accent4"/>
+          </a:effectRef>
+          <a:fontRef idx="minor">
+            <a:schemeClr val="dk1"/>
+          </a:fontRef>
+        </p:style>
+        <p:txBody>
+          <a:bodyPr rtlCol="0" anchor="ctr"/>
+          <a:lstStyle/>
+          <a:p>
+            <a:pPr algn="ctr"/>
+            <a:r>
+              <a:rPr lang="en-GB" sz="1000" dirty="0" smtClean="0"/>
+              <a:t>SRQ4</a:t>
+            </a:r>
+            <a:endParaRPr lang="en-GB" sz="1000" dirty="0"/>
+          </a:p>
+        </p:txBody>
+      </p:sp>
+      <p:cxnSp>
+        <p:nvCxnSpPr>
+          <p:cNvPr id="90" name="Straight Arrow Connector 89"/>
+          <p:cNvCxnSpPr>
+            <a:stCxn id="88" idx="2"/>
+            <a:endCxn id="92" idx="3"/>
+          </p:cNvCxnSpPr>
+          <p:nvPr/>
+        </p:nvCxnSpPr>
+        <p:spPr>
+          <a:xfrm rot="16200000" flipH="1">
+            <a:off x="4800816" y="931207"/>
+            <a:ext cx="3167776" cy="581701"/>
+          </a:xfrm>
+          <a:prstGeom prst="bentConnector4">
+            <a:avLst>
+              <a:gd name="adj1" fmla="val 7571"/>
+              <a:gd name="adj2" fmla="val 125108"/>
+            </a:avLst>
+          </a:prstGeom>
+          <a:ln>
+            <a:tailEnd type="triangle"/>
+          </a:ln>
+        </p:spPr>
+        <p:style>
+          <a:lnRef idx="1">
+            <a:schemeClr val="dk1"/>
+          </a:lnRef>
+          <a:fillRef idx="0">
+            <a:schemeClr val="dk1"/>
+          </a:fillRef>
+          <a:effectRef idx="0">
+            <a:schemeClr val="dk1"/>
+          </a:effectRef>
+          <a:fontRef idx="minor">
+            <a:schemeClr val="tx1"/>
+          </a:fontRef>
+        </p:style>
+      </p:cxnSp>
+      <p:sp>
+        <p:nvSpPr>
+          <p:cNvPr id="151" name="Rounded Rectangle 150"/>
+          <p:cNvSpPr/>
+          <p:nvPr/>
+        </p:nvSpPr>
+        <p:spPr>
+          <a:xfrm>
+            <a:off x="3605592" y="2374676"/>
+            <a:ext cx="1241611" cy="244289"/>
+          </a:xfrm>
+          <a:prstGeom prst="roundRect">
+            <a:avLst/>
+          </a:prstGeom>
+          <a:ln w="6350">
+            <a:solidFill>
+              <a:schemeClr val="tx1"/>
+            </a:solidFill>
+          </a:ln>
+        </p:spPr>
+        <p:style>
+          <a:lnRef idx="2">
+            <a:schemeClr val="accent1"/>
+          </a:lnRef>
+          <a:fillRef idx="1">
+            <a:schemeClr val="lt1"/>
+          </a:fillRef>
+          <a:effectRef idx="0">
+            <a:schemeClr val="accent1"/>
+          </a:effectRef>
+          <a:fontRef idx="minor">
+            <a:schemeClr val="dk1"/>
+          </a:fontRef>
+        </p:style>
+        <p:txBody>
+          <a:bodyPr rtlCol="0" anchor="ctr"/>
+          <a:lstStyle/>
+          <a:p>
+            <a:pPr algn="ctr"/>
+            <a:r>
+              <a:rPr lang="en-GB" sz="1000" dirty="0" smtClean="0"/>
+              <a:t>Goals of the Design</a:t>
+            </a:r>
+            <a:endParaRPr lang="en-GB" sz="1000" dirty="0"/>
+          </a:p>
+        </p:txBody>
+      </p:sp>
+      <p:sp>
+        <p:nvSpPr>
+          <p:cNvPr id="154" name="Rounded Rectangle 153"/>
+          <p:cNvSpPr/>
+          <p:nvPr/>
+        </p:nvSpPr>
+        <p:spPr>
+          <a:xfrm>
+            <a:off x="3600408" y="2777972"/>
+            <a:ext cx="1241611" cy="438238"/>
+          </a:xfrm>
+          <a:prstGeom prst="roundRect">
+            <a:avLst/>
+          </a:prstGeom>
+          <a:ln w="6350">
+            <a:solidFill>
+              <a:schemeClr val="tx1"/>
+            </a:solidFill>
+          </a:ln>
+        </p:spPr>
+        <p:style>
+          <a:lnRef idx="2">
+            <a:schemeClr val="accent1"/>
+          </a:lnRef>
+          <a:fillRef idx="1">
+            <a:schemeClr val="lt1"/>
+          </a:fillRef>
+          <a:effectRef idx="0">
+            <a:schemeClr val="accent1"/>
+          </a:effectRef>
+          <a:fontRef idx="minor">
+            <a:schemeClr val="dk1"/>
+          </a:fontRef>
+        </p:style>
+        <p:txBody>
+          <a:bodyPr rtlCol="0" anchor="ctr"/>
+          <a:lstStyle/>
+          <a:p>
+            <a:pPr algn="ctr"/>
+            <a:r>
+              <a:rPr lang="en-GB" sz="1000" dirty="0" smtClean="0"/>
+              <a:t>Visualisation of Data and Views</a:t>
+            </a:r>
+            <a:endParaRPr lang="en-GB" sz="1000" dirty="0"/>
+          </a:p>
+        </p:txBody>
+      </p:sp>
+      <p:sp>
+        <p:nvSpPr>
+          <p:cNvPr id="155" name="Rounded Rectangle 154"/>
+          <p:cNvSpPr/>
+          <p:nvPr/>
+        </p:nvSpPr>
+        <p:spPr>
+          <a:xfrm>
+            <a:off x="5330141" y="2784922"/>
+            <a:ext cx="1257994" cy="431288"/>
+          </a:xfrm>
+          <a:prstGeom prst="roundRect">
+            <a:avLst/>
+          </a:prstGeom>
+          <a:ln w="6350">
+            <a:solidFill>
+              <a:schemeClr val="tx1"/>
+            </a:solidFill>
+          </a:ln>
+        </p:spPr>
+        <p:style>
+          <a:lnRef idx="2">
+            <a:schemeClr val="accent1"/>
+          </a:lnRef>
+          <a:fillRef idx="1">
+            <a:schemeClr val="lt1"/>
+          </a:fillRef>
+          <a:effectRef idx="0">
+            <a:schemeClr val="accent1"/>
+          </a:effectRef>
+          <a:fontRef idx="minor">
+            <a:schemeClr val="dk1"/>
+          </a:fontRef>
+        </p:style>
+        <p:txBody>
+          <a:bodyPr rtlCol="0" anchor="ctr"/>
+          <a:lstStyle/>
+          <a:p>
+            <a:pPr algn="ctr"/>
+            <a:r>
+              <a:rPr lang="en-GB" sz="1000" dirty="0" smtClean="0"/>
+              <a:t>Mapping of</a:t>
+            </a:r>
+            <a:br>
+              <a:rPr lang="en-GB" sz="1000" dirty="0" smtClean="0"/>
+            </a:br>
+            <a:r>
+              <a:rPr lang="en-GB" sz="1000" dirty="0" smtClean="0"/>
+              <a:t>Interaction Patterns</a:t>
+            </a:r>
+            <a:endParaRPr lang="en-GB" sz="1000" dirty="0"/>
+          </a:p>
+        </p:txBody>
+      </p:sp>
+      <p:sp>
+        <p:nvSpPr>
+          <p:cNvPr id="156" name="Rounded Rectangle 155"/>
+          <p:cNvSpPr/>
+          <p:nvPr/>
+        </p:nvSpPr>
+        <p:spPr>
+          <a:xfrm>
+            <a:off x="1867568" y="2777972"/>
+            <a:ext cx="1241611" cy="438238"/>
+          </a:xfrm>
+          <a:prstGeom prst="roundRect">
+            <a:avLst/>
+          </a:prstGeom>
+          <a:ln w="6350">
+            <a:solidFill>
+              <a:schemeClr val="tx1"/>
+            </a:solidFill>
+          </a:ln>
+        </p:spPr>
+        <p:style>
+          <a:lnRef idx="2">
+            <a:schemeClr val="accent1"/>
+          </a:lnRef>
+          <a:fillRef idx="1">
+            <a:schemeClr val="lt1"/>
+          </a:fillRef>
+          <a:effectRef idx="0">
+            <a:schemeClr val="accent1"/>
+          </a:effectRef>
+          <a:fontRef idx="minor">
+            <a:schemeClr val="dk1"/>
+          </a:fontRef>
+        </p:style>
+        <p:txBody>
+          <a:bodyPr rtlCol="0" anchor="ctr"/>
+          <a:lstStyle/>
+          <a:p>
+            <a:pPr algn="ctr"/>
+            <a:r>
+              <a:rPr lang="en-GB" sz="1000" dirty="0"/>
+              <a:t>View </a:t>
+            </a:r>
+            <a:r>
+              <a:rPr lang="en-GB" sz="1000" dirty="0" smtClean="0"/>
+              <a:t>Definition </a:t>
+            </a:r>
+            <a:r>
+              <a:rPr lang="en-GB" sz="1000" dirty="0"/>
+              <a:t>and Navigation Map</a:t>
+            </a:r>
+          </a:p>
+        </p:txBody>
+      </p:sp>
+      <p:cxnSp>
+        <p:nvCxnSpPr>
+          <p:cNvPr id="159" name="Straight Arrow Connector 158"/>
+          <p:cNvCxnSpPr>
+            <a:stCxn id="151" idx="1"/>
+            <a:endCxn id="156" idx="0"/>
+          </p:cNvCxnSpPr>
+          <p:nvPr/>
+        </p:nvCxnSpPr>
+        <p:spPr>
+          <a:xfrm rot="10800000" flipV="1">
+            <a:off x="2488374" y="2496820"/>
+            <a:ext cx="1117218" cy="281151"/>
+          </a:xfrm>
+          <a:prstGeom prst="bentConnector2">
+            <a:avLst/>
+          </a:prstGeom>
+          <a:ln>
+            <a:tailEnd type="triangle"/>
+          </a:ln>
+        </p:spPr>
+        <p:style>
+          <a:lnRef idx="1">
+            <a:schemeClr val="dk1"/>
+          </a:lnRef>
+          <a:fillRef idx="0">
+            <a:schemeClr val="dk1"/>
+          </a:fillRef>
+          <a:effectRef idx="0">
+            <a:schemeClr val="dk1"/>
+          </a:effectRef>
+          <a:fontRef idx="minor">
+            <a:schemeClr val="tx1"/>
+          </a:fontRef>
+        </p:style>
+      </p:cxnSp>
+      <p:cxnSp>
+        <p:nvCxnSpPr>
+          <p:cNvPr id="164" name="Straight Arrow Connector 163"/>
+          <p:cNvCxnSpPr>
+            <a:stCxn id="151" idx="3"/>
+            <a:endCxn id="155" idx="0"/>
+          </p:cNvCxnSpPr>
+          <p:nvPr/>
+        </p:nvCxnSpPr>
+        <p:spPr>
+          <a:xfrm>
+            <a:off x="4847203" y="2496821"/>
+            <a:ext cx="1111935" cy="288101"/>
+          </a:xfrm>
+          <a:prstGeom prst="bentConnector2">
+            <a:avLst/>
+          </a:prstGeom>
+          <a:ln>
+            <a:tailEnd type="triangle"/>
+          </a:ln>
+        </p:spPr>
+        <p:style>
+          <a:lnRef idx="1">
+            <a:schemeClr val="dk1"/>
+          </a:lnRef>
+          <a:fillRef idx="0">
+            <a:schemeClr val="dk1"/>
+          </a:fillRef>
+          <a:effectRef idx="0">
+            <a:schemeClr val="dk1"/>
+          </a:effectRef>
+          <a:fontRef idx="minor">
+            <a:schemeClr val="tx1"/>
+          </a:fontRef>
+        </p:style>
+      </p:cxnSp>
+      <p:cxnSp>
+        <p:nvCxnSpPr>
+          <p:cNvPr id="167" name="Straight Arrow Connector 166"/>
+          <p:cNvCxnSpPr>
+            <a:stCxn id="151" idx="2"/>
+            <a:endCxn id="154" idx="0"/>
+          </p:cNvCxnSpPr>
+          <p:nvPr/>
+        </p:nvCxnSpPr>
+        <p:spPr>
+          <a:xfrm flipH="1">
+            <a:off x="4221214" y="2618965"/>
+            <a:ext cx="5184" cy="159007"/>
+          </a:xfrm>
+          <a:prstGeom prst="straightConnector1">
+            <a:avLst/>
+          </a:prstGeom>
+          <a:ln>
+            <a:tailEnd type="triangle"/>
+          </a:ln>
+        </p:spPr>
+        <p:style>
+          <a:lnRef idx="1">
+            <a:schemeClr val="dk1"/>
+          </a:lnRef>
+          <a:fillRef idx="0">
+            <a:schemeClr val="dk1"/>
+          </a:fillRef>
+          <a:effectRef idx="0">
+            <a:schemeClr val="dk1"/>
+          </a:effectRef>
+          <a:fontRef idx="minor">
+            <a:schemeClr val="tx1"/>
+          </a:fontRef>
+        </p:style>
+      </p:cxnSp>
+      <p:sp>
+        <p:nvSpPr>
+          <p:cNvPr id="73" name="Rounded Rectangle 72"/>
+          <p:cNvSpPr/>
+          <p:nvPr/>
+        </p:nvSpPr>
+        <p:spPr>
+          <a:xfrm>
+            <a:off x="1867568" y="3522115"/>
+            <a:ext cx="1241611" cy="438238"/>
+          </a:xfrm>
+          <a:prstGeom prst="roundRect">
+            <a:avLst/>
+          </a:prstGeom>
+          <a:ln w="6350">
+            <a:solidFill>
+              <a:schemeClr val="tx1"/>
+            </a:solidFill>
+          </a:ln>
+        </p:spPr>
+        <p:style>
+          <a:lnRef idx="2">
+            <a:schemeClr val="accent1"/>
+          </a:lnRef>
+          <a:fillRef idx="1">
+            <a:schemeClr val="lt1"/>
+          </a:fillRef>
+          <a:effectRef idx="0">
+            <a:schemeClr val="accent1"/>
+          </a:effectRef>
+          <a:fontRef idx="minor">
+            <a:schemeClr val="dk1"/>
+          </a:fontRef>
+        </p:style>
+        <p:txBody>
+          <a:bodyPr rtlCol="0" anchor="ctr"/>
+          <a:lstStyle/>
+          <a:p>
+            <a:pPr algn="ctr"/>
+            <a:r>
+              <a:rPr lang="en-GB" sz="1000" dirty="0"/>
+              <a:t>Technical Setup</a:t>
+            </a:r>
+            <a:endParaRPr lang="en-GB" sz="1000" dirty="0"/>
+          </a:p>
+        </p:txBody>
+      </p:sp>
+      <p:sp>
+        <p:nvSpPr>
+          <p:cNvPr id="74" name="Rounded Rectangle 73"/>
+          <p:cNvSpPr/>
+          <p:nvPr/>
+        </p:nvSpPr>
+        <p:spPr>
+          <a:xfrm>
+            <a:off x="3605592" y="3522115"/>
+            <a:ext cx="1241611" cy="438238"/>
+          </a:xfrm>
+          <a:prstGeom prst="roundRect">
+            <a:avLst/>
+          </a:prstGeom>
+          <a:ln w="6350">
+            <a:solidFill>
+              <a:schemeClr val="tx1"/>
+            </a:solidFill>
+          </a:ln>
+        </p:spPr>
+        <p:style>
+          <a:lnRef idx="2">
+            <a:schemeClr val="accent1"/>
+          </a:lnRef>
+          <a:fillRef idx="1">
+            <a:schemeClr val="lt1"/>
+          </a:fillRef>
+          <a:effectRef idx="0">
+            <a:schemeClr val="accent1"/>
+          </a:effectRef>
+          <a:fontRef idx="minor">
+            <a:schemeClr val="dk1"/>
+          </a:fontRef>
+        </p:style>
+        <p:txBody>
+          <a:bodyPr rtlCol="0" anchor="ctr"/>
+          <a:lstStyle/>
+          <a:p>
+            <a:pPr algn="ctr"/>
+            <a:r>
+              <a:rPr lang="en-GB" sz="1000" dirty="0"/>
+              <a:t>Architecture and Design</a:t>
+            </a:r>
+            <a:endParaRPr lang="en-GB" sz="1000" dirty="0"/>
+          </a:p>
+        </p:txBody>
+      </p:sp>
+      <p:sp>
+        <p:nvSpPr>
+          <p:cNvPr id="76" name="Rounded Rectangle 75"/>
+          <p:cNvSpPr/>
+          <p:nvPr/>
+        </p:nvSpPr>
+        <p:spPr>
+          <a:xfrm>
+            <a:off x="5220210" y="3530187"/>
+            <a:ext cx="1367925" cy="431288"/>
+          </a:xfrm>
+          <a:prstGeom prst="roundRect">
+            <a:avLst/>
+          </a:prstGeom>
+          <a:ln w="6350">
+            <a:solidFill>
+              <a:schemeClr val="tx1"/>
+            </a:solidFill>
+          </a:ln>
+        </p:spPr>
+        <p:style>
+          <a:lnRef idx="2">
+            <a:schemeClr val="accent1"/>
+          </a:lnRef>
+          <a:fillRef idx="1">
+            <a:schemeClr val="lt1"/>
+          </a:fillRef>
+          <a:effectRef idx="0">
+            <a:schemeClr val="accent1"/>
+          </a:effectRef>
+          <a:fontRef idx="minor">
+            <a:schemeClr val="dk1"/>
+          </a:fontRef>
+        </p:style>
+        <p:txBody>
+          <a:bodyPr rtlCol="0" anchor="ctr"/>
+          <a:lstStyle/>
+          <a:p>
+            <a:pPr algn="ctr"/>
+            <a:r>
+              <a:rPr lang="en-GB" sz="1000" dirty="0"/>
+              <a:t>Implementation of Views and Interaction</a:t>
+            </a:r>
+            <a:endParaRPr lang="en-GB" sz="1000" dirty="0"/>
+          </a:p>
+        </p:txBody>
+      </p:sp>
+      <p:sp>
+        <p:nvSpPr>
+          <p:cNvPr id="80" name="Rounded Rectangle 79"/>
+          <p:cNvSpPr/>
+          <p:nvPr/>
+        </p:nvSpPr>
+        <p:spPr>
+          <a:xfrm>
+            <a:off x="3540170" y="4247926"/>
+            <a:ext cx="1362085" cy="244289"/>
+          </a:xfrm>
+          <a:prstGeom prst="roundRect">
+            <a:avLst/>
+          </a:prstGeom>
+          <a:ln w="6350">
+            <a:solidFill>
+              <a:schemeClr val="tx1"/>
+            </a:solidFill>
+          </a:ln>
+        </p:spPr>
+        <p:style>
+          <a:lnRef idx="2">
+            <a:schemeClr val="accent1"/>
+          </a:lnRef>
+          <a:fillRef idx="1">
+            <a:schemeClr val="lt1"/>
+          </a:fillRef>
+          <a:effectRef idx="0">
+            <a:schemeClr val="accent1"/>
+          </a:effectRef>
+          <a:fontRef idx="minor">
+            <a:schemeClr val="dk1"/>
+          </a:fontRef>
+        </p:style>
+        <p:txBody>
+          <a:bodyPr rtlCol="0" anchor="ctr"/>
+          <a:lstStyle/>
+          <a:p>
+            <a:pPr algn="ctr"/>
+            <a:r>
+              <a:rPr lang="en-GB" sz="1000" dirty="0" smtClean="0"/>
+              <a:t>Descriptive Evaluation</a:t>
+            </a:r>
+            <a:endParaRPr lang="en-GB" sz="1000" dirty="0"/>
+          </a:p>
+        </p:txBody>
+      </p:sp>
+      <p:sp>
+        <p:nvSpPr>
+          <p:cNvPr id="81" name="Rounded Rectangle 80"/>
+          <p:cNvSpPr/>
+          <p:nvPr/>
+        </p:nvSpPr>
+        <p:spPr>
+          <a:xfrm>
+            <a:off x="1867568" y="4595589"/>
+            <a:ext cx="1241611" cy="244289"/>
+          </a:xfrm>
+          <a:prstGeom prst="roundRect">
+            <a:avLst/>
+          </a:prstGeom>
+          <a:ln w="6350">
+            <a:solidFill>
+              <a:schemeClr val="tx1"/>
+            </a:solidFill>
+          </a:ln>
+        </p:spPr>
+        <p:style>
+          <a:lnRef idx="2">
+            <a:schemeClr val="accent1"/>
+          </a:lnRef>
+          <a:fillRef idx="1">
+            <a:schemeClr val="lt1"/>
+          </a:fillRef>
+          <a:effectRef idx="0">
+            <a:schemeClr val="accent1"/>
+          </a:effectRef>
+          <a:fontRef idx="minor">
+            <a:schemeClr val="dk1"/>
+          </a:fontRef>
+        </p:style>
+        <p:txBody>
+          <a:bodyPr rtlCol="0" anchor="ctr"/>
+          <a:lstStyle/>
+          <a:p>
+            <a:pPr algn="ctr"/>
+            <a:r>
+              <a:rPr lang="en-GB" sz="1000" dirty="0" smtClean="0"/>
+              <a:t>Scenarios</a:t>
+            </a:r>
+            <a:endParaRPr lang="en-GB" sz="1000" dirty="0"/>
+          </a:p>
+        </p:txBody>
+      </p:sp>
+      <p:sp>
+        <p:nvSpPr>
+          <p:cNvPr id="82" name="Rounded Rectangle 81"/>
+          <p:cNvSpPr/>
+          <p:nvPr/>
+        </p:nvSpPr>
+        <p:spPr>
+          <a:xfrm>
+            <a:off x="5220210" y="4595589"/>
+            <a:ext cx="1366015" cy="244289"/>
+          </a:xfrm>
+          <a:prstGeom prst="roundRect">
+            <a:avLst/>
+          </a:prstGeom>
+          <a:ln w="6350">
+            <a:solidFill>
+              <a:schemeClr val="tx1"/>
+            </a:solidFill>
+          </a:ln>
+        </p:spPr>
+        <p:style>
+          <a:lnRef idx="2">
+            <a:schemeClr val="accent1"/>
+          </a:lnRef>
+          <a:fillRef idx="1">
+            <a:schemeClr val="lt1"/>
+          </a:fillRef>
+          <a:effectRef idx="0">
+            <a:schemeClr val="accent1"/>
+          </a:effectRef>
+          <a:fontRef idx="minor">
+            <a:schemeClr val="dk1"/>
+          </a:fontRef>
+        </p:style>
+        <p:txBody>
+          <a:bodyPr rtlCol="0" anchor="ctr"/>
+          <a:lstStyle/>
+          <a:p>
+            <a:pPr algn="ctr"/>
+            <a:r>
+              <a:rPr lang="en-GB" sz="1000" dirty="0" smtClean="0"/>
+              <a:t>Informed Arguments</a:t>
+            </a:r>
+            <a:endParaRPr lang="en-GB" sz="1000" dirty="0"/>
+          </a:p>
+        </p:txBody>
+      </p:sp>
+      <p:cxnSp>
+        <p:nvCxnSpPr>
+          <p:cNvPr id="84" name="Straight Arrow Connector 158"/>
+          <p:cNvCxnSpPr>
+            <a:stCxn id="80" idx="1"/>
+            <a:endCxn id="81" idx="0"/>
+          </p:cNvCxnSpPr>
+          <p:nvPr/>
+        </p:nvCxnSpPr>
+        <p:spPr>
+          <a:xfrm rot="10800000" flipV="1">
+            <a:off x="2488374" y="4370071"/>
+            <a:ext cx="1051796" cy="225518"/>
+          </a:xfrm>
+          <a:prstGeom prst="bentConnector2">
+            <a:avLst/>
+          </a:prstGeom>
+          <a:ln>
+            <a:tailEnd type="triangle"/>
+          </a:ln>
+        </p:spPr>
+        <p:style>
+          <a:lnRef idx="1">
+            <a:schemeClr val="dk1"/>
+          </a:lnRef>
+          <a:fillRef idx="0">
+            <a:schemeClr val="dk1"/>
+          </a:fillRef>
+          <a:effectRef idx="0">
+            <a:schemeClr val="dk1"/>
+          </a:effectRef>
+          <a:fontRef idx="minor">
+            <a:schemeClr val="tx1"/>
+          </a:fontRef>
+        </p:style>
+      </p:cxnSp>
+      <p:cxnSp>
+        <p:nvCxnSpPr>
+          <p:cNvPr id="85" name="Straight Arrow Connector 158"/>
+          <p:cNvCxnSpPr>
+            <a:stCxn id="80" idx="3"/>
+            <a:endCxn id="82" idx="0"/>
+          </p:cNvCxnSpPr>
+          <p:nvPr/>
+        </p:nvCxnSpPr>
+        <p:spPr>
+          <a:xfrm>
+            <a:off x="4902255" y="4370071"/>
+            <a:ext cx="1000963" cy="225518"/>
+          </a:xfrm>
+          <a:prstGeom prst="bentConnector2">
+            <a:avLst/>
+          </a:prstGeom>
+          <a:ln>
+            <a:tailEnd type="triangle"/>
+          </a:ln>
+        </p:spPr>
+        <p:style>
+          <a:lnRef idx="1">
+            <a:schemeClr val="dk1"/>
+          </a:lnRef>
+          <a:fillRef idx="0">
+            <a:schemeClr val="dk1"/>
+          </a:fillRef>
+          <a:effectRef idx="0">
+            <a:schemeClr val="dk1"/>
+          </a:effectRef>
+          <a:fontRef idx="minor">
+            <a:schemeClr val="tx1"/>
+          </a:fontRef>
+        </p:style>
+      </p:cxnSp>
+      <p:sp>
+        <p:nvSpPr>
+          <p:cNvPr id="91" name="Rounded Rectangle 90"/>
+          <p:cNvSpPr/>
+          <p:nvPr/>
+        </p:nvSpPr>
+        <p:spPr>
+          <a:xfrm>
+            <a:off x="1867567" y="5258301"/>
+            <a:ext cx="1241611" cy="244289"/>
+          </a:xfrm>
+          <a:prstGeom prst="roundRect">
+            <a:avLst/>
+          </a:prstGeom>
+          <a:ln w="6350">
+            <a:solidFill>
+              <a:schemeClr val="tx1"/>
+            </a:solidFill>
+          </a:ln>
+        </p:spPr>
+        <p:style>
+          <a:lnRef idx="2">
+            <a:schemeClr val="accent1"/>
+          </a:lnRef>
+          <a:fillRef idx="1">
+            <a:schemeClr val="lt1"/>
+          </a:fillRef>
+          <a:effectRef idx="0">
+            <a:schemeClr val="accent1"/>
+          </a:effectRef>
+          <a:fontRef idx="minor">
+            <a:schemeClr val="dk1"/>
+          </a:fontRef>
+        </p:style>
+        <p:txBody>
+          <a:bodyPr rtlCol="0" anchor="ctr"/>
+          <a:lstStyle/>
+          <a:p>
+            <a:pPr algn="ctr"/>
+            <a:r>
+              <a:rPr lang="en-GB" sz="1000" dirty="0" smtClean="0"/>
+              <a:t>Summary</a:t>
+            </a:r>
+            <a:endParaRPr lang="en-GB" sz="1000" dirty="0"/>
+          </a:p>
+        </p:txBody>
+      </p:sp>
+      <p:sp>
+        <p:nvSpPr>
+          <p:cNvPr id="93" name="Rounded Rectangle 92"/>
+          <p:cNvSpPr/>
+          <p:nvPr/>
+        </p:nvSpPr>
+        <p:spPr>
+          <a:xfrm>
+            <a:off x="3592119" y="5258300"/>
+            <a:ext cx="1241611" cy="244289"/>
+          </a:xfrm>
+          <a:prstGeom prst="roundRect">
+            <a:avLst/>
+          </a:prstGeom>
+          <a:ln w="6350">
+            <a:solidFill>
+              <a:schemeClr val="tx1"/>
+            </a:solidFill>
+          </a:ln>
+        </p:spPr>
+        <p:style>
+          <a:lnRef idx="2">
+            <a:schemeClr val="accent1"/>
+          </a:lnRef>
+          <a:fillRef idx="1">
+            <a:schemeClr val="lt1"/>
+          </a:fillRef>
+          <a:effectRef idx="0">
+            <a:schemeClr val="accent1"/>
+          </a:effectRef>
+          <a:fontRef idx="minor">
+            <a:schemeClr val="dk1"/>
+          </a:fontRef>
+        </p:style>
+        <p:txBody>
+          <a:bodyPr rtlCol="0" anchor="ctr"/>
+          <a:lstStyle/>
+          <a:p>
+            <a:pPr algn="ctr"/>
+            <a:r>
+              <a:rPr lang="en-GB" sz="1000" dirty="0" smtClean="0"/>
+              <a:t>Findings</a:t>
+            </a:r>
+            <a:endParaRPr lang="en-GB" sz="1000" dirty="0"/>
+          </a:p>
+        </p:txBody>
+      </p:sp>
+      <p:sp>
+        <p:nvSpPr>
+          <p:cNvPr id="94" name="Rounded Rectangle 93"/>
+          <p:cNvSpPr/>
+          <p:nvPr/>
+        </p:nvSpPr>
+        <p:spPr>
+          <a:xfrm>
+            <a:off x="5316672" y="5261058"/>
+            <a:ext cx="1241611" cy="244289"/>
+          </a:xfrm>
+          <a:prstGeom prst="roundRect">
+            <a:avLst/>
+          </a:prstGeom>
+          <a:ln w="6350">
+            <a:solidFill>
+              <a:schemeClr val="tx1"/>
+            </a:solidFill>
+          </a:ln>
+        </p:spPr>
+        <p:style>
+          <a:lnRef idx="2">
+            <a:schemeClr val="accent1"/>
+          </a:lnRef>
+          <a:fillRef idx="1">
+            <a:schemeClr val="lt1"/>
+          </a:fillRef>
+          <a:effectRef idx="0">
+            <a:schemeClr val="accent1"/>
+          </a:effectRef>
+          <a:fontRef idx="minor">
+            <a:schemeClr val="dk1"/>
+          </a:fontRef>
+        </p:style>
+        <p:txBody>
+          <a:bodyPr rtlCol="0" anchor="ctr"/>
+          <a:lstStyle/>
+          <a:p>
+            <a:pPr algn="ctr"/>
+            <a:r>
+              <a:rPr lang="en-GB" sz="1000" dirty="0" smtClean="0"/>
+              <a:t>Future Research</a:t>
+            </a:r>
+            <a:endParaRPr lang="en-GB" sz="1000" dirty="0"/>
+          </a:p>
+        </p:txBody>
+      </p:sp>
+      <p:sp>
+        <p:nvSpPr>
+          <p:cNvPr id="95" name="Rounded Rectangle 94"/>
+          <p:cNvSpPr/>
+          <p:nvPr/>
+        </p:nvSpPr>
+        <p:spPr>
+          <a:xfrm>
+            <a:off x="3605592" y="4597211"/>
+            <a:ext cx="1241611" cy="244289"/>
+          </a:xfrm>
+          <a:prstGeom prst="roundRect">
+            <a:avLst/>
+          </a:prstGeom>
+          <a:solidFill>
+            <a:schemeClr val="accent4">
+              <a:lumMod val="20000"/>
+              <a:lumOff val="80000"/>
+            </a:schemeClr>
+          </a:solidFill>
+          <a:ln>
+            <a:solidFill>
+              <a:schemeClr val="accent2">
+                <a:lumMod val="50000"/>
+              </a:schemeClr>
+            </a:solidFill>
+          </a:ln>
+        </p:spPr>
+        <p:style>
+          <a:lnRef idx="1">
+            <a:schemeClr val="accent4"/>
+          </a:lnRef>
+          <a:fillRef idx="2">
+            <a:schemeClr val="accent4"/>
+          </a:fillRef>
+          <a:effectRef idx="1">
+            <a:schemeClr val="accent4"/>
+          </a:effectRef>
+          <a:fontRef idx="minor">
+            <a:schemeClr val="dk1"/>
+          </a:fontRef>
+        </p:style>
+        <p:txBody>
+          <a:bodyPr rtlCol="0" anchor="ctr"/>
+          <a:lstStyle/>
+          <a:p>
+            <a:pPr algn="ctr"/>
+            <a:r>
+              <a:rPr lang="en-GB" sz="1000" dirty="0" smtClean="0"/>
+              <a:t>MRQ</a:t>
+            </a:r>
+            <a:endParaRPr lang="en-GB" sz="1000" dirty="0"/>
+          </a:p>
+        </p:txBody>
+      </p:sp>
+      <p:cxnSp>
+        <p:nvCxnSpPr>
+          <p:cNvPr id="96" name="Straight Arrow Connector 158"/>
+          <p:cNvCxnSpPr>
+            <a:stCxn id="82" idx="1"/>
+            <a:endCxn id="95" idx="3"/>
+          </p:cNvCxnSpPr>
+          <p:nvPr/>
+        </p:nvCxnSpPr>
+        <p:spPr>
+          <a:xfrm flipH="1">
+            <a:off x="4847203" y="4717734"/>
+            <a:ext cx="373007" cy="1622"/>
+          </a:xfrm>
+          <a:prstGeom prst="straightConnector1">
+            <a:avLst/>
+          </a:prstGeom>
+          <a:ln>
+            <a:tailEnd type="triangle"/>
+          </a:ln>
+        </p:spPr>
+        <p:style>
+          <a:lnRef idx="1">
+            <a:schemeClr val="dk1"/>
+          </a:lnRef>
+          <a:fillRef idx="0">
+            <a:schemeClr val="dk1"/>
+          </a:fillRef>
+          <a:effectRef idx="0">
+            <a:schemeClr val="dk1"/>
+          </a:effectRef>
+          <a:fontRef idx="minor">
+            <a:schemeClr val="tx1"/>
+          </a:fontRef>
+        </p:style>
+      </p:cxnSp>
+      <p:cxnSp>
+        <p:nvCxnSpPr>
+          <p:cNvPr id="97" name="Straight Arrow Connector 158"/>
+          <p:cNvCxnSpPr>
+            <a:stCxn id="81" idx="3"/>
+            <a:endCxn id="95" idx="1"/>
+          </p:cNvCxnSpPr>
+          <p:nvPr/>
+        </p:nvCxnSpPr>
+        <p:spPr>
+          <a:xfrm>
+            <a:off x="3109179" y="4717734"/>
+            <a:ext cx="496413" cy="1622"/>
+          </a:xfrm>
+          <a:prstGeom prst="straightConnector1">
+            <a:avLst/>
+          </a:prstGeom>
+          <a:ln>
+            <a:tailEnd type="triangle"/>
+          </a:ln>
+        </p:spPr>
+        <p:style>
+          <a:lnRef idx="1">
+            <a:schemeClr val="dk1"/>
+          </a:lnRef>
+          <a:fillRef idx="0">
+            <a:schemeClr val="dk1"/>
+          </a:fillRef>
+          <a:effectRef idx="0">
+            <a:schemeClr val="dk1"/>
+          </a:effectRef>
+          <a:fontRef idx="minor">
+            <a:schemeClr val="tx1"/>
+          </a:fontRef>
+        </p:style>
+      </p:cxnSp>
+    </p:spTree>
+    <p:extLst>
+      <p:ext uri="{BB962C8B-B14F-4D97-AF65-F5344CB8AC3E}">
+        <p14:creationId xmlns:p14="http://schemas.microsoft.com/office/powerpoint/2010/main" val="1352791847"/>
       </p:ext>
     </p:extLst>
   </p:cSld>

</xml_diff>